<commit_message>
added Git, Matchtingtool, minor changes elsewhere
</commit_message>
<xml_diff>
--- a/More Machine Learning with Python.pptx
+++ b/More Machine Learning with Python.pptx
@@ -5,7 +5,7 @@
     <p:sldMasterId id="2147483648" r:id="rId1"/>
   </p:sldMasterIdLst>
   <p:notesMasterIdLst>
-    <p:notesMasterId r:id="rId12"/>
+    <p:notesMasterId r:id="rId14"/>
   </p:notesMasterIdLst>
   <p:sldIdLst>
     <p:sldId id="256" r:id="rId2"/>
@@ -15,9 +15,11 @@
     <p:sldId id="271" r:id="rId6"/>
     <p:sldId id="273" r:id="rId7"/>
     <p:sldId id="257" r:id="rId8"/>
-    <p:sldId id="258" r:id="rId9"/>
-    <p:sldId id="274" r:id="rId10"/>
-    <p:sldId id="275" r:id="rId11"/>
+    <p:sldId id="277" r:id="rId9"/>
+    <p:sldId id="276" r:id="rId10"/>
+    <p:sldId id="258" r:id="rId11"/>
+    <p:sldId id="274" r:id="rId12"/>
+    <p:sldId id="275" r:id="rId13"/>
   </p:sldIdLst>
   <p:sldSz cx="12192000" cy="6858000"/>
   <p:notesSz cx="6858000" cy="9144000"/>
@@ -136,6 +138,8 @@
         <p14:section name="Logistic Regression" id="{5CE2F981-4E7B-40CE-9BD4-EBDF3A22B6B3}">
           <p14:sldIdLst>
             <p14:sldId id="257"/>
+            <p14:sldId id="277"/>
+            <p14:sldId id="276"/>
             <p14:sldId id="258"/>
             <p14:sldId id="274"/>
             <p14:sldId id="275"/>
@@ -232,7 +236,7 @@
           <a:p>
             <a:fld id="{F173E992-BAA7-4051-A13F-EA3666D40470}" type="datetimeFigureOut">
               <a:rPr lang="de-DE" smtClean="0"/>
-              <a:t>05.10.2023</a:t>
+              <a:t>02.12.2023</a:t>
             </a:fld>
             <a:endParaRPr lang="de-DE"/>
           </a:p>
@@ -730,7 +734,7 @@
           <a:p>
             <a:fld id="{9195C45A-9F98-4906-86F2-1D731308AF34}" type="datetimeFigureOut">
               <a:rPr lang="de-DE" smtClean="0"/>
-              <a:t>05.10.2023</a:t>
+              <a:t>02.12.2023</a:t>
             </a:fld>
             <a:endParaRPr lang="de-DE"/>
           </a:p>
@@ -928,7 +932,7 @@
           <a:p>
             <a:fld id="{9195C45A-9F98-4906-86F2-1D731308AF34}" type="datetimeFigureOut">
               <a:rPr lang="de-DE" smtClean="0"/>
-              <a:t>05.10.2023</a:t>
+              <a:t>02.12.2023</a:t>
             </a:fld>
             <a:endParaRPr lang="de-DE"/>
           </a:p>
@@ -1136,7 +1140,7 @@
           <a:p>
             <a:fld id="{9195C45A-9F98-4906-86F2-1D731308AF34}" type="datetimeFigureOut">
               <a:rPr lang="de-DE" smtClean="0"/>
-              <a:t>05.10.2023</a:t>
+              <a:t>02.12.2023</a:t>
             </a:fld>
             <a:endParaRPr lang="de-DE"/>
           </a:p>
@@ -1334,7 +1338,7 @@
           <a:p>
             <a:fld id="{9195C45A-9F98-4906-86F2-1D731308AF34}" type="datetimeFigureOut">
               <a:rPr lang="de-DE" smtClean="0"/>
-              <a:t>05.10.2023</a:t>
+              <a:t>02.12.2023</a:t>
             </a:fld>
             <a:endParaRPr lang="de-DE"/>
           </a:p>
@@ -1609,7 +1613,7 @@
           <a:p>
             <a:fld id="{9195C45A-9F98-4906-86F2-1D731308AF34}" type="datetimeFigureOut">
               <a:rPr lang="de-DE" smtClean="0"/>
-              <a:t>05.10.2023</a:t>
+              <a:t>02.12.2023</a:t>
             </a:fld>
             <a:endParaRPr lang="de-DE"/>
           </a:p>
@@ -1874,7 +1878,7 @@
           <a:p>
             <a:fld id="{9195C45A-9F98-4906-86F2-1D731308AF34}" type="datetimeFigureOut">
               <a:rPr lang="de-DE" smtClean="0"/>
-              <a:t>05.10.2023</a:t>
+              <a:t>02.12.2023</a:t>
             </a:fld>
             <a:endParaRPr lang="de-DE"/>
           </a:p>
@@ -2286,7 +2290,7 @@
           <a:p>
             <a:fld id="{9195C45A-9F98-4906-86F2-1D731308AF34}" type="datetimeFigureOut">
               <a:rPr lang="de-DE" smtClean="0"/>
-              <a:t>05.10.2023</a:t>
+              <a:t>02.12.2023</a:t>
             </a:fld>
             <a:endParaRPr lang="de-DE"/>
           </a:p>
@@ -2427,7 +2431,7 @@
           <a:p>
             <a:fld id="{9195C45A-9F98-4906-86F2-1D731308AF34}" type="datetimeFigureOut">
               <a:rPr lang="de-DE" smtClean="0"/>
-              <a:t>05.10.2023</a:t>
+              <a:t>02.12.2023</a:t>
             </a:fld>
             <a:endParaRPr lang="de-DE"/>
           </a:p>
@@ -2540,7 +2544,7 @@
           <a:p>
             <a:fld id="{9195C45A-9F98-4906-86F2-1D731308AF34}" type="datetimeFigureOut">
               <a:rPr lang="de-DE" smtClean="0"/>
-              <a:t>05.10.2023</a:t>
+              <a:t>02.12.2023</a:t>
             </a:fld>
             <a:endParaRPr lang="de-DE"/>
           </a:p>
@@ -2851,7 +2855,7 @@
           <a:p>
             <a:fld id="{9195C45A-9F98-4906-86F2-1D731308AF34}" type="datetimeFigureOut">
               <a:rPr lang="de-DE" smtClean="0"/>
-              <a:t>05.10.2023</a:t>
+              <a:t>02.12.2023</a:t>
             </a:fld>
             <a:endParaRPr lang="de-DE"/>
           </a:p>
@@ -3139,7 +3143,7 @@
           <a:p>
             <a:fld id="{9195C45A-9F98-4906-86F2-1D731308AF34}" type="datetimeFigureOut">
               <a:rPr lang="de-DE" smtClean="0"/>
-              <a:t>05.10.2023</a:t>
+              <a:t>02.12.2023</a:t>
             </a:fld>
             <a:endParaRPr lang="de-DE"/>
           </a:p>
@@ -3380,7 +3384,7 @@
           <a:p>
             <a:fld id="{9195C45A-9F98-4906-86F2-1D731308AF34}" type="datetimeFigureOut">
               <a:rPr lang="de-DE" smtClean="0"/>
-              <a:t>05.10.2023</a:t>
+              <a:t>02.12.2023</a:t>
             </a:fld>
             <a:endParaRPr lang="de-DE"/>
           </a:p>
@@ -3859,13 +3863,6 @@
               <a:t>By Viktor Reichert</a:t>
             </a:r>
           </a:p>
-          <a:p>
-            <a:r>
-              <a:rPr lang="de-DE" dirty="0" err="1"/>
-              <a:t>Viktor.Reichert@Conteco.gmbh</a:t>
-            </a:r>
-            <a:endParaRPr lang="de-DE" dirty="0"/>
-          </a:p>
         </p:txBody>
       </p:sp>
     </p:spTree>
@@ -3882,6 +3879,792 @@
 </file>
 
 <file path=ppt/slides/slide10.xml><?xml version="1.0" encoding="utf-8"?>
+<p:sld xmlns:a="http://schemas.openxmlformats.org/drawingml/2006/main" xmlns:r="http://schemas.openxmlformats.org/officeDocument/2006/relationships" xmlns:p="http://schemas.openxmlformats.org/presentationml/2006/main">
+  <p:cSld>
+    <p:spTree>
+      <p:nvGrpSpPr>
+        <p:cNvPr id="1" name=""/>
+        <p:cNvGrpSpPr/>
+        <p:nvPr/>
+      </p:nvGrpSpPr>
+      <p:grpSpPr>
+        <a:xfrm>
+          <a:off x="0" y="0"/>
+          <a:ext cx="0" cy="0"/>
+          <a:chOff x="0" y="0"/>
+          <a:chExt cx="0" cy="0"/>
+        </a:xfrm>
+      </p:grpSpPr>
+      <p:sp>
+        <p:nvSpPr>
+          <p:cNvPr id="2" name="Titel 1">
+            <a:extLst>
+              <a:ext uri="{FF2B5EF4-FFF2-40B4-BE49-F238E27FC236}">
+                <a16:creationId xmlns:a16="http://schemas.microsoft.com/office/drawing/2014/main" id="{C4CD9EEB-BB11-992F-345E-8E75EB6179CF}"/>
+              </a:ext>
+            </a:extLst>
+          </p:cNvPr>
+          <p:cNvSpPr>
+            <a:spLocks noGrp="1"/>
+          </p:cNvSpPr>
+          <p:nvPr>
+            <p:ph type="title"/>
+          </p:nvPr>
+        </p:nvSpPr>
+        <p:spPr/>
+        <p:txBody>
+          <a:bodyPr/>
+          <a:lstStyle/>
+          <a:p>
+            <a:r>
+              <a:rPr lang="de-DE" dirty="0" err="1"/>
+              <a:t>Logistic</a:t>
+            </a:r>
+            <a:r>
+              <a:rPr lang="de-DE" dirty="0"/>
+              <a:t> (Sigmoid) </a:t>
+            </a:r>
+            <a:r>
+              <a:rPr lang="de-DE" dirty="0" err="1"/>
+              <a:t>Function</a:t>
+            </a:r>
+            <a:endParaRPr lang="de-DE" dirty="0"/>
+          </a:p>
+        </p:txBody>
+      </p:sp>
+      <mc:AlternateContent xmlns:mc="http://schemas.openxmlformats.org/markup-compatibility/2006">
+        <mc:Choice xmlns:a14="http://schemas.microsoft.com/office/drawing/2010/main" Requires="a14">
+          <p:sp>
+            <p:nvSpPr>
+              <p:cNvPr id="3" name="Inhaltsplatzhalter 2">
+                <a:extLst>
+                  <a:ext uri="{FF2B5EF4-FFF2-40B4-BE49-F238E27FC236}">
+                    <a16:creationId xmlns:a16="http://schemas.microsoft.com/office/drawing/2014/main" id="{6991F8D8-0EF1-7693-1AB2-B91584EC1298}"/>
+                  </a:ext>
+                </a:extLst>
+              </p:cNvPr>
+              <p:cNvSpPr>
+                <a:spLocks noGrp="1"/>
+              </p:cNvSpPr>
+              <p:nvPr>
+                <p:ph idx="1"/>
+              </p:nvPr>
+            </p:nvSpPr>
+            <p:spPr>
+              <a:xfrm>
+                <a:off x="838200" y="1825625"/>
+                <a:ext cx="10515600" cy="1989857"/>
+              </a:xfrm>
+            </p:spPr>
+            <p:txBody>
+              <a:bodyPr>
+                <a:normAutofit fontScale="77500" lnSpcReduction="20000"/>
+              </a:bodyPr>
+              <a:lstStyle/>
+              <a:p>
+                <a14:m>
+                  <m:oMath xmlns:m="http://schemas.openxmlformats.org/officeDocument/2006/math">
+                    <m:r>
+                      <a:rPr lang="de-DE" b="0" i="1" smtClean="0">
+                        <a:latin typeface="Cambria Math" panose="02040503050406030204" pitchFamily="18" charset="0"/>
+                      </a:rPr>
+                      <m:t>𝜎</m:t>
+                    </m:r>
+                    <m:d>
+                      <m:dPr>
+                        <m:ctrlPr>
+                          <a:rPr lang="de-DE" b="0" i="1" smtClean="0">
+                            <a:latin typeface="Cambria Math" panose="02040503050406030204" pitchFamily="18" charset="0"/>
+                          </a:rPr>
+                        </m:ctrlPr>
+                      </m:dPr>
+                      <m:e>
+                        <m:r>
+                          <a:rPr lang="de-DE" b="0" i="1" smtClean="0">
+                            <a:latin typeface="Cambria Math" panose="02040503050406030204" pitchFamily="18" charset="0"/>
+                          </a:rPr>
+                          <m:t>𝑥</m:t>
+                        </m:r>
+                      </m:e>
+                    </m:d>
+                    <m:r>
+                      <a:rPr lang="de-DE" b="0" i="1" smtClean="0">
+                        <a:latin typeface="Cambria Math" panose="02040503050406030204" pitchFamily="18" charset="0"/>
+                      </a:rPr>
+                      <m:t>≔</m:t>
+                    </m:r>
+                    <m:f>
+                      <m:fPr>
+                        <m:ctrlPr>
+                          <a:rPr lang="de-DE" b="0" i="1" smtClean="0">
+                            <a:latin typeface="Cambria Math" panose="02040503050406030204" pitchFamily="18" charset="0"/>
+                          </a:rPr>
+                        </m:ctrlPr>
+                      </m:fPr>
+                      <m:num>
+                        <m:r>
+                          <a:rPr lang="de-DE" b="0" i="1" smtClean="0">
+                            <a:latin typeface="Cambria Math" panose="02040503050406030204" pitchFamily="18" charset="0"/>
+                          </a:rPr>
+                          <m:t>1</m:t>
+                        </m:r>
+                      </m:num>
+                      <m:den>
+                        <m:r>
+                          <a:rPr lang="de-DE" b="0" i="1" smtClean="0">
+                            <a:latin typeface="Cambria Math" panose="02040503050406030204" pitchFamily="18" charset="0"/>
+                          </a:rPr>
+                          <m:t>1</m:t>
+                        </m:r>
+                        <m:r>
+                          <a:rPr lang="de-DE" b="0" i="1" smtClean="0">
+                            <a:latin typeface="Cambria Math" panose="02040503050406030204" pitchFamily="18" charset="0"/>
+                          </a:rPr>
+                          <m:t>+</m:t>
+                        </m:r>
+                        <m:sSup>
+                          <m:sSupPr>
+                            <m:ctrlPr>
+                              <a:rPr lang="de-DE" b="0" i="1" smtClean="0">
+                                <a:latin typeface="Cambria Math" panose="02040503050406030204" pitchFamily="18" charset="0"/>
+                              </a:rPr>
+                            </m:ctrlPr>
+                          </m:sSupPr>
+                          <m:e>
+                            <m:r>
+                              <a:rPr lang="de-DE" b="0" i="1" smtClean="0">
+                                <a:latin typeface="Cambria Math" panose="02040503050406030204" pitchFamily="18" charset="0"/>
+                              </a:rPr>
+                              <m:t>𝑒</m:t>
+                            </m:r>
+                          </m:e>
+                          <m:sup>
+                            <m:r>
+                              <a:rPr lang="de-DE" b="0" i="1" smtClean="0">
+                                <a:latin typeface="Cambria Math" panose="02040503050406030204" pitchFamily="18" charset="0"/>
+                              </a:rPr>
+                              <m:t>−</m:t>
+                            </m:r>
+                            <m:d>
+                              <m:dPr>
+                                <m:ctrlPr>
+                                  <a:rPr lang="de-DE" b="0" i="1" smtClean="0">
+                                    <a:latin typeface="Cambria Math" panose="02040503050406030204" pitchFamily="18" charset="0"/>
+                                  </a:rPr>
+                                </m:ctrlPr>
+                              </m:dPr>
+                              <m:e>
+                                <m:r>
+                                  <a:rPr lang="de-DE" b="0" i="1" smtClean="0">
+                                    <a:latin typeface="Cambria Math" panose="02040503050406030204" pitchFamily="18" charset="0"/>
+                                  </a:rPr>
+                                  <m:t>𝑎</m:t>
+                                </m:r>
+                                <m:r>
+                                  <a:rPr lang="de-DE" b="0" i="1" smtClean="0">
+                                    <a:latin typeface="Cambria Math" panose="02040503050406030204" pitchFamily="18" charset="0"/>
+                                  </a:rPr>
+                                  <m:t>+</m:t>
+                                </m:r>
+                                <m:r>
+                                  <a:rPr lang="de-DE" b="0" i="1" smtClean="0">
+                                    <a:latin typeface="Cambria Math" panose="02040503050406030204" pitchFamily="18" charset="0"/>
+                                  </a:rPr>
+                                  <m:t>𝑏𝑥</m:t>
+                                </m:r>
+                              </m:e>
+                            </m:d>
+                          </m:sup>
+                        </m:sSup>
+                      </m:den>
+                    </m:f>
+                  </m:oMath>
+                </a14:m>
+                <a:endParaRPr lang="de-DE" b="0" dirty="0"/>
+              </a:p>
+              <a:p>
+                <a14:m>
+                  <m:oMath xmlns:m="http://schemas.openxmlformats.org/officeDocument/2006/math">
+                    <m:r>
+                      <a:rPr lang="de-DE" b="0" i="1" smtClean="0">
+                        <a:latin typeface="Cambria Math" panose="02040503050406030204" pitchFamily="18" charset="0"/>
+                      </a:rPr>
+                      <m:t>𝑎</m:t>
+                    </m:r>
+                    <m:r>
+                      <a:rPr lang="de-DE" b="0" i="1" smtClean="0">
+                        <a:latin typeface="Cambria Math" panose="02040503050406030204" pitchFamily="18" charset="0"/>
+                      </a:rPr>
+                      <m:t>∈</m:t>
+                    </m:r>
+                    <m:r>
+                      <a:rPr lang="de-DE" b="0" i="1" smtClean="0">
+                        <a:latin typeface="Cambria Math" panose="02040503050406030204" pitchFamily="18" charset="0"/>
+                      </a:rPr>
+                      <m:t>ℝ</m:t>
+                    </m:r>
+                  </m:oMath>
+                </a14:m>
+                <a:r>
+                  <a:rPr lang="de-DE" dirty="0"/>
+                  <a:t> </a:t>
+                </a:r>
+                <a:r>
+                  <a:rPr lang="de-DE" dirty="0" err="1"/>
+                  <a:t>describes</a:t>
+                </a:r>
+                <a:r>
+                  <a:rPr lang="de-DE" dirty="0"/>
+                  <a:t> </a:t>
+                </a:r>
+                <a:r>
+                  <a:rPr lang="de-DE" dirty="0" err="1"/>
+                  <a:t>the</a:t>
+                </a:r>
+                <a:r>
+                  <a:rPr lang="de-DE" dirty="0"/>
+                  <a:t> </a:t>
+                </a:r>
+                <a:r>
+                  <a:rPr lang="de-DE" dirty="0" err="1"/>
+                  <a:t>left-right</a:t>
+                </a:r>
+                <a:r>
+                  <a:rPr lang="de-DE" dirty="0"/>
+                  <a:t> shift </a:t>
+                </a:r>
+                <a:r>
+                  <a:rPr lang="de-DE" dirty="0" err="1"/>
+                  <a:t>of</a:t>
+                </a:r>
+                <a:r>
+                  <a:rPr lang="de-DE" dirty="0"/>
+                  <a:t> </a:t>
+                </a:r>
+                <a:r>
+                  <a:rPr lang="de-DE" dirty="0" err="1"/>
+                  <a:t>the</a:t>
+                </a:r>
+                <a:r>
+                  <a:rPr lang="de-DE" dirty="0"/>
+                  <a:t> </a:t>
+                </a:r>
+                <a:r>
+                  <a:rPr lang="de-DE" dirty="0" err="1"/>
+                  <a:t>curve</a:t>
+                </a:r>
+                <a:endParaRPr lang="de-DE" dirty="0"/>
+              </a:p>
+              <a:p>
+                <a14:m>
+                  <m:oMath xmlns:m="http://schemas.openxmlformats.org/officeDocument/2006/math">
+                    <m:r>
+                      <a:rPr lang="de-DE" b="0" i="1" smtClean="0">
+                        <a:latin typeface="Cambria Math" panose="02040503050406030204" pitchFamily="18" charset="0"/>
+                      </a:rPr>
+                      <m:t>𝑏</m:t>
+                    </m:r>
+                    <m:r>
+                      <a:rPr lang="de-DE" b="0" i="1" smtClean="0">
+                        <a:latin typeface="Cambria Math" panose="02040503050406030204" pitchFamily="18" charset="0"/>
+                      </a:rPr>
+                      <m:t>∈</m:t>
+                    </m:r>
+                    <m:r>
+                      <a:rPr lang="de-DE" b="0" i="1" smtClean="0">
+                        <a:latin typeface="Cambria Math" panose="02040503050406030204" pitchFamily="18" charset="0"/>
+                      </a:rPr>
+                      <m:t>ℝ</m:t>
+                    </m:r>
+                  </m:oMath>
+                </a14:m>
+                <a:r>
+                  <a:rPr lang="de-DE" dirty="0"/>
+                  <a:t> </a:t>
+                </a:r>
+                <a:r>
+                  <a:rPr lang="de-DE" dirty="0" err="1"/>
+                  <a:t>describes</a:t>
+                </a:r>
+                <a:r>
+                  <a:rPr lang="de-DE" dirty="0"/>
+                  <a:t> </a:t>
+                </a:r>
+                <a:r>
+                  <a:rPr lang="de-DE" dirty="0" err="1"/>
+                  <a:t>the</a:t>
+                </a:r>
+                <a:r>
+                  <a:rPr lang="de-DE" dirty="0"/>
+                  <a:t> </a:t>
+                </a:r>
+                <a:r>
+                  <a:rPr lang="de-DE" dirty="0" err="1"/>
+                  <a:t>slope</a:t>
+                </a:r>
+                <a:r>
+                  <a:rPr lang="de-DE" dirty="0"/>
+                  <a:t> </a:t>
+                </a:r>
+                <a:r>
+                  <a:rPr lang="de-DE" dirty="0" err="1"/>
+                  <a:t>of</a:t>
+                </a:r>
+                <a:r>
+                  <a:rPr lang="de-DE" dirty="0"/>
+                  <a:t> </a:t>
+                </a:r>
+                <a:r>
+                  <a:rPr lang="de-DE" dirty="0" err="1"/>
+                  <a:t>the</a:t>
+                </a:r>
+                <a:r>
+                  <a:rPr lang="de-DE" dirty="0"/>
+                  <a:t> </a:t>
+                </a:r>
+                <a:r>
+                  <a:rPr lang="de-DE" dirty="0" err="1"/>
+                  <a:t>curve</a:t>
+                </a:r>
+                <a:r>
+                  <a:rPr lang="de-DE" dirty="0"/>
+                  <a:t>.</a:t>
+                </a:r>
+              </a:p>
+              <a:p>
+                <a:r>
+                  <a:rPr lang="de-DE" dirty="0"/>
+                  <a:t>Goal: Find </a:t>
+                </a:r>
+                <a14:m>
+                  <m:oMath xmlns:m="http://schemas.openxmlformats.org/officeDocument/2006/math">
+                    <m:r>
+                      <a:rPr lang="de-DE" b="0" i="1" smtClean="0">
+                        <a:latin typeface="Cambria Math" panose="02040503050406030204" pitchFamily="18" charset="0"/>
+                      </a:rPr>
+                      <m:t>𝑎</m:t>
+                    </m:r>
+                    <m:r>
+                      <a:rPr lang="de-DE" b="0" i="1" smtClean="0">
+                        <a:latin typeface="Cambria Math" panose="02040503050406030204" pitchFamily="18" charset="0"/>
+                      </a:rPr>
+                      <m:t>,</m:t>
+                    </m:r>
+                    <m:r>
+                      <a:rPr lang="de-DE" b="0" i="1" smtClean="0">
+                        <a:latin typeface="Cambria Math" panose="02040503050406030204" pitchFamily="18" charset="0"/>
+                      </a:rPr>
+                      <m:t>𝑏</m:t>
+                    </m:r>
+                  </m:oMath>
+                </a14:m>
+                <a:r>
+                  <a:rPr lang="de-DE" dirty="0"/>
+                  <a:t> so </a:t>
+                </a:r>
+                <a:r>
+                  <a:rPr lang="de-DE" dirty="0" err="1"/>
+                  <a:t>that</a:t>
+                </a:r>
+                <a:r>
+                  <a:rPr lang="de-DE" dirty="0"/>
+                  <a:t> </a:t>
+                </a:r>
+                <a:r>
+                  <a:rPr lang="de-DE" dirty="0" err="1"/>
+                  <a:t>the</a:t>
+                </a:r>
+                <a:r>
+                  <a:rPr lang="de-DE" dirty="0"/>
+                  <a:t> Log Loss </a:t>
+                </a:r>
+                <a:r>
+                  <a:rPr lang="de-DE" dirty="0" err="1"/>
+                  <a:t>is</a:t>
+                </a:r>
+                <a:r>
+                  <a:rPr lang="de-DE" dirty="0"/>
+                  <a:t> minimal.</a:t>
+                </a:r>
+              </a:p>
+              <a:p>
+                <a:r>
+                  <a:rPr lang="de-DE" dirty="0"/>
+                  <a:t>This </a:t>
+                </a:r>
+                <a:r>
+                  <a:rPr lang="de-DE" dirty="0" err="1"/>
+                  <a:t>cannot</a:t>
+                </a:r>
+                <a:r>
+                  <a:rPr lang="de-DE" dirty="0"/>
+                  <a:t> </a:t>
+                </a:r>
+                <a:r>
+                  <a:rPr lang="de-DE" dirty="0" err="1"/>
+                  <a:t>be</a:t>
+                </a:r>
+                <a:r>
+                  <a:rPr lang="de-DE" dirty="0"/>
+                  <a:t> </a:t>
+                </a:r>
+                <a:r>
+                  <a:rPr lang="de-DE" dirty="0" err="1"/>
+                  <a:t>calculated</a:t>
+                </a:r>
+                <a:r>
+                  <a:rPr lang="de-DE" dirty="0"/>
+                  <a:t> </a:t>
+                </a:r>
+                <a:r>
+                  <a:rPr lang="de-DE" dirty="0" err="1"/>
+                  <a:t>directly</a:t>
+                </a:r>
+                <a:r>
+                  <a:rPr lang="de-DE" dirty="0"/>
+                  <a:t> but </a:t>
+                </a:r>
+                <a:r>
+                  <a:rPr lang="de-DE" dirty="0" err="1"/>
+                  <a:t>is</a:t>
+                </a:r>
+                <a:r>
+                  <a:rPr lang="de-DE" dirty="0"/>
+                  <a:t> </a:t>
+                </a:r>
+                <a:r>
+                  <a:rPr lang="de-DE" dirty="0" err="1"/>
+                  <a:t>approximated</a:t>
+                </a:r>
+                <a:r>
+                  <a:rPr lang="de-DE" dirty="0"/>
+                  <a:t> </a:t>
+                </a:r>
+                <a:r>
+                  <a:rPr lang="de-DE" dirty="0" err="1"/>
+                  <a:t>using</a:t>
+                </a:r>
+                <a:r>
+                  <a:rPr lang="de-DE" dirty="0"/>
+                  <a:t> </a:t>
+                </a:r>
+                <a:r>
+                  <a:rPr lang="de-DE" dirty="0" err="1"/>
+                  <a:t>gradient</a:t>
+                </a:r>
+                <a:r>
+                  <a:rPr lang="de-DE" dirty="0"/>
+                  <a:t> </a:t>
+                </a:r>
+                <a:r>
+                  <a:rPr lang="de-DE" dirty="0" err="1"/>
+                  <a:t>descent</a:t>
+                </a:r>
+                <a:r>
+                  <a:rPr lang="de-DE" dirty="0"/>
+                  <a:t>.</a:t>
+                </a:r>
+              </a:p>
+            </p:txBody>
+          </p:sp>
+        </mc:Choice>
+        <mc:Fallback>
+          <p:sp>
+            <p:nvSpPr>
+              <p:cNvPr id="3" name="Inhaltsplatzhalter 2">
+                <a:extLst>
+                  <a:ext uri="{FF2B5EF4-FFF2-40B4-BE49-F238E27FC236}">
+                    <a16:creationId xmlns:a16="http://schemas.microsoft.com/office/drawing/2014/main" id="{6991F8D8-0EF1-7693-1AB2-B91584EC1298}"/>
+                  </a:ext>
+                </a:extLst>
+              </p:cNvPr>
+              <p:cNvSpPr>
+                <a:spLocks noGrp="1" noRot="1" noChangeAspect="1" noMove="1" noResize="1" noEditPoints="1" noAdjustHandles="1" noChangeArrowheads="1" noChangeShapeType="1" noTextEdit="1"/>
+              </p:cNvSpPr>
+              <p:nvPr>
+                <p:ph idx="1"/>
+              </p:nvPr>
+            </p:nvSpPr>
+            <p:spPr>
+              <a:xfrm>
+                <a:off x="838200" y="1825625"/>
+                <a:ext cx="10515600" cy="1989857"/>
+              </a:xfrm>
+              <a:blipFill>
+                <a:blip r:embed="rId2"/>
+                <a:stretch>
+                  <a:fillRect l="-696" b="-5810"/>
+                </a:stretch>
+              </a:blipFill>
+            </p:spPr>
+            <p:txBody>
+              <a:bodyPr/>
+              <a:lstStyle/>
+              <a:p>
+                <a:r>
+                  <a:rPr lang="de-DE">
+                    <a:noFill/>
+                  </a:rPr>
+                  <a:t> </a:t>
+                </a:r>
+              </a:p>
+            </p:txBody>
+          </p:sp>
+        </mc:Fallback>
+      </mc:AlternateContent>
+      <p:pic>
+        <p:nvPicPr>
+          <p:cNvPr id="4" name="Picture 2">
+            <a:extLst>
+              <a:ext uri="{FF2B5EF4-FFF2-40B4-BE49-F238E27FC236}">
+                <a16:creationId xmlns:a16="http://schemas.microsoft.com/office/drawing/2014/main" id="{A438729C-5600-AAD9-A13C-D1ADEF411806}"/>
+              </a:ext>
+            </a:extLst>
+          </p:cNvPr>
+          <p:cNvPicPr>
+            <a:picLocks noChangeAspect="1" noChangeArrowheads="1"/>
+          </p:cNvPicPr>
+          <p:nvPr/>
+        </p:nvPicPr>
+        <p:blipFill>
+          <a:blip r:embed="rId3">
+            <a:extLst>
+              <a:ext uri="{28A0092B-C50C-407E-A947-70E740481C1C}">
+                <a14:useLocalDpi xmlns:a14="http://schemas.microsoft.com/office/drawing/2010/main" val="0"/>
+              </a:ext>
+            </a:extLst>
+          </a:blip>
+          <a:srcRect/>
+          <a:stretch>
+            <a:fillRect/>
+          </a:stretch>
+        </p:blipFill>
+        <p:spPr bwMode="auto">
+          <a:xfrm>
+            <a:off x="0" y="3870325"/>
+            <a:ext cx="12192000" cy="2987675"/>
+          </a:xfrm>
+          <a:prstGeom prst="rect">
+            <a:avLst/>
+          </a:prstGeom>
+          <a:noFill/>
+          <a:extLst>
+            <a:ext uri="{909E8E84-426E-40DD-AFC4-6F175D3DCCD1}">
+              <a14:hiddenFill xmlns:a14="http://schemas.microsoft.com/office/drawing/2010/main">
+                <a:solidFill>
+                  <a:srgbClr val="FFFFFF"/>
+                </a:solidFill>
+              </a14:hiddenFill>
+            </a:ext>
+          </a:extLst>
+        </p:spPr>
+      </p:pic>
+    </p:spTree>
+    <p:extLst>
+      <p:ext uri="{BB962C8B-B14F-4D97-AF65-F5344CB8AC3E}">
+        <p14:creationId xmlns:p14="http://schemas.microsoft.com/office/powerpoint/2010/main" val="3069520951"/>
+      </p:ext>
+    </p:extLst>
+  </p:cSld>
+  <p:clrMapOvr>
+    <a:masterClrMapping/>
+  </p:clrMapOvr>
+</p:sld>
+</file>
+
+<file path=ppt/slides/slide11.xml><?xml version="1.0" encoding="utf-8"?>
+<p:sld xmlns:a="http://schemas.openxmlformats.org/drawingml/2006/main" xmlns:r="http://schemas.openxmlformats.org/officeDocument/2006/relationships" xmlns:p="http://schemas.openxmlformats.org/presentationml/2006/main">
+  <p:cSld>
+    <p:spTree>
+      <p:nvGrpSpPr>
+        <p:cNvPr id="1" name=""/>
+        <p:cNvGrpSpPr/>
+        <p:nvPr/>
+      </p:nvGrpSpPr>
+      <p:grpSpPr>
+        <a:xfrm>
+          <a:off x="0" y="0"/>
+          <a:ext cx="0" cy="0"/>
+          <a:chOff x="0" y="0"/>
+          <a:chExt cx="0" cy="0"/>
+        </a:xfrm>
+      </p:grpSpPr>
+      <p:sp>
+        <p:nvSpPr>
+          <p:cNvPr id="2" name="Titel 1">
+            <a:extLst>
+              <a:ext uri="{FF2B5EF4-FFF2-40B4-BE49-F238E27FC236}">
+                <a16:creationId xmlns:a16="http://schemas.microsoft.com/office/drawing/2014/main" id="{22B2E460-72DC-B2DA-9A49-0D3C610FD5A7}"/>
+              </a:ext>
+            </a:extLst>
+          </p:cNvPr>
+          <p:cNvSpPr>
+            <a:spLocks noGrp="1"/>
+          </p:cNvSpPr>
+          <p:nvPr>
+            <p:ph type="title"/>
+          </p:nvPr>
+        </p:nvSpPr>
+        <p:spPr/>
+        <p:txBody>
+          <a:bodyPr/>
+          <a:lstStyle/>
+          <a:p>
+            <a:r>
+              <a:rPr lang="de-DE" dirty="0" err="1"/>
+              <a:t>Example</a:t>
+            </a:r>
+            <a:endParaRPr lang="de-DE" dirty="0"/>
+          </a:p>
+        </p:txBody>
+      </p:sp>
+      <p:pic>
+        <p:nvPicPr>
+          <p:cNvPr id="4" name="Grafik 3">
+            <a:extLst>
+              <a:ext uri="{FF2B5EF4-FFF2-40B4-BE49-F238E27FC236}">
+                <a16:creationId xmlns:a16="http://schemas.microsoft.com/office/drawing/2014/main" id="{61091D9F-D366-0E43-039E-0F90ACEBC268}"/>
+              </a:ext>
+            </a:extLst>
+          </p:cNvPr>
+          <p:cNvPicPr>
+            <a:picLocks noChangeAspect="1"/>
+          </p:cNvPicPr>
+          <p:nvPr/>
+        </p:nvPicPr>
+        <p:blipFill>
+          <a:blip r:embed="rId2"/>
+          <a:stretch>
+            <a:fillRect/>
+          </a:stretch>
+        </p:blipFill>
+        <p:spPr>
+          <a:xfrm>
+            <a:off x="5873782" y="0"/>
+            <a:ext cx="6318218" cy="6858000"/>
+          </a:xfrm>
+          <a:prstGeom prst="rect">
+            <a:avLst/>
+          </a:prstGeom>
+        </p:spPr>
+      </p:pic>
+      <p:pic>
+        <p:nvPicPr>
+          <p:cNvPr id="5" name="Grafik 4">
+            <a:extLst>
+              <a:ext uri="{FF2B5EF4-FFF2-40B4-BE49-F238E27FC236}">
+                <a16:creationId xmlns:a16="http://schemas.microsoft.com/office/drawing/2014/main" id="{C27BDDEF-DACD-6479-C08C-A167509E5A0F}"/>
+              </a:ext>
+            </a:extLst>
+          </p:cNvPr>
+          <p:cNvPicPr>
+            <a:picLocks noChangeAspect="1"/>
+          </p:cNvPicPr>
+          <p:nvPr/>
+        </p:nvPicPr>
+        <p:blipFill>
+          <a:blip r:embed="rId3"/>
+          <a:stretch>
+            <a:fillRect/>
+          </a:stretch>
+        </p:blipFill>
+        <p:spPr>
+          <a:xfrm>
+            <a:off x="1445249" y="1825625"/>
+            <a:ext cx="4254365" cy="4854981"/>
+          </a:xfrm>
+          <a:prstGeom prst="rect">
+            <a:avLst/>
+          </a:prstGeom>
+        </p:spPr>
+      </p:pic>
+      <p:sp>
+        <p:nvSpPr>
+          <p:cNvPr id="8" name="Pfeil: nach rechts 7">
+            <a:extLst>
+              <a:ext uri="{FF2B5EF4-FFF2-40B4-BE49-F238E27FC236}">
+                <a16:creationId xmlns:a16="http://schemas.microsoft.com/office/drawing/2014/main" id="{67BCAD93-534E-2AE0-751B-AC3FC3D07E54}"/>
+              </a:ext>
+            </a:extLst>
+          </p:cNvPr>
+          <p:cNvSpPr/>
+          <p:nvPr/>
+        </p:nvSpPr>
+        <p:spPr>
+          <a:xfrm>
+            <a:off x="0" y="1825626"/>
+            <a:ext cx="1504545" cy="1325564"/>
+          </a:xfrm>
+          <a:prstGeom prst="rightArrow">
+            <a:avLst>
+              <a:gd name="adj1" fmla="val 73483"/>
+              <a:gd name="adj2" fmla="val 48532"/>
+            </a:avLst>
+          </a:prstGeom>
+        </p:spPr>
+        <p:style>
+          <a:lnRef idx="2">
+            <a:schemeClr val="accent1">
+              <a:shade val="15000"/>
+            </a:schemeClr>
+          </a:lnRef>
+          <a:fillRef idx="1">
+            <a:schemeClr val="accent1"/>
+          </a:fillRef>
+          <a:effectRef idx="0">
+            <a:schemeClr val="accent1"/>
+          </a:effectRef>
+          <a:fontRef idx="minor">
+            <a:schemeClr val="lt1"/>
+          </a:fontRef>
+        </p:style>
+        <p:txBody>
+          <a:bodyPr rtlCol="0" anchor="ctr"/>
+          <a:lstStyle/>
+          <a:p>
+            <a:pPr algn="ctr"/>
+            <a:r>
+              <a:rPr lang="de-DE" sz="1200" dirty="0"/>
+              <a:t>3 </a:t>
+            </a:r>
+            <a:r>
+              <a:rPr lang="de-DE" sz="1200" dirty="0" err="1"/>
+              <a:t>groups</a:t>
+            </a:r>
+            <a:r>
+              <a:rPr lang="de-DE" sz="1200" dirty="0"/>
+              <a:t> = 3 different </a:t>
+            </a:r>
+            <a:r>
+              <a:rPr lang="de-DE" sz="1200" dirty="0" err="1"/>
+              <a:t>logistic</a:t>
+            </a:r>
+            <a:r>
+              <a:rPr lang="de-DE" sz="1200" dirty="0"/>
+              <a:t> </a:t>
+            </a:r>
+            <a:r>
+              <a:rPr lang="de-DE" sz="1200" dirty="0" err="1"/>
+              <a:t>functions</a:t>
+            </a:r>
+            <a:endParaRPr lang="de-DE" sz="1200" dirty="0"/>
+          </a:p>
+        </p:txBody>
+      </p:sp>
+    </p:spTree>
+    <p:extLst>
+      <p:ext uri="{BB962C8B-B14F-4D97-AF65-F5344CB8AC3E}">
+        <p14:creationId xmlns:p14="http://schemas.microsoft.com/office/powerpoint/2010/main" val="1397998639"/>
+      </p:ext>
+    </p:extLst>
+  </p:cSld>
+  <p:clrMapOvr>
+    <a:masterClrMapping/>
+  </p:clrMapOvr>
+</p:sld>
+</file>
+
+<file path=ppt/slides/slide12.xml><?xml version="1.0" encoding="utf-8"?>
 <p:sld xmlns:a="http://schemas.openxmlformats.org/drawingml/2006/main" xmlns:r="http://schemas.openxmlformats.org/officeDocument/2006/relationships" xmlns:p="http://schemas.openxmlformats.org/presentationml/2006/main">
   <p:cSld>
     <p:spTree>
@@ -6905,6 +7688,857 @@
           </a:prstGeom>
         </p:spPr>
       </p:pic>
+      <p:graphicFrame>
+        <p:nvGraphicFramePr>
+          <p:cNvPr id="6" name="Tabelle 5">
+            <a:extLst>
+              <a:ext uri="{FF2B5EF4-FFF2-40B4-BE49-F238E27FC236}">
+                <a16:creationId xmlns:a16="http://schemas.microsoft.com/office/drawing/2014/main" id="{5ABF68E3-2FF1-72C8-4199-A0F74C9C4A79}"/>
+              </a:ext>
+            </a:extLst>
+          </p:cNvPr>
+          <p:cNvGraphicFramePr>
+            <a:graphicFrameLocks noGrp="1"/>
+          </p:cNvGraphicFramePr>
+          <p:nvPr>
+            <p:extLst>
+              <p:ext uri="{D42A27DB-BD31-4B8C-83A1-F6EECF244321}">
+                <p14:modId xmlns:p14="http://schemas.microsoft.com/office/powerpoint/2010/main" val="3209140978"/>
+              </p:ext>
+            </p:extLst>
+          </p:nvPr>
+        </p:nvGraphicFramePr>
+        <p:xfrm>
+          <a:off x="688501" y="3294667"/>
+          <a:ext cx="2618904" cy="3657600"/>
+        </p:xfrm>
+        <a:graphic>
+          <a:graphicData uri="http://schemas.openxmlformats.org/drawingml/2006/table">
+            <a:tbl>
+              <a:tblPr firstRow="1" bandRow="1">
+                <a:tableStyleId>{5C22544A-7EE6-4342-B048-85BDC9FD1C3A}</a:tableStyleId>
+              </a:tblPr>
+              <a:tblGrid>
+                <a:gridCol w="1309452">
+                  <a:extLst>
+                    <a:ext uri="{9D8B030D-6E8A-4147-A177-3AD203B41FA5}">
+                      <a16:colId xmlns:a16="http://schemas.microsoft.com/office/drawing/2014/main" val="1607536429"/>
+                    </a:ext>
+                  </a:extLst>
+                </a:gridCol>
+                <a:gridCol w="1309452">
+                  <a:extLst>
+                    <a:ext uri="{9D8B030D-6E8A-4147-A177-3AD203B41FA5}">
+                      <a16:colId xmlns:a16="http://schemas.microsoft.com/office/drawing/2014/main" val="2108874404"/>
+                    </a:ext>
+                  </a:extLst>
+                </a:gridCol>
+              </a:tblGrid>
+              <a:tr h="254872">
+                <a:tc>
+                  <a:txBody>
+                    <a:bodyPr/>
+                    <a:lstStyle/>
+                    <a:p>
+                      <a:r>
+                        <a:rPr lang="de-DE" dirty="0"/>
+                        <a:t>Feature x</a:t>
+                      </a:r>
+                    </a:p>
+                  </a:txBody>
+                  <a:tcPr/>
+                </a:tc>
+                <a:tc>
+                  <a:txBody>
+                    <a:bodyPr/>
+                    <a:lstStyle/>
+                    <a:p>
+                      <a:r>
+                        <a:rPr lang="de-DE" dirty="0"/>
+                        <a:t>Target </a:t>
+                      </a:r>
+                    </a:p>
+                  </a:txBody>
+                  <a:tcPr/>
+                </a:tc>
+                <a:extLst>
+                  <a:ext uri="{0D108BD9-81ED-4DB2-BD59-A6C34878D82A}">
+                    <a16:rowId xmlns:a16="http://schemas.microsoft.com/office/drawing/2014/main" val="4218645940"/>
+                  </a:ext>
+                </a:extLst>
+              </a:tr>
+              <a:tr h="254890">
+                <a:tc>
+                  <a:txBody>
+                    <a:bodyPr/>
+                    <a:lstStyle/>
+                    <a:p>
+                      <a:r>
+                        <a:rPr lang="de-DE" dirty="0"/>
+                        <a:t>1</a:t>
+                      </a:r>
+                    </a:p>
+                  </a:txBody>
+                  <a:tcPr/>
+                </a:tc>
+                <a:tc>
+                  <a:txBody>
+                    <a:bodyPr/>
+                    <a:lstStyle/>
+                    <a:p>
+                      <a:r>
+                        <a:rPr lang="de-DE" dirty="0">
+                          <a:solidFill>
+                            <a:schemeClr val="accent1"/>
+                          </a:solidFill>
+                        </a:rPr>
+                        <a:t>B</a:t>
+                      </a:r>
+                    </a:p>
+                  </a:txBody>
+                  <a:tcPr/>
+                </a:tc>
+                <a:extLst>
+                  <a:ext uri="{0D108BD9-81ED-4DB2-BD59-A6C34878D82A}">
+                    <a16:rowId xmlns:a16="http://schemas.microsoft.com/office/drawing/2014/main" val="2087138634"/>
+                  </a:ext>
+                </a:extLst>
+              </a:tr>
+              <a:tr h="254890">
+                <a:tc>
+                  <a:txBody>
+                    <a:bodyPr/>
+                    <a:lstStyle/>
+                    <a:p>
+                      <a:r>
+                        <a:rPr lang="de-DE" dirty="0"/>
+                        <a:t>2</a:t>
+                      </a:r>
+                    </a:p>
+                  </a:txBody>
+                  <a:tcPr/>
+                </a:tc>
+                <a:tc>
+                  <a:txBody>
+                    <a:bodyPr/>
+                    <a:lstStyle/>
+                    <a:p>
+                      <a:r>
+                        <a:rPr lang="de-DE" dirty="0">
+                          <a:solidFill>
+                            <a:schemeClr val="accent1"/>
+                          </a:solidFill>
+                        </a:rPr>
+                        <a:t>B</a:t>
+                      </a:r>
+                    </a:p>
+                  </a:txBody>
+                  <a:tcPr/>
+                </a:tc>
+                <a:extLst>
+                  <a:ext uri="{0D108BD9-81ED-4DB2-BD59-A6C34878D82A}">
+                    <a16:rowId xmlns:a16="http://schemas.microsoft.com/office/drawing/2014/main" val="1187624195"/>
+                  </a:ext>
+                </a:extLst>
+              </a:tr>
+              <a:tr h="254890">
+                <a:tc>
+                  <a:txBody>
+                    <a:bodyPr/>
+                    <a:lstStyle/>
+                    <a:p>
+                      <a:r>
+                        <a:rPr lang="de-DE" dirty="0"/>
+                        <a:t>4</a:t>
+                      </a:r>
+                    </a:p>
+                  </a:txBody>
+                  <a:tcPr/>
+                </a:tc>
+                <a:tc>
+                  <a:txBody>
+                    <a:bodyPr/>
+                    <a:lstStyle/>
+                    <a:p>
+                      <a:r>
+                        <a:rPr lang="de-DE" dirty="0">
+                          <a:solidFill>
+                            <a:schemeClr val="accent1"/>
+                          </a:solidFill>
+                        </a:rPr>
+                        <a:t>B</a:t>
+                      </a:r>
+                    </a:p>
+                  </a:txBody>
+                  <a:tcPr/>
+                </a:tc>
+                <a:extLst>
+                  <a:ext uri="{0D108BD9-81ED-4DB2-BD59-A6C34878D82A}">
+                    <a16:rowId xmlns:a16="http://schemas.microsoft.com/office/drawing/2014/main" val="1602013524"/>
+                  </a:ext>
+                </a:extLst>
+              </a:tr>
+              <a:tr h="254890">
+                <a:tc>
+                  <a:txBody>
+                    <a:bodyPr/>
+                    <a:lstStyle/>
+                    <a:p>
+                      <a:r>
+                        <a:rPr lang="de-DE" dirty="0"/>
+                        <a:t>7</a:t>
+                      </a:r>
+                    </a:p>
+                  </a:txBody>
+                  <a:tcPr/>
+                </a:tc>
+                <a:tc>
+                  <a:txBody>
+                    <a:bodyPr/>
+                    <a:lstStyle/>
+                    <a:p>
+                      <a:r>
+                        <a:rPr lang="de-DE" dirty="0">
+                          <a:solidFill>
+                            <a:schemeClr val="accent1"/>
+                          </a:solidFill>
+                        </a:rPr>
+                        <a:t>B</a:t>
+                      </a:r>
+                    </a:p>
+                  </a:txBody>
+                  <a:tcPr/>
+                </a:tc>
+                <a:extLst>
+                  <a:ext uri="{0D108BD9-81ED-4DB2-BD59-A6C34878D82A}">
+                    <a16:rowId xmlns:a16="http://schemas.microsoft.com/office/drawing/2014/main" val="3654159464"/>
+                  </a:ext>
+                </a:extLst>
+              </a:tr>
+              <a:tr h="254890">
+                <a:tc>
+                  <a:txBody>
+                    <a:bodyPr/>
+                    <a:lstStyle/>
+                    <a:p>
+                      <a:r>
+                        <a:rPr lang="de-DE" dirty="0"/>
+                        <a:t>4.5</a:t>
+                      </a:r>
+                    </a:p>
+                  </a:txBody>
+                  <a:tcPr/>
+                </a:tc>
+                <a:tc>
+                  <a:txBody>
+                    <a:bodyPr/>
+                    <a:lstStyle/>
+                    <a:p>
+                      <a:r>
+                        <a:rPr lang="de-DE" dirty="0">
+                          <a:solidFill>
+                            <a:srgbClr val="FF0000"/>
+                          </a:solidFill>
+                        </a:rPr>
+                        <a:t>R</a:t>
+                      </a:r>
+                    </a:p>
+                  </a:txBody>
+                  <a:tcPr/>
+                </a:tc>
+                <a:extLst>
+                  <a:ext uri="{0D108BD9-81ED-4DB2-BD59-A6C34878D82A}">
+                    <a16:rowId xmlns:a16="http://schemas.microsoft.com/office/drawing/2014/main" val="3544492405"/>
+                  </a:ext>
+                </a:extLst>
+              </a:tr>
+              <a:tr h="254890">
+                <a:tc>
+                  <a:txBody>
+                    <a:bodyPr/>
+                    <a:lstStyle/>
+                    <a:p>
+                      <a:r>
+                        <a:rPr lang="de-DE" dirty="0"/>
+                        <a:t>6</a:t>
+                      </a:r>
+                    </a:p>
+                  </a:txBody>
+                  <a:tcPr/>
+                </a:tc>
+                <a:tc>
+                  <a:txBody>
+                    <a:bodyPr/>
+                    <a:lstStyle/>
+                    <a:p>
+                      <a:r>
+                        <a:rPr lang="de-DE" dirty="0">
+                          <a:solidFill>
+                            <a:srgbClr val="FF0000"/>
+                          </a:solidFill>
+                        </a:rPr>
+                        <a:t>R</a:t>
+                      </a:r>
+                    </a:p>
+                  </a:txBody>
+                  <a:tcPr/>
+                </a:tc>
+                <a:extLst>
+                  <a:ext uri="{0D108BD9-81ED-4DB2-BD59-A6C34878D82A}">
+                    <a16:rowId xmlns:a16="http://schemas.microsoft.com/office/drawing/2014/main" val="3550037821"/>
+                  </a:ext>
+                </a:extLst>
+              </a:tr>
+              <a:tr h="254890">
+                <a:tc>
+                  <a:txBody>
+                    <a:bodyPr/>
+                    <a:lstStyle/>
+                    <a:p>
+                      <a:r>
+                        <a:rPr lang="de-DE" dirty="0"/>
+                        <a:t>7.5</a:t>
+                      </a:r>
+                    </a:p>
+                  </a:txBody>
+                  <a:tcPr/>
+                </a:tc>
+                <a:tc>
+                  <a:txBody>
+                    <a:bodyPr/>
+                    <a:lstStyle/>
+                    <a:p>
+                      <a:r>
+                        <a:rPr lang="de-DE" dirty="0">
+                          <a:solidFill>
+                            <a:srgbClr val="FF0000"/>
+                          </a:solidFill>
+                        </a:rPr>
+                        <a:t>R</a:t>
+                      </a:r>
+                    </a:p>
+                  </a:txBody>
+                  <a:tcPr/>
+                </a:tc>
+                <a:extLst>
+                  <a:ext uri="{0D108BD9-81ED-4DB2-BD59-A6C34878D82A}">
+                    <a16:rowId xmlns:a16="http://schemas.microsoft.com/office/drawing/2014/main" val="3655238010"/>
+                  </a:ext>
+                </a:extLst>
+              </a:tr>
+              <a:tr h="254890">
+                <a:tc>
+                  <a:txBody>
+                    <a:bodyPr/>
+                    <a:lstStyle/>
+                    <a:p>
+                      <a:r>
+                        <a:rPr lang="de-DE" dirty="0"/>
+                        <a:t>9</a:t>
+                      </a:r>
+                    </a:p>
+                  </a:txBody>
+                  <a:tcPr/>
+                </a:tc>
+                <a:tc>
+                  <a:txBody>
+                    <a:bodyPr/>
+                    <a:lstStyle/>
+                    <a:p>
+                      <a:r>
+                        <a:rPr lang="de-DE" dirty="0">
+                          <a:solidFill>
+                            <a:srgbClr val="FF0000"/>
+                          </a:solidFill>
+                        </a:rPr>
+                        <a:t>R</a:t>
+                      </a:r>
+                    </a:p>
+                  </a:txBody>
+                  <a:tcPr/>
+                </a:tc>
+                <a:extLst>
+                  <a:ext uri="{0D108BD9-81ED-4DB2-BD59-A6C34878D82A}">
+                    <a16:rowId xmlns:a16="http://schemas.microsoft.com/office/drawing/2014/main" val="3479534932"/>
+                  </a:ext>
+                </a:extLst>
+              </a:tr>
+              <a:tr h="254890">
+                <a:tc>
+                  <a:txBody>
+                    <a:bodyPr/>
+                    <a:lstStyle/>
+                    <a:p>
+                      <a:r>
+                        <a:rPr lang="de-DE" dirty="0"/>
+                        <a:t>10</a:t>
+                      </a:r>
+                    </a:p>
+                  </a:txBody>
+                  <a:tcPr/>
+                </a:tc>
+                <a:tc>
+                  <a:txBody>
+                    <a:bodyPr/>
+                    <a:lstStyle/>
+                    <a:p>
+                      <a:r>
+                        <a:rPr lang="de-DE" dirty="0">
+                          <a:solidFill>
+                            <a:srgbClr val="FF0000"/>
+                          </a:solidFill>
+                        </a:rPr>
+                        <a:t>R</a:t>
+                      </a:r>
+                    </a:p>
+                  </a:txBody>
+                  <a:tcPr/>
+                </a:tc>
+                <a:extLst>
+                  <a:ext uri="{0D108BD9-81ED-4DB2-BD59-A6C34878D82A}">
+                    <a16:rowId xmlns:a16="http://schemas.microsoft.com/office/drawing/2014/main" val="1769186512"/>
+                  </a:ext>
+                </a:extLst>
+              </a:tr>
+            </a:tbl>
+          </a:graphicData>
+        </a:graphic>
+      </p:graphicFrame>
+      <p:cxnSp>
+        <p:nvCxnSpPr>
+          <p:cNvPr id="8" name="Gerade Verbindung mit Pfeil 7">
+            <a:extLst>
+              <a:ext uri="{FF2B5EF4-FFF2-40B4-BE49-F238E27FC236}">
+                <a16:creationId xmlns:a16="http://schemas.microsoft.com/office/drawing/2014/main" id="{E1710FC4-056B-5A04-AA0D-D8053DA385E0}"/>
+              </a:ext>
+            </a:extLst>
+          </p:cNvPr>
+          <p:cNvCxnSpPr>
+            <a:cxnSpLocks/>
+          </p:cNvCxnSpPr>
+          <p:nvPr/>
+        </p:nvCxnSpPr>
+        <p:spPr>
+          <a:xfrm>
+            <a:off x="3450077" y="3642227"/>
+            <a:ext cx="1588851" cy="0"/>
+          </a:xfrm>
+          <a:prstGeom prst="straightConnector1">
+            <a:avLst/>
+          </a:prstGeom>
+          <a:ln>
+            <a:tailEnd type="triangle"/>
+          </a:ln>
+        </p:spPr>
+        <p:style>
+          <a:lnRef idx="3">
+            <a:schemeClr val="dk1"/>
+          </a:lnRef>
+          <a:fillRef idx="0">
+            <a:schemeClr val="dk1"/>
+          </a:fillRef>
+          <a:effectRef idx="2">
+            <a:schemeClr val="dk1"/>
+          </a:effectRef>
+          <a:fontRef idx="minor">
+            <a:schemeClr val="tx1"/>
+          </a:fontRef>
+        </p:style>
+      </p:cxnSp>
+      <p:sp>
+        <p:nvSpPr>
+          <p:cNvPr id="9" name="Textfeld 8">
+            <a:extLst>
+              <a:ext uri="{FF2B5EF4-FFF2-40B4-BE49-F238E27FC236}">
+                <a16:creationId xmlns:a16="http://schemas.microsoft.com/office/drawing/2014/main" id="{637DE6AB-5596-24D6-18BA-5C358F7612B0}"/>
+              </a:ext>
+            </a:extLst>
+          </p:cNvPr>
+          <p:cNvSpPr txBox="1"/>
+          <p:nvPr/>
+        </p:nvSpPr>
+        <p:spPr>
+          <a:xfrm>
+            <a:off x="3643813" y="3693727"/>
+            <a:ext cx="1198726" cy="646331"/>
+          </a:xfrm>
+          <a:prstGeom prst="rect">
+            <a:avLst/>
+          </a:prstGeom>
+          <a:noFill/>
+        </p:spPr>
+        <p:txBody>
+          <a:bodyPr wrap="none" rtlCol="0">
+            <a:spAutoFit/>
+          </a:bodyPr>
+          <a:lstStyle/>
+          <a:p>
+            <a:r>
+              <a:rPr lang="de-DE" dirty="0" err="1"/>
+              <a:t>Logistic</a:t>
+            </a:r>
+            <a:endParaRPr lang="de-DE" dirty="0"/>
+          </a:p>
+          <a:p>
+            <a:r>
+              <a:rPr lang="de-DE" dirty="0"/>
+              <a:t>Regression</a:t>
+            </a:r>
+          </a:p>
+        </p:txBody>
+      </p:sp>
+      <mc:AlternateContent xmlns:mc="http://schemas.openxmlformats.org/markup-compatibility/2006">
+        <mc:Choice xmlns:a14="http://schemas.microsoft.com/office/drawing/2010/main" Requires="a14">
+          <p:sp>
+            <p:nvSpPr>
+              <p:cNvPr id="10" name="Textfeld 9">
+                <a:extLst>
+                  <a:ext uri="{FF2B5EF4-FFF2-40B4-BE49-F238E27FC236}">
+                    <a16:creationId xmlns:a16="http://schemas.microsoft.com/office/drawing/2014/main" id="{6C6BC1D2-63D9-3F9C-6300-916C68A28718}"/>
+                  </a:ext>
+                </a:extLst>
+              </p:cNvPr>
+              <p:cNvSpPr txBox="1"/>
+              <p:nvPr/>
+            </p:nvSpPr>
+            <p:spPr>
+              <a:xfrm>
+                <a:off x="4662654" y="4001294"/>
+                <a:ext cx="2968034" cy="2585323"/>
+              </a:xfrm>
+              <a:prstGeom prst="rect">
+                <a:avLst/>
+              </a:prstGeom>
+              <a:noFill/>
+            </p:spPr>
+            <p:txBody>
+              <a:bodyPr wrap="square" rtlCol="0">
+                <a:spAutoFit/>
+              </a:bodyPr>
+              <a:lstStyle/>
+              <a:p>
+                <a14:m>
+                  <m:oMathPara xmlns:m="http://schemas.openxmlformats.org/officeDocument/2006/math">
+                    <m:oMathParaPr>
+                      <m:jc m:val="centerGroup"/>
+                    </m:oMathParaPr>
+                    <m:oMath xmlns:m="http://schemas.openxmlformats.org/officeDocument/2006/math">
+                      <m:r>
+                        <a:rPr lang="de-DE" i="1" dirty="0" smtClean="0">
+                          <a:latin typeface="Cambria Math" panose="02040503050406030204" pitchFamily="18" charset="0"/>
+                        </a:rPr>
+                        <m:t>𝑓</m:t>
+                      </m:r>
+                      <m:r>
+                        <a:rPr lang="de-DE" i="1" dirty="0" smtClean="0">
+                          <a:latin typeface="Cambria Math" panose="02040503050406030204" pitchFamily="18" charset="0"/>
+                        </a:rPr>
+                        <m:t>(5)=0,4</m:t>
+                      </m:r>
+                    </m:oMath>
+                  </m:oMathPara>
+                </a14:m>
+                <a:endParaRPr lang="de-DE" dirty="0"/>
+              </a:p>
+              <a:p>
+                <a:endParaRPr lang="de-DE" dirty="0"/>
+              </a:p>
+              <a:p>
+                <a:r>
+                  <a:rPr lang="de-DE" dirty="0"/>
+                  <a:t>d.h. ein Sample mit feature (5) Hat die Wahrscheinlich 40% z </a:t>
+                </a:r>
+                <a:r>
+                  <a:rPr lang="de-DE" dirty="0" err="1"/>
+                  <a:t>ur</a:t>
+                </a:r>
+                <a:r>
+                  <a:rPr lang="de-DE" dirty="0"/>
+                  <a:t> Klasse </a:t>
+                </a:r>
+                <a:r>
+                  <a:rPr lang="de-DE" dirty="0">
+                    <a:solidFill>
+                      <a:srgbClr val="FF0000"/>
+                    </a:solidFill>
+                  </a:rPr>
+                  <a:t>R</a:t>
+                </a:r>
+                <a:r>
+                  <a:rPr lang="de-DE" dirty="0"/>
+                  <a:t>. Also ordnen wir das Sample zu Klasse </a:t>
+                </a:r>
+                <a:r>
+                  <a:rPr lang="de-DE" dirty="0">
+                    <a:solidFill>
+                      <a:schemeClr val="accent1"/>
+                    </a:solidFill>
+                  </a:rPr>
+                  <a:t>B</a:t>
+                </a:r>
+                <a:r>
+                  <a:rPr lang="de-DE" dirty="0"/>
+                  <a:t> zu, weil die Wahrscheinlichkeit unter 50% liegt</a:t>
+                </a:r>
+              </a:p>
+            </p:txBody>
+          </p:sp>
+        </mc:Choice>
+        <mc:Fallback>
+          <p:sp>
+            <p:nvSpPr>
+              <p:cNvPr id="10" name="Textfeld 9">
+                <a:extLst>
+                  <a:ext uri="{FF2B5EF4-FFF2-40B4-BE49-F238E27FC236}">
+                    <a16:creationId xmlns:a16="http://schemas.microsoft.com/office/drawing/2014/main" id="{6C6BC1D2-63D9-3F9C-6300-916C68A28718}"/>
+                  </a:ext>
+                </a:extLst>
+              </p:cNvPr>
+              <p:cNvSpPr txBox="1">
+                <a:spLocks noRot="1" noChangeAspect="1" noMove="1" noResize="1" noEditPoints="1" noAdjustHandles="1" noChangeArrowheads="1" noChangeShapeType="1" noTextEdit="1"/>
+              </p:cNvSpPr>
+              <p:nvPr/>
+            </p:nvSpPr>
+            <p:spPr>
+              <a:xfrm>
+                <a:off x="4662654" y="4001294"/>
+                <a:ext cx="2968034" cy="2585323"/>
+              </a:xfrm>
+              <a:prstGeom prst="rect">
+                <a:avLst/>
+              </a:prstGeom>
+              <a:blipFill>
+                <a:blip r:embed="rId4"/>
+                <a:stretch>
+                  <a:fillRect l="-1848" r="-2669" b="-2830"/>
+                </a:stretch>
+              </a:blipFill>
+            </p:spPr>
+            <p:txBody>
+              <a:bodyPr/>
+              <a:lstStyle/>
+              <a:p>
+                <a:r>
+                  <a:rPr lang="de-DE">
+                    <a:noFill/>
+                  </a:rPr>
+                  <a:t> </a:t>
+                </a:r>
+              </a:p>
+            </p:txBody>
+          </p:sp>
+        </mc:Fallback>
+      </mc:AlternateContent>
+      <mc:AlternateContent xmlns:mc="http://schemas.openxmlformats.org/markup-compatibility/2006">
+        <mc:Choice xmlns:a14="http://schemas.microsoft.com/office/drawing/2010/main" Requires="a14">
+          <p:sp>
+            <p:nvSpPr>
+              <p:cNvPr id="13" name="Textfeld 12">
+                <a:extLst>
+                  <a:ext uri="{FF2B5EF4-FFF2-40B4-BE49-F238E27FC236}">
+                    <a16:creationId xmlns:a16="http://schemas.microsoft.com/office/drawing/2014/main" id="{29A07F0A-9F9F-6181-64DC-3CACFF73319A}"/>
+                  </a:ext>
+                </a:extLst>
+              </p:cNvPr>
+              <p:cNvSpPr txBox="1"/>
+              <p:nvPr/>
+            </p:nvSpPr>
+            <p:spPr>
+              <a:xfrm>
+                <a:off x="5207747" y="3280625"/>
+                <a:ext cx="2336152" cy="622030"/>
+              </a:xfrm>
+              <a:prstGeom prst="rect">
+                <a:avLst/>
+              </a:prstGeom>
+              <a:noFill/>
+            </p:spPr>
+            <p:txBody>
+              <a:bodyPr wrap="none" rtlCol="0">
+                <a:spAutoFit/>
+              </a:bodyPr>
+              <a:lstStyle/>
+              <a:p>
+                <a14:m>
+                  <m:oMathPara xmlns:m="http://schemas.openxmlformats.org/officeDocument/2006/math">
+                    <m:oMathParaPr>
+                      <m:jc m:val="centerGroup"/>
+                    </m:oMathParaPr>
+                    <m:oMath xmlns:m="http://schemas.openxmlformats.org/officeDocument/2006/math">
+                      <m:r>
+                        <a:rPr lang="de-DE" b="0" i="1" smtClean="0">
+                          <a:latin typeface="Cambria Math" panose="02040503050406030204" pitchFamily="18" charset="0"/>
+                        </a:rPr>
+                        <m:t>𝑓</m:t>
+                      </m:r>
+                      <m:d>
+                        <m:dPr>
+                          <m:ctrlPr>
+                            <a:rPr lang="de-DE" b="0" i="1" smtClean="0">
+                              <a:latin typeface="Cambria Math" panose="02040503050406030204" pitchFamily="18" charset="0"/>
+                            </a:rPr>
+                          </m:ctrlPr>
+                        </m:dPr>
+                        <m:e>
+                          <m:r>
+                            <a:rPr lang="de-DE" b="0" i="1" smtClean="0">
+                              <a:latin typeface="Cambria Math" panose="02040503050406030204" pitchFamily="18" charset="0"/>
+                            </a:rPr>
+                            <m:t>𝑥</m:t>
+                          </m:r>
+                        </m:e>
+                      </m:d>
+                      <m:r>
+                        <a:rPr lang="de-DE" b="0" i="1" smtClean="0">
+                          <a:latin typeface="Cambria Math" panose="02040503050406030204" pitchFamily="18" charset="0"/>
+                        </a:rPr>
+                        <m:t>=</m:t>
+                      </m:r>
+                      <m:f>
+                        <m:fPr>
+                          <m:ctrlPr>
+                            <a:rPr lang="de-DE" b="0" i="1" smtClean="0">
+                              <a:latin typeface="Cambria Math" panose="02040503050406030204" pitchFamily="18" charset="0"/>
+                            </a:rPr>
+                          </m:ctrlPr>
+                        </m:fPr>
+                        <m:num>
+                          <m:r>
+                            <a:rPr lang="de-DE" b="0" i="1" smtClean="0">
+                              <a:latin typeface="Cambria Math" panose="02040503050406030204" pitchFamily="18" charset="0"/>
+                            </a:rPr>
+                            <m:t>1</m:t>
+                          </m:r>
+                        </m:num>
+                        <m:den>
+                          <m:r>
+                            <a:rPr lang="de-DE" b="0" i="1" smtClean="0">
+                              <a:latin typeface="Cambria Math" panose="02040503050406030204" pitchFamily="18" charset="0"/>
+                            </a:rPr>
+                            <m:t>1+</m:t>
+                          </m:r>
+                          <m:sSup>
+                            <m:sSupPr>
+                              <m:ctrlPr>
+                                <a:rPr lang="de-DE" b="0" i="1" smtClean="0">
+                                  <a:latin typeface="Cambria Math" panose="02040503050406030204" pitchFamily="18" charset="0"/>
+                                </a:rPr>
+                              </m:ctrlPr>
+                            </m:sSupPr>
+                            <m:e>
+                              <m:r>
+                                <a:rPr lang="de-DE" b="0" i="1" smtClean="0">
+                                  <a:latin typeface="Cambria Math" panose="02040503050406030204" pitchFamily="18" charset="0"/>
+                                </a:rPr>
+                                <m:t>𝑒</m:t>
+                              </m:r>
+                            </m:e>
+                            <m:sup>
+                              <m:r>
+                                <a:rPr lang="de-DE" b="0" i="1" smtClean="0">
+                                  <a:latin typeface="Cambria Math" panose="02040503050406030204" pitchFamily="18" charset="0"/>
+                                </a:rPr>
+                                <m:t>−(</m:t>
+                              </m:r>
+                              <m:r>
+                                <a:rPr lang="de-DE" b="0" i="1" smtClean="0">
+                                  <a:solidFill>
+                                    <a:schemeClr val="accent2"/>
+                                  </a:solidFill>
+                                  <a:latin typeface="Cambria Math" panose="02040503050406030204" pitchFamily="18" charset="0"/>
+                                </a:rPr>
+                                <m:t>𝑚</m:t>
+                              </m:r>
+                              <m:r>
+                                <a:rPr lang="de-DE" b="0" i="1" smtClean="0">
+                                  <a:latin typeface="Cambria Math" panose="02040503050406030204" pitchFamily="18" charset="0"/>
+                                </a:rPr>
+                                <m:t>⋅</m:t>
+                              </m:r>
+                              <m:r>
+                                <a:rPr lang="de-DE" b="0" i="1" smtClean="0">
+                                  <a:latin typeface="Cambria Math" panose="02040503050406030204" pitchFamily="18" charset="0"/>
+                                </a:rPr>
+                                <m:t>𝑥</m:t>
+                              </m:r>
+                              <m:r>
+                                <a:rPr lang="de-DE" b="0" i="1" smtClean="0">
+                                  <a:latin typeface="Cambria Math" panose="02040503050406030204" pitchFamily="18" charset="0"/>
+                                </a:rPr>
+                                <m:t>+</m:t>
+                              </m:r>
+                              <m:r>
+                                <a:rPr lang="de-DE" b="0" i="1" smtClean="0">
+                                  <a:solidFill>
+                                    <a:schemeClr val="accent2"/>
+                                  </a:solidFill>
+                                  <a:latin typeface="Cambria Math" panose="02040503050406030204" pitchFamily="18" charset="0"/>
+                                </a:rPr>
+                                <m:t>𝑏</m:t>
+                              </m:r>
+                              <m:r>
+                                <a:rPr lang="de-DE" b="0" i="1" smtClean="0">
+                                  <a:latin typeface="Cambria Math" panose="02040503050406030204" pitchFamily="18" charset="0"/>
+                                </a:rPr>
+                                <m:t>)</m:t>
+                              </m:r>
+                            </m:sup>
+                          </m:sSup>
+                        </m:den>
+                      </m:f>
+                    </m:oMath>
+                  </m:oMathPara>
+                </a14:m>
+                <a:endParaRPr lang="de-DE" dirty="0"/>
+              </a:p>
+            </p:txBody>
+          </p:sp>
+        </mc:Choice>
+        <mc:Fallback>
+          <p:sp>
+            <p:nvSpPr>
+              <p:cNvPr id="13" name="Textfeld 12">
+                <a:extLst>
+                  <a:ext uri="{FF2B5EF4-FFF2-40B4-BE49-F238E27FC236}">
+                    <a16:creationId xmlns:a16="http://schemas.microsoft.com/office/drawing/2014/main" id="{29A07F0A-9F9F-6181-64DC-3CACFF73319A}"/>
+                  </a:ext>
+                </a:extLst>
+              </p:cNvPr>
+              <p:cNvSpPr txBox="1">
+                <a:spLocks noRot="1" noChangeAspect="1" noMove="1" noResize="1" noEditPoints="1" noAdjustHandles="1" noChangeArrowheads="1" noChangeShapeType="1" noTextEdit="1"/>
+              </p:cNvSpPr>
+              <p:nvPr/>
+            </p:nvSpPr>
+            <p:spPr>
+              <a:xfrm>
+                <a:off x="5207747" y="3280625"/>
+                <a:ext cx="2336152" cy="622030"/>
+              </a:xfrm>
+              <a:prstGeom prst="rect">
+                <a:avLst/>
+              </a:prstGeom>
+              <a:blipFill>
+                <a:blip r:embed="rId5"/>
+                <a:stretch>
+                  <a:fillRect/>
+                </a:stretch>
+              </a:blipFill>
+            </p:spPr>
+            <p:txBody>
+              <a:bodyPr/>
+              <a:lstStyle/>
+              <a:p>
+                <a:r>
+                  <a:rPr lang="de-DE">
+                    <a:noFill/>
+                  </a:rPr>
+                  <a:t> </a:t>
+                </a:r>
+              </a:p>
+            </p:txBody>
+          </p:sp>
+        </mc:Fallback>
+      </mc:AlternateContent>
     </p:spTree>
     <p:extLst>
       <p:ext uri="{BB962C8B-B14F-4D97-AF65-F5344CB8AC3E}">
@@ -6940,7 +8574,7 @@
           <p:cNvPr id="2" name="Titel 1">
             <a:extLst>
               <a:ext uri="{FF2B5EF4-FFF2-40B4-BE49-F238E27FC236}">
-                <a16:creationId xmlns:a16="http://schemas.microsoft.com/office/drawing/2014/main" id="{C4CD9EEB-BB11-992F-345E-8E75EB6179CF}"/>
+                <a16:creationId xmlns:a16="http://schemas.microsoft.com/office/drawing/2014/main" id="{AFA552D8-0AE4-3126-68FD-0B865599E417}"/>
               </a:ext>
             </a:extLst>
           </p:cNvPr>
@@ -6957,477 +8591,1598 @@
           <a:lstStyle/>
           <a:p>
             <a:r>
-              <a:rPr lang="de-DE" dirty="0" err="1"/>
-              <a:t>Logistic</a:t>
-            </a:r>
-            <a:r>
               <a:rPr lang="de-DE" dirty="0"/>
-              <a:t> (Sigmoid) </a:t>
-            </a:r>
-            <a:r>
-              <a:rPr lang="de-DE" dirty="0" err="1"/>
-              <a:t>Function</a:t>
-            </a:r>
-            <a:endParaRPr lang="de-DE" dirty="0"/>
+              <a:t>Multiple Features</a:t>
+            </a:r>
           </a:p>
         </p:txBody>
       </p:sp>
-      <mc:AlternateContent xmlns:mc="http://schemas.openxmlformats.org/markup-compatibility/2006" xmlns:a14="http://schemas.microsoft.com/office/drawing/2010/main">
-        <mc:Choice Requires="a14">
-          <p:sp>
-            <p:nvSpPr>
-              <p:cNvPr id="3" name="Inhaltsplatzhalter 2">
+      <p:sp>
+        <p:nvSpPr>
+          <p:cNvPr id="3" name="Inhaltsplatzhalter 2">
+            <a:extLst>
+              <a:ext uri="{FF2B5EF4-FFF2-40B4-BE49-F238E27FC236}">
+                <a16:creationId xmlns:a16="http://schemas.microsoft.com/office/drawing/2014/main" id="{65D77EA7-BAE7-A59B-7EE6-63586C5F1C46}"/>
+              </a:ext>
+            </a:extLst>
+          </p:cNvPr>
+          <p:cNvSpPr>
+            <a:spLocks noGrp="1"/>
+          </p:cNvSpPr>
+          <p:nvPr>
+            <p:ph idx="1"/>
+          </p:nvPr>
+        </p:nvSpPr>
+        <p:spPr/>
+        <p:txBody>
+          <a:bodyPr/>
+          <a:lstStyle/>
+          <a:p>
+            <a:r>
+              <a:rPr lang="de-DE" dirty="0"/>
+              <a:t>I </a:t>
+            </a:r>
+            <a:r>
+              <a:rPr lang="de-DE" dirty="0" err="1"/>
+              <a:t>we</a:t>
+            </a:r>
+            <a:r>
+              <a:rPr lang="de-DE" dirty="0"/>
+              <a:t> have multiple </a:t>
+            </a:r>
+            <a:r>
+              <a:rPr lang="de-DE" dirty="0" err="1"/>
+              <a:t>features</a:t>
+            </a:r>
+            <a:r>
+              <a:rPr lang="de-DE" dirty="0"/>
+              <a:t> </a:t>
+            </a:r>
+            <a:r>
+              <a:rPr lang="de-DE" dirty="0" err="1"/>
+              <a:t>we</a:t>
+            </a:r>
+            <a:r>
+              <a:rPr lang="de-DE" dirty="0"/>
+              <a:t> have a </a:t>
+            </a:r>
+            <a:r>
+              <a:rPr lang="de-DE" dirty="0" err="1"/>
+              <a:t>polynom</a:t>
+            </a:r>
+            <a:r>
+              <a:rPr lang="de-DE" dirty="0"/>
+              <a:t> with </a:t>
+            </a:r>
+            <a:r>
+              <a:rPr lang="de-DE" dirty="0" err="1"/>
+              <a:t>more</a:t>
+            </a:r>
+            <a:r>
+              <a:rPr lang="de-DE" dirty="0"/>
+              <a:t> </a:t>
+            </a:r>
+            <a:r>
+              <a:rPr lang="de-DE" dirty="0" err="1"/>
+              <a:t>indipendent</a:t>
+            </a:r>
+            <a:r>
+              <a:rPr lang="de-DE" dirty="0"/>
+              <a:t> variables.</a:t>
+            </a:r>
+          </a:p>
+        </p:txBody>
+      </p:sp>
+      <mc:AlternateContent xmlns:mc="http://schemas.openxmlformats.org/markup-compatibility/2006">
+        <mc:Choice xmlns:a14="http://schemas.microsoft.com/office/drawing/2010/main" Requires="a14">
+          <p:graphicFrame>
+            <p:nvGraphicFramePr>
+              <p:cNvPr id="4" name="Tabelle 3">
                 <a:extLst>
                   <a:ext uri="{FF2B5EF4-FFF2-40B4-BE49-F238E27FC236}">
-                    <a16:creationId xmlns:a16="http://schemas.microsoft.com/office/drawing/2014/main" id="{6991F8D8-0EF1-7693-1AB2-B91584EC1298}"/>
+                    <a16:creationId xmlns:a16="http://schemas.microsoft.com/office/drawing/2014/main" id="{A98EEC6D-D65A-D7BA-C292-493212654300}"/>
                   </a:ext>
                 </a:extLst>
               </p:cNvPr>
-              <p:cNvSpPr>
-                <a:spLocks noGrp="1"/>
-              </p:cNvSpPr>
+              <p:cNvGraphicFramePr>
+                <a:graphicFrameLocks noGrp="1"/>
+              </p:cNvGraphicFramePr>
               <p:nvPr>
-                <p:ph idx="1"/>
+                <p:extLst>
+                  <p:ext uri="{D42A27DB-BD31-4B8C-83A1-F6EECF244321}">
+                    <p14:modId xmlns:p14="http://schemas.microsoft.com/office/powerpoint/2010/main" val="1634509207"/>
+                  </p:ext>
+                </p:extLst>
               </p:nvPr>
+            </p:nvGraphicFramePr>
+            <p:xfrm>
+              <a:off x="779290" y="2918530"/>
+              <a:ext cx="3805680" cy="3657600"/>
+            </p:xfrm>
+            <a:graphic>
+              <a:graphicData uri="http://schemas.openxmlformats.org/drawingml/2006/table">
+                <a:tbl>
+                  <a:tblPr firstRow="1" bandRow="1">
+                    <a:tableStyleId>{5C22544A-7EE6-4342-B048-85BDC9FD1C3A}</a:tableStyleId>
+                  </a:tblPr>
+                  <a:tblGrid>
+                    <a:gridCol w="1268560">
+                      <a:extLst>
+                        <a:ext uri="{9D8B030D-6E8A-4147-A177-3AD203B41FA5}">
+                          <a16:colId xmlns:a16="http://schemas.microsoft.com/office/drawing/2014/main" val="1607536429"/>
+                        </a:ext>
+                      </a:extLst>
+                    </a:gridCol>
+                    <a:gridCol w="1268560">
+                      <a:extLst>
+                        <a:ext uri="{9D8B030D-6E8A-4147-A177-3AD203B41FA5}">
+                          <a16:colId xmlns:a16="http://schemas.microsoft.com/office/drawing/2014/main" val="1332355225"/>
+                        </a:ext>
+                      </a:extLst>
+                    </a:gridCol>
+                    <a:gridCol w="1268560">
+                      <a:extLst>
+                        <a:ext uri="{9D8B030D-6E8A-4147-A177-3AD203B41FA5}">
+                          <a16:colId xmlns:a16="http://schemas.microsoft.com/office/drawing/2014/main" val="2108874404"/>
+                        </a:ext>
+                      </a:extLst>
+                    </a:gridCol>
+                  </a:tblGrid>
+                  <a:tr h="254872">
+                    <a:tc>
+                      <a:txBody>
+                        <a:bodyPr/>
+                        <a:lstStyle/>
+                        <a:p>
+                          <a:r>
+                            <a:rPr lang="de-DE" dirty="0"/>
+                            <a:t>Feature </a:t>
+                          </a:r>
+                          <a14:m>
+                            <m:oMath xmlns:m="http://schemas.openxmlformats.org/officeDocument/2006/math">
+                              <m:sSub>
+                                <m:sSubPr>
+                                  <m:ctrlPr>
+                                    <a:rPr lang="de-DE" b="1" i="1" dirty="0" smtClean="0">
+                                      <a:latin typeface="Cambria Math" panose="02040503050406030204" pitchFamily="18" charset="0"/>
+                                    </a:rPr>
+                                  </m:ctrlPr>
+                                </m:sSubPr>
+                                <m:e>
+                                  <m:r>
+                                    <a:rPr lang="de-DE" i="1" dirty="0" smtClean="0">
+                                      <a:latin typeface="Cambria Math" panose="02040503050406030204" pitchFamily="18" charset="0"/>
+                                    </a:rPr>
+                                    <m:t>𝑥</m:t>
+                                  </m:r>
+                                </m:e>
+                                <m:sub>
+                                  <m:r>
+                                    <a:rPr lang="de-DE" b="1" i="1" dirty="0" smtClean="0">
+                                      <a:latin typeface="Cambria Math" panose="02040503050406030204" pitchFamily="18" charset="0"/>
+                                    </a:rPr>
+                                    <m:t>𝟏</m:t>
+                                  </m:r>
+                                </m:sub>
+                              </m:sSub>
+                            </m:oMath>
+                          </a14:m>
+                          <a:endParaRPr lang="de-DE" dirty="0"/>
+                        </a:p>
+                      </a:txBody>
+                      <a:tcPr/>
+                    </a:tc>
+                    <a:tc>
+                      <a:txBody>
+                        <a:bodyPr/>
+                        <a:lstStyle/>
+                        <a:p>
+                          <a:pPr marL="0" marR="0" lvl="0" indent="0" algn="l" defTabSz="914400" rtl="0" eaLnBrk="1" fontAlgn="auto" latinLnBrk="0" hangingPunct="1">
+                            <a:lnSpc>
+                              <a:spcPct val="100000"/>
+                            </a:lnSpc>
+                            <a:spcBef>
+                              <a:spcPts val="0"/>
+                            </a:spcBef>
+                            <a:spcAft>
+                              <a:spcPts val="0"/>
+                            </a:spcAft>
+                            <a:buClrTx/>
+                            <a:buSzTx/>
+                            <a:buFontTx/>
+                            <a:buNone/>
+                            <a:tabLst/>
+                            <a:defRPr/>
+                          </a:pPr>
+                          <a:r>
+                            <a:rPr lang="de-DE" dirty="0"/>
+                            <a:t>Feature </a:t>
+                          </a:r>
+                          <a14:m>
+                            <m:oMath xmlns:m="http://schemas.openxmlformats.org/officeDocument/2006/math">
+                              <m:sSub>
+                                <m:sSubPr>
+                                  <m:ctrlPr>
+                                    <a:rPr lang="de-DE" b="1" i="1" dirty="0" smtClean="0">
+                                      <a:latin typeface="Cambria Math" panose="02040503050406030204" pitchFamily="18" charset="0"/>
+                                    </a:rPr>
+                                  </m:ctrlPr>
+                                </m:sSubPr>
+                                <m:e>
+                                  <m:r>
+                                    <a:rPr lang="de-DE" i="1" dirty="0" smtClean="0">
+                                      <a:latin typeface="Cambria Math" panose="02040503050406030204" pitchFamily="18" charset="0"/>
+                                    </a:rPr>
+                                    <m:t>𝑥</m:t>
+                                  </m:r>
+                                </m:e>
+                                <m:sub>
+                                  <m:r>
+                                    <a:rPr lang="de-DE" b="1" i="1" dirty="0" smtClean="0">
+                                      <a:latin typeface="Cambria Math" panose="02040503050406030204" pitchFamily="18" charset="0"/>
+                                    </a:rPr>
+                                    <m:t>𝟐</m:t>
+                                  </m:r>
+                                </m:sub>
+                              </m:sSub>
+                            </m:oMath>
+                          </a14:m>
+                          <a:endParaRPr lang="de-DE" dirty="0"/>
+                        </a:p>
+                      </a:txBody>
+                      <a:tcPr/>
+                    </a:tc>
+                    <a:tc>
+                      <a:txBody>
+                        <a:bodyPr/>
+                        <a:lstStyle/>
+                        <a:p>
+                          <a:r>
+                            <a:rPr lang="de-DE" dirty="0"/>
+                            <a:t>Target </a:t>
+                          </a:r>
+                        </a:p>
+                      </a:txBody>
+                      <a:tcPr/>
+                    </a:tc>
+                    <a:extLst>
+                      <a:ext uri="{0D108BD9-81ED-4DB2-BD59-A6C34878D82A}">
+                        <a16:rowId xmlns:a16="http://schemas.microsoft.com/office/drawing/2014/main" val="4218645940"/>
+                      </a:ext>
+                    </a:extLst>
+                  </a:tr>
+                  <a:tr h="254890">
+                    <a:tc>
+                      <a:txBody>
+                        <a:bodyPr/>
+                        <a:lstStyle/>
+                        <a:p>
+                          <a:r>
+                            <a:rPr lang="de-DE" dirty="0"/>
+                            <a:t>1</a:t>
+                          </a:r>
+                        </a:p>
+                      </a:txBody>
+                      <a:tcPr/>
+                    </a:tc>
+                    <a:tc>
+                      <a:txBody>
+                        <a:bodyPr/>
+                        <a:lstStyle/>
+                        <a:p>
+                          <a:r>
+                            <a:rPr lang="de-DE" dirty="0"/>
+                            <a:t>3</a:t>
+                          </a:r>
+                        </a:p>
+                      </a:txBody>
+                      <a:tcPr/>
+                    </a:tc>
+                    <a:tc>
+                      <a:txBody>
+                        <a:bodyPr/>
+                        <a:lstStyle/>
+                        <a:p>
+                          <a:r>
+                            <a:rPr lang="de-DE" dirty="0">
+                              <a:solidFill>
+                                <a:schemeClr val="accent1"/>
+                              </a:solidFill>
+                            </a:rPr>
+                            <a:t>B</a:t>
+                          </a:r>
+                        </a:p>
+                      </a:txBody>
+                      <a:tcPr/>
+                    </a:tc>
+                    <a:extLst>
+                      <a:ext uri="{0D108BD9-81ED-4DB2-BD59-A6C34878D82A}">
+                        <a16:rowId xmlns:a16="http://schemas.microsoft.com/office/drawing/2014/main" val="2087138634"/>
+                      </a:ext>
+                    </a:extLst>
+                  </a:tr>
+                  <a:tr h="254890">
+                    <a:tc>
+                      <a:txBody>
+                        <a:bodyPr/>
+                        <a:lstStyle/>
+                        <a:p>
+                          <a:r>
+                            <a:rPr lang="de-DE" dirty="0"/>
+                            <a:t>2</a:t>
+                          </a:r>
+                        </a:p>
+                      </a:txBody>
+                      <a:tcPr/>
+                    </a:tc>
+                    <a:tc>
+                      <a:txBody>
+                        <a:bodyPr/>
+                        <a:lstStyle/>
+                        <a:p>
+                          <a:r>
+                            <a:rPr lang="de-DE" dirty="0"/>
+                            <a:t>1</a:t>
+                          </a:r>
+                        </a:p>
+                      </a:txBody>
+                      <a:tcPr/>
+                    </a:tc>
+                    <a:tc>
+                      <a:txBody>
+                        <a:bodyPr/>
+                        <a:lstStyle/>
+                        <a:p>
+                          <a:r>
+                            <a:rPr lang="de-DE" dirty="0">
+                              <a:solidFill>
+                                <a:schemeClr val="accent1"/>
+                              </a:solidFill>
+                            </a:rPr>
+                            <a:t>B</a:t>
+                          </a:r>
+                        </a:p>
+                      </a:txBody>
+                      <a:tcPr/>
+                    </a:tc>
+                    <a:extLst>
+                      <a:ext uri="{0D108BD9-81ED-4DB2-BD59-A6C34878D82A}">
+                        <a16:rowId xmlns:a16="http://schemas.microsoft.com/office/drawing/2014/main" val="1187624195"/>
+                      </a:ext>
+                    </a:extLst>
+                  </a:tr>
+                  <a:tr h="254890">
+                    <a:tc>
+                      <a:txBody>
+                        <a:bodyPr/>
+                        <a:lstStyle/>
+                        <a:p>
+                          <a:r>
+                            <a:rPr lang="de-DE" dirty="0"/>
+                            <a:t>4</a:t>
+                          </a:r>
+                        </a:p>
+                      </a:txBody>
+                      <a:tcPr/>
+                    </a:tc>
+                    <a:tc>
+                      <a:txBody>
+                        <a:bodyPr/>
+                        <a:lstStyle/>
+                        <a:p>
+                          <a:r>
+                            <a:rPr lang="de-DE" dirty="0"/>
+                            <a:t>0.5</a:t>
+                          </a:r>
+                        </a:p>
+                      </a:txBody>
+                      <a:tcPr/>
+                    </a:tc>
+                    <a:tc>
+                      <a:txBody>
+                        <a:bodyPr/>
+                        <a:lstStyle/>
+                        <a:p>
+                          <a:r>
+                            <a:rPr lang="de-DE" dirty="0">
+                              <a:solidFill>
+                                <a:schemeClr val="accent1"/>
+                              </a:solidFill>
+                            </a:rPr>
+                            <a:t>B</a:t>
+                          </a:r>
+                        </a:p>
+                      </a:txBody>
+                      <a:tcPr/>
+                    </a:tc>
+                    <a:extLst>
+                      <a:ext uri="{0D108BD9-81ED-4DB2-BD59-A6C34878D82A}">
+                        <a16:rowId xmlns:a16="http://schemas.microsoft.com/office/drawing/2014/main" val="1602013524"/>
+                      </a:ext>
+                    </a:extLst>
+                  </a:tr>
+                  <a:tr h="254890">
+                    <a:tc>
+                      <a:txBody>
+                        <a:bodyPr/>
+                        <a:lstStyle/>
+                        <a:p>
+                          <a:r>
+                            <a:rPr lang="de-DE" dirty="0"/>
+                            <a:t>7</a:t>
+                          </a:r>
+                        </a:p>
+                      </a:txBody>
+                      <a:tcPr/>
+                    </a:tc>
+                    <a:tc>
+                      <a:txBody>
+                        <a:bodyPr/>
+                        <a:lstStyle/>
+                        <a:p>
+                          <a:r>
+                            <a:rPr lang="de-DE" dirty="0"/>
+                            <a:t>3</a:t>
+                          </a:r>
+                        </a:p>
+                      </a:txBody>
+                      <a:tcPr/>
+                    </a:tc>
+                    <a:tc>
+                      <a:txBody>
+                        <a:bodyPr/>
+                        <a:lstStyle/>
+                        <a:p>
+                          <a:r>
+                            <a:rPr lang="de-DE" dirty="0">
+                              <a:solidFill>
+                                <a:schemeClr val="accent1"/>
+                              </a:solidFill>
+                            </a:rPr>
+                            <a:t>B</a:t>
+                          </a:r>
+                        </a:p>
+                      </a:txBody>
+                      <a:tcPr/>
+                    </a:tc>
+                    <a:extLst>
+                      <a:ext uri="{0D108BD9-81ED-4DB2-BD59-A6C34878D82A}">
+                        <a16:rowId xmlns:a16="http://schemas.microsoft.com/office/drawing/2014/main" val="3654159464"/>
+                      </a:ext>
+                    </a:extLst>
+                  </a:tr>
+                  <a:tr h="254890">
+                    <a:tc>
+                      <a:txBody>
+                        <a:bodyPr/>
+                        <a:lstStyle/>
+                        <a:p>
+                          <a:r>
+                            <a:rPr lang="de-DE" dirty="0"/>
+                            <a:t>4.5</a:t>
+                          </a:r>
+                        </a:p>
+                      </a:txBody>
+                      <a:tcPr/>
+                    </a:tc>
+                    <a:tc>
+                      <a:txBody>
+                        <a:bodyPr/>
+                        <a:lstStyle/>
+                        <a:p>
+                          <a:r>
+                            <a:rPr lang="de-DE" dirty="0"/>
+                            <a:t>2</a:t>
+                          </a:r>
+                        </a:p>
+                      </a:txBody>
+                      <a:tcPr/>
+                    </a:tc>
+                    <a:tc>
+                      <a:txBody>
+                        <a:bodyPr/>
+                        <a:lstStyle/>
+                        <a:p>
+                          <a:r>
+                            <a:rPr lang="de-DE" dirty="0">
+                              <a:solidFill>
+                                <a:srgbClr val="FF0000"/>
+                              </a:solidFill>
+                            </a:rPr>
+                            <a:t>R</a:t>
+                          </a:r>
+                        </a:p>
+                      </a:txBody>
+                      <a:tcPr/>
+                    </a:tc>
+                    <a:extLst>
+                      <a:ext uri="{0D108BD9-81ED-4DB2-BD59-A6C34878D82A}">
+                        <a16:rowId xmlns:a16="http://schemas.microsoft.com/office/drawing/2014/main" val="3544492405"/>
+                      </a:ext>
+                    </a:extLst>
+                  </a:tr>
+                  <a:tr h="254890">
+                    <a:tc>
+                      <a:txBody>
+                        <a:bodyPr/>
+                        <a:lstStyle/>
+                        <a:p>
+                          <a:r>
+                            <a:rPr lang="de-DE" dirty="0"/>
+                            <a:t>6</a:t>
+                          </a:r>
+                        </a:p>
+                      </a:txBody>
+                      <a:tcPr/>
+                    </a:tc>
+                    <a:tc>
+                      <a:txBody>
+                        <a:bodyPr/>
+                        <a:lstStyle/>
+                        <a:p>
+                          <a:r>
+                            <a:rPr lang="de-DE" dirty="0"/>
+                            <a:t>4</a:t>
+                          </a:r>
+                        </a:p>
+                      </a:txBody>
+                      <a:tcPr/>
+                    </a:tc>
+                    <a:tc>
+                      <a:txBody>
+                        <a:bodyPr/>
+                        <a:lstStyle/>
+                        <a:p>
+                          <a:r>
+                            <a:rPr lang="de-DE" dirty="0">
+                              <a:solidFill>
+                                <a:srgbClr val="FF0000"/>
+                              </a:solidFill>
+                            </a:rPr>
+                            <a:t>R</a:t>
+                          </a:r>
+                        </a:p>
+                      </a:txBody>
+                      <a:tcPr/>
+                    </a:tc>
+                    <a:extLst>
+                      <a:ext uri="{0D108BD9-81ED-4DB2-BD59-A6C34878D82A}">
+                        <a16:rowId xmlns:a16="http://schemas.microsoft.com/office/drawing/2014/main" val="3550037821"/>
+                      </a:ext>
+                    </a:extLst>
+                  </a:tr>
+                  <a:tr h="254890">
+                    <a:tc>
+                      <a:txBody>
+                        <a:bodyPr/>
+                        <a:lstStyle/>
+                        <a:p>
+                          <a:r>
+                            <a:rPr lang="de-DE" dirty="0"/>
+                            <a:t>7.5</a:t>
+                          </a:r>
+                        </a:p>
+                      </a:txBody>
+                      <a:tcPr/>
+                    </a:tc>
+                    <a:tc>
+                      <a:txBody>
+                        <a:bodyPr/>
+                        <a:lstStyle/>
+                        <a:p>
+                          <a:r>
+                            <a:rPr lang="de-DE" dirty="0"/>
+                            <a:t>2</a:t>
+                          </a:r>
+                        </a:p>
+                      </a:txBody>
+                      <a:tcPr/>
+                    </a:tc>
+                    <a:tc>
+                      <a:txBody>
+                        <a:bodyPr/>
+                        <a:lstStyle/>
+                        <a:p>
+                          <a:r>
+                            <a:rPr lang="de-DE" dirty="0">
+                              <a:solidFill>
+                                <a:srgbClr val="FF0000"/>
+                              </a:solidFill>
+                            </a:rPr>
+                            <a:t>R</a:t>
+                          </a:r>
+                        </a:p>
+                      </a:txBody>
+                      <a:tcPr/>
+                    </a:tc>
+                    <a:extLst>
+                      <a:ext uri="{0D108BD9-81ED-4DB2-BD59-A6C34878D82A}">
+                        <a16:rowId xmlns:a16="http://schemas.microsoft.com/office/drawing/2014/main" val="3655238010"/>
+                      </a:ext>
+                    </a:extLst>
+                  </a:tr>
+                  <a:tr h="254890">
+                    <a:tc>
+                      <a:txBody>
+                        <a:bodyPr/>
+                        <a:lstStyle/>
+                        <a:p>
+                          <a:r>
+                            <a:rPr lang="de-DE" dirty="0"/>
+                            <a:t>9</a:t>
+                          </a:r>
+                        </a:p>
+                      </a:txBody>
+                      <a:tcPr/>
+                    </a:tc>
+                    <a:tc>
+                      <a:txBody>
+                        <a:bodyPr/>
+                        <a:lstStyle/>
+                        <a:p>
+                          <a:r>
+                            <a:rPr lang="de-DE" dirty="0"/>
+                            <a:t>11</a:t>
+                          </a:r>
+                        </a:p>
+                      </a:txBody>
+                      <a:tcPr/>
+                    </a:tc>
+                    <a:tc>
+                      <a:txBody>
+                        <a:bodyPr/>
+                        <a:lstStyle/>
+                        <a:p>
+                          <a:r>
+                            <a:rPr lang="de-DE" dirty="0">
+                              <a:solidFill>
+                                <a:srgbClr val="FF0000"/>
+                              </a:solidFill>
+                            </a:rPr>
+                            <a:t>R</a:t>
+                          </a:r>
+                        </a:p>
+                      </a:txBody>
+                      <a:tcPr/>
+                    </a:tc>
+                    <a:extLst>
+                      <a:ext uri="{0D108BD9-81ED-4DB2-BD59-A6C34878D82A}">
+                        <a16:rowId xmlns:a16="http://schemas.microsoft.com/office/drawing/2014/main" val="3479534932"/>
+                      </a:ext>
+                    </a:extLst>
+                  </a:tr>
+                  <a:tr h="254890">
+                    <a:tc>
+                      <a:txBody>
+                        <a:bodyPr/>
+                        <a:lstStyle/>
+                        <a:p>
+                          <a:r>
+                            <a:rPr lang="de-DE" dirty="0"/>
+                            <a:t>10</a:t>
+                          </a:r>
+                        </a:p>
+                      </a:txBody>
+                      <a:tcPr/>
+                    </a:tc>
+                    <a:tc>
+                      <a:txBody>
+                        <a:bodyPr/>
+                        <a:lstStyle/>
+                        <a:p>
+                          <a:r>
+                            <a:rPr lang="de-DE" dirty="0"/>
+                            <a:t>0.6</a:t>
+                          </a:r>
+                        </a:p>
+                      </a:txBody>
+                      <a:tcPr/>
+                    </a:tc>
+                    <a:tc>
+                      <a:txBody>
+                        <a:bodyPr/>
+                        <a:lstStyle/>
+                        <a:p>
+                          <a:r>
+                            <a:rPr lang="de-DE" dirty="0">
+                              <a:solidFill>
+                                <a:srgbClr val="FF0000"/>
+                              </a:solidFill>
+                            </a:rPr>
+                            <a:t>R</a:t>
+                          </a:r>
+                        </a:p>
+                      </a:txBody>
+                      <a:tcPr/>
+                    </a:tc>
+                    <a:extLst>
+                      <a:ext uri="{0D108BD9-81ED-4DB2-BD59-A6C34878D82A}">
+                        <a16:rowId xmlns:a16="http://schemas.microsoft.com/office/drawing/2014/main" val="1769186512"/>
+                      </a:ext>
+                    </a:extLst>
+                  </a:tr>
+                </a:tbl>
+              </a:graphicData>
+            </a:graphic>
+          </p:graphicFrame>
+        </mc:Choice>
+        <mc:Fallback>
+          <p:graphicFrame>
+            <p:nvGraphicFramePr>
+              <p:cNvPr id="4" name="Tabelle 3">
+                <a:extLst>
+                  <a:ext uri="{FF2B5EF4-FFF2-40B4-BE49-F238E27FC236}">
+                    <a16:creationId xmlns:a16="http://schemas.microsoft.com/office/drawing/2014/main" id="{A98EEC6D-D65A-D7BA-C292-493212654300}"/>
+                  </a:ext>
+                </a:extLst>
+              </p:cNvPr>
+              <p:cNvGraphicFramePr>
+                <a:graphicFrameLocks noGrp="1"/>
+              </p:cNvGraphicFramePr>
+              <p:nvPr>
+                <p:extLst>
+                  <p:ext uri="{D42A27DB-BD31-4B8C-83A1-F6EECF244321}">
+                    <p14:modId xmlns:p14="http://schemas.microsoft.com/office/powerpoint/2010/main" val="1634509207"/>
+                  </p:ext>
+                </p:extLst>
+              </p:nvPr>
+            </p:nvGraphicFramePr>
+            <p:xfrm>
+              <a:off x="779290" y="2918530"/>
+              <a:ext cx="3805680" cy="3657600"/>
+            </p:xfrm>
+            <a:graphic>
+              <a:graphicData uri="http://schemas.openxmlformats.org/drawingml/2006/table">
+                <a:tbl>
+                  <a:tblPr firstRow="1" bandRow="1">
+                    <a:tableStyleId>{5C22544A-7EE6-4342-B048-85BDC9FD1C3A}</a:tableStyleId>
+                  </a:tblPr>
+                  <a:tblGrid>
+                    <a:gridCol w="1268560">
+                      <a:extLst>
+                        <a:ext uri="{9D8B030D-6E8A-4147-A177-3AD203B41FA5}">
+                          <a16:colId xmlns:a16="http://schemas.microsoft.com/office/drawing/2014/main" val="1607536429"/>
+                        </a:ext>
+                      </a:extLst>
+                    </a:gridCol>
+                    <a:gridCol w="1268560">
+                      <a:extLst>
+                        <a:ext uri="{9D8B030D-6E8A-4147-A177-3AD203B41FA5}">
+                          <a16:colId xmlns:a16="http://schemas.microsoft.com/office/drawing/2014/main" val="1332355225"/>
+                        </a:ext>
+                      </a:extLst>
+                    </a:gridCol>
+                    <a:gridCol w="1268560">
+                      <a:extLst>
+                        <a:ext uri="{9D8B030D-6E8A-4147-A177-3AD203B41FA5}">
+                          <a16:colId xmlns:a16="http://schemas.microsoft.com/office/drawing/2014/main" val="2108874404"/>
+                        </a:ext>
+                      </a:extLst>
+                    </a:gridCol>
+                  </a:tblGrid>
+                  <a:tr h="365760">
+                    <a:tc>
+                      <a:txBody>
+                        <a:bodyPr/>
+                        <a:lstStyle/>
+                        <a:p>
+                          <a:endParaRPr lang="de-DE"/>
+                        </a:p>
+                      </a:txBody>
+                      <a:tcPr>
+                        <a:blipFill>
+                          <a:blip r:embed="rId2"/>
+                          <a:stretch>
+                            <a:fillRect l="-478" t="-8333" r="-201435" b="-928333"/>
+                          </a:stretch>
+                        </a:blipFill>
+                      </a:tcPr>
+                    </a:tc>
+                    <a:tc>
+                      <a:txBody>
+                        <a:bodyPr/>
+                        <a:lstStyle/>
+                        <a:p>
+                          <a:endParaRPr lang="de-DE"/>
+                        </a:p>
+                      </a:txBody>
+                      <a:tcPr>
+                        <a:blipFill>
+                          <a:blip r:embed="rId2"/>
+                          <a:stretch>
+                            <a:fillRect l="-100962" t="-8333" r="-102404" b="-928333"/>
+                          </a:stretch>
+                        </a:blipFill>
+                      </a:tcPr>
+                    </a:tc>
+                    <a:tc>
+                      <a:txBody>
+                        <a:bodyPr/>
+                        <a:lstStyle/>
+                        <a:p>
+                          <a:r>
+                            <a:rPr lang="de-DE" dirty="0"/>
+                            <a:t>Target </a:t>
+                          </a:r>
+                        </a:p>
+                      </a:txBody>
+                      <a:tcPr/>
+                    </a:tc>
+                    <a:extLst>
+                      <a:ext uri="{0D108BD9-81ED-4DB2-BD59-A6C34878D82A}">
+                        <a16:rowId xmlns:a16="http://schemas.microsoft.com/office/drawing/2014/main" val="4218645940"/>
+                      </a:ext>
+                    </a:extLst>
+                  </a:tr>
+                  <a:tr h="365760">
+                    <a:tc>
+                      <a:txBody>
+                        <a:bodyPr/>
+                        <a:lstStyle/>
+                        <a:p>
+                          <a:r>
+                            <a:rPr lang="de-DE" dirty="0"/>
+                            <a:t>1</a:t>
+                          </a:r>
+                        </a:p>
+                      </a:txBody>
+                      <a:tcPr/>
+                    </a:tc>
+                    <a:tc>
+                      <a:txBody>
+                        <a:bodyPr/>
+                        <a:lstStyle/>
+                        <a:p>
+                          <a:r>
+                            <a:rPr lang="de-DE" dirty="0"/>
+                            <a:t>3</a:t>
+                          </a:r>
+                        </a:p>
+                      </a:txBody>
+                      <a:tcPr/>
+                    </a:tc>
+                    <a:tc>
+                      <a:txBody>
+                        <a:bodyPr/>
+                        <a:lstStyle/>
+                        <a:p>
+                          <a:r>
+                            <a:rPr lang="de-DE" dirty="0">
+                              <a:solidFill>
+                                <a:schemeClr val="accent1"/>
+                              </a:solidFill>
+                            </a:rPr>
+                            <a:t>B</a:t>
+                          </a:r>
+                        </a:p>
+                      </a:txBody>
+                      <a:tcPr/>
+                    </a:tc>
+                    <a:extLst>
+                      <a:ext uri="{0D108BD9-81ED-4DB2-BD59-A6C34878D82A}">
+                        <a16:rowId xmlns:a16="http://schemas.microsoft.com/office/drawing/2014/main" val="2087138634"/>
+                      </a:ext>
+                    </a:extLst>
+                  </a:tr>
+                  <a:tr h="365760">
+                    <a:tc>
+                      <a:txBody>
+                        <a:bodyPr/>
+                        <a:lstStyle/>
+                        <a:p>
+                          <a:r>
+                            <a:rPr lang="de-DE" dirty="0"/>
+                            <a:t>2</a:t>
+                          </a:r>
+                        </a:p>
+                      </a:txBody>
+                      <a:tcPr/>
+                    </a:tc>
+                    <a:tc>
+                      <a:txBody>
+                        <a:bodyPr/>
+                        <a:lstStyle/>
+                        <a:p>
+                          <a:r>
+                            <a:rPr lang="de-DE" dirty="0"/>
+                            <a:t>1</a:t>
+                          </a:r>
+                        </a:p>
+                      </a:txBody>
+                      <a:tcPr/>
+                    </a:tc>
+                    <a:tc>
+                      <a:txBody>
+                        <a:bodyPr/>
+                        <a:lstStyle/>
+                        <a:p>
+                          <a:r>
+                            <a:rPr lang="de-DE" dirty="0">
+                              <a:solidFill>
+                                <a:schemeClr val="accent1"/>
+                              </a:solidFill>
+                            </a:rPr>
+                            <a:t>B</a:t>
+                          </a:r>
+                        </a:p>
+                      </a:txBody>
+                      <a:tcPr/>
+                    </a:tc>
+                    <a:extLst>
+                      <a:ext uri="{0D108BD9-81ED-4DB2-BD59-A6C34878D82A}">
+                        <a16:rowId xmlns:a16="http://schemas.microsoft.com/office/drawing/2014/main" val="1187624195"/>
+                      </a:ext>
+                    </a:extLst>
+                  </a:tr>
+                  <a:tr h="365760">
+                    <a:tc>
+                      <a:txBody>
+                        <a:bodyPr/>
+                        <a:lstStyle/>
+                        <a:p>
+                          <a:r>
+                            <a:rPr lang="de-DE" dirty="0"/>
+                            <a:t>4</a:t>
+                          </a:r>
+                        </a:p>
+                      </a:txBody>
+                      <a:tcPr/>
+                    </a:tc>
+                    <a:tc>
+                      <a:txBody>
+                        <a:bodyPr/>
+                        <a:lstStyle/>
+                        <a:p>
+                          <a:r>
+                            <a:rPr lang="de-DE" dirty="0"/>
+                            <a:t>0.5</a:t>
+                          </a:r>
+                        </a:p>
+                      </a:txBody>
+                      <a:tcPr/>
+                    </a:tc>
+                    <a:tc>
+                      <a:txBody>
+                        <a:bodyPr/>
+                        <a:lstStyle/>
+                        <a:p>
+                          <a:r>
+                            <a:rPr lang="de-DE" dirty="0">
+                              <a:solidFill>
+                                <a:schemeClr val="accent1"/>
+                              </a:solidFill>
+                            </a:rPr>
+                            <a:t>B</a:t>
+                          </a:r>
+                        </a:p>
+                      </a:txBody>
+                      <a:tcPr/>
+                    </a:tc>
+                    <a:extLst>
+                      <a:ext uri="{0D108BD9-81ED-4DB2-BD59-A6C34878D82A}">
+                        <a16:rowId xmlns:a16="http://schemas.microsoft.com/office/drawing/2014/main" val="1602013524"/>
+                      </a:ext>
+                    </a:extLst>
+                  </a:tr>
+                  <a:tr h="365760">
+                    <a:tc>
+                      <a:txBody>
+                        <a:bodyPr/>
+                        <a:lstStyle/>
+                        <a:p>
+                          <a:r>
+                            <a:rPr lang="de-DE" dirty="0"/>
+                            <a:t>7</a:t>
+                          </a:r>
+                        </a:p>
+                      </a:txBody>
+                      <a:tcPr/>
+                    </a:tc>
+                    <a:tc>
+                      <a:txBody>
+                        <a:bodyPr/>
+                        <a:lstStyle/>
+                        <a:p>
+                          <a:r>
+                            <a:rPr lang="de-DE" dirty="0"/>
+                            <a:t>3</a:t>
+                          </a:r>
+                        </a:p>
+                      </a:txBody>
+                      <a:tcPr/>
+                    </a:tc>
+                    <a:tc>
+                      <a:txBody>
+                        <a:bodyPr/>
+                        <a:lstStyle/>
+                        <a:p>
+                          <a:r>
+                            <a:rPr lang="de-DE" dirty="0">
+                              <a:solidFill>
+                                <a:schemeClr val="accent1"/>
+                              </a:solidFill>
+                            </a:rPr>
+                            <a:t>B</a:t>
+                          </a:r>
+                        </a:p>
+                      </a:txBody>
+                      <a:tcPr/>
+                    </a:tc>
+                    <a:extLst>
+                      <a:ext uri="{0D108BD9-81ED-4DB2-BD59-A6C34878D82A}">
+                        <a16:rowId xmlns:a16="http://schemas.microsoft.com/office/drawing/2014/main" val="3654159464"/>
+                      </a:ext>
+                    </a:extLst>
+                  </a:tr>
+                  <a:tr h="365760">
+                    <a:tc>
+                      <a:txBody>
+                        <a:bodyPr/>
+                        <a:lstStyle/>
+                        <a:p>
+                          <a:r>
+                            <a:rPr lang="de-DE" dirty="0"/>
+                            <a:t>4.5</a:t>
+                          </a:r>
+                        </a:p>
+                      </a:txBody>
+                      <a:tcPr/>
+                    </a:tc>
+                    <a:tc>
+                      <a:txBody>
+                        <a:bodyPr/>
+                        <a:lstStyle/>
+                        <a:p>
+                          <a:r>
+                            <a:rPr lang="de-DE" dirty="0"/>
+                            <a:t>2</a:t>
+                          </a:r>
+                        </a:p>
+                      </a:txBody>
+                      <a:tcPr/>
+                    </a:tc>
+                    <a:tc>
+                      <a:txBody>
+                        <a:bodyPr/>
+                        <a:lstStyle/>
+                        <a:p>
+                          <a:r>
+                            <a:rPr lang="de-DE" dirty="0">
+                              <a:solidFill>
+                                <a:srgbClr val="FF0000"/>
+                              </a:solidFill>
+                            </a:rPr>
+                            <a:t>R</a:t>
+                          </a:r>
+                        </a:p>
+                      </a:txBody>
+                      <a:tcPr/>
+                    </a:tc>
+                    <a:extLst>
+                      <a:ext uri="{0D108BD9-81ED-4DB2-BD59-A6C34878D82A}">
+                        <a16:rowId xmlns:a16="http://schemas.microsoft.com/office/drawing/2014/main" val="3544492405"/>
+                      </a:ext>
+                    </a:extLst>
+                  </a:tr>
+                  <a:tr h="365760">
+                    <a:tc>
+                      <a:txBody>
+                        <a:bodyPr/>
+                        <a:lstStyle/>
+                        <a:p>
+                          <a:r>
+                            <a:rPr lang="de-DE" dirty="0"/>
+                            <a:t>6</a:t>
+                          </a:r>
+                        </a:p>
+                      </a:txBody>
+                      <a:tcPr/>
+                    </a:tc>
+                    <a:tc>
+                      <a:txBody>
+                        <a:bodyPr/>
+                        <a:lstStyle/>
+                        <a:p>
+                          <a:r>
+                            <a:rPr lang="de-DE" dirty="0"/>
+                            <a:t>4</a:t>
+                          </a:r>
+                        </a:p>
+                      </a:txBody>
+                      <a:tcPr/>
+                    </a:tc>
+                    <a:tc>
+                      <a:txBody>
+                        <a:bodyPr/>
+                        <a:lstStyle/>
+                        <a:p>
+                          <a:r>
+                            <a:rPr lang="de-DE" dirty="0">
+                              <a:solidFill>
+                                <a:srgbClr val="FF0000"/>
+                              </a:solidFill>
+                            </a:rPr>
+                            <a:t>R</a:t>
+                          </a:r>
+                        </a:p>
+                      </a:txBody>
+                      <a:tcPr/>
+                    </a:tc>
+                    <a:extLst>
+                      <a:ext uri="{0D108BD9-81ED-4DB2-BD59-A6C34878D82A}">
+                        <a16:rowId xmlns:a16="http://schemas.microsoft.com/office/drawing/2014/main" val="3550037821"/>
+                      </a:ext>
+                    </a:extLst>
+                  </a:tr>
+                  <a:tr h="365760">
+                    <a:tc>
+                      <a:txBody>
+                        <a:bodyPr/>
+                        <a:lstStyle/>
+                        <a:p>
+                          <a:r>
+                            <a:rPr lang="de-DE" dirty="0"/>
+                            <a:t>7.5</a:t>
+                          </a:r>
+                        </a:p>
+                      </a:txBody>
+                      <a:tcPr/>
+                    </a:tc>
+                    <a:tc>
+                      <a:txBody>
+                        <a:bodyPr/>
+                        <a:lstStyle/>
+                        <a:p>
+                          <a:r>
+                            <a:rPr lang="de-DE" dirty="0"/>
+                            <a:t>2</a:t>
+                          </a:r>
+                        </a:p>
+                      </a:txBody>
+                      <a:tcPr/>
+                    </a:tc>
+                    <a:tc>
+                      <a:txBody>
+                        <a:bodyPr/>
+                        <a:lstStyle/>
+                        <a:p>
+                          <a:r>
+                            <a:rPr lang="de-DE" dirty="0">
+                              <a:solidFill>
+                                <a:srgbClr val="FF0000"/>
+                              </a:solidFill>
+                            </a:rPr>
+                            <a:t>R</a:t>
+                          </a:r>
+                        </a:p>
+                      </a:txBody>
+                      <a:tcPr/>
+                    </a:tc>
+                    <a:extLst>
+                      <a:ext uri="{0D108BD9-81ED-4DB2-BD59-A6C34878D82A}">
+                        <a16:rowId xmlns:a16="http://schemas.microsoft.com/office/drawing/2014/main" val="3655238010"/>
+                      </a:ext>
+                    </a:extLst>
+                  </a:tr>
+                  <a:tr h="365760">
+                    <a:tc>
+                      <a:txBody>
+                        <a:bodyPr/>
+                        <a:lstStyle/>
+                        <a:p>
+                          <a:r>
+                            <a:rPr lang="de-DE" dirty="0"/>
+                            <a:t>9</a:t>
+                          </a:r>
+                        </a:p>
+                      </a:txBody>
+                      <a:tcPr/>
+                    </a:tc>
+                    <a:tc>
+                      <a:txBody>
+                        <a:bodyPr/>
+                        <a:lstStyle/>
+                        <a:p>
+                          <a:r>
+                            <a:rPr lang="de-DE" dirty="0"/>
+                            <a:t>11</a:t>
+                          </a:r>
+                        </a:p>
+                      </a:txBody>
+                      <a:tcPr/>
+                    </a:tc>
+                    <a:tc>
+                      <a:txBody>
+                        <a:bodyPr/>
+                        <a:lstStyle/>
+                        <a:p>
+                          <a:r>
+                            <a:rPr lang="de-DE" dirty="0">
+                              <a:solidFill>
+                                <a:srgbClr val="FF0000"/>
+                              </a:solidFill>
+                            </a:rPr>
+                            <a:t>R</a:t>
+                          </a:r>
+                        </a:p>
+                      </a:txBody>
+                      <a:tcPr/>
+                    </a:tc>
+                    <a:extLst>
+                      <a:ext uri="{0D108BD9-81ED-4DB2-BD59-A6C34878D82A}">
+                        <a16:rowId xmlns:a16="http://schemas.microsoft.com/office/drawing/2014/main" val="3479534932"/>
+                      </a:ext>
+                    </a:extLst>
+                  </a:tr>
+                  <a:tr h="365760">
+                    <a:tc>
+                      <a:txBody>
+                        <a:bodyPr/>
+                        <a:lstStyle/>
+                        <a:p>
+                          <a:r>
+                            <a:rPr lang="de-DE" dirty="0"/>
+                            <a:t>10</a:t>
+                          </a:r>
+                        </a:p>
+                      </a:txBody>
+                      <a:tcPr/>
+                    </a:tc>
+                    <a:tc>
+                      <a:txBody>
+                        <a:bodyPr/>
+                        <a:lstStyle/>
+                        <a:p>
+                          <a:r>
+                            <a:rPr lang="de-DE" dirty="0"/>
+                            <a:t>0.6</a:t>
+                          </a:r>
+                        </a:p>
+                      </a:txBody>
+                      <a:tcPr/>
+                    </a:tc>
+                    <a:tc>
+                      <a:txBody>
+                        <a:bodyPr/>
+                        <a:lstStyle/>
+                        <a:p>
+                          <a:r>
+                            <a:rPr lang="de-DE" dirty="0">
+                              <a:solidFill>
+                                <a:srgbClr val="FF0000"/>
+                              </a:solidFill>
+                            </a:rPr>
+                            <a:t>R</a:t>
+                          </a:r>
+                        </a:p>
+                      </a:txBody>
+                      <a:tcPr/>
+                    </a:tc>
+                    <a:extLst>
+                      <a:ext uri="{0D108BD9-81ED-4DB2-BD59-A6C34878D82A}">
+                        <a16:rowId xmlns:a16="http://schemas.microsoft.com/office/drawing/2014/main" val="1769186512"/>
+                      </a:ext>
+                    </a:extLst>
+                  </a:tr>
+                </a:tbl>
+              </a:graphicData>
+            </a:graphic>
+          </p:graphicFrame>
+        </mc:Fallback>
+      </mc:AlternateContent>
+      <mc:AlternateContent xmlns:mc="http://schemas.openxmlformats.org/markup-compatibility/2006">
+        <mc:Choice xmlns:a14="http://schemas.microsoft.com/office/drawing/2010/main" Requires="a14">
+          <p:sp>
+            <p:nvSpPr>
+              <p:cNvPr id="5" name="Textfeld 4">
+                <a:extLst>
+                  <a:ext uri="{FF2B5EF4-FFF2-40B4-BE49-F238E27FC236}">
+                    <a16:creationId xmlns:a16="http://schemas.microsoft.com/office/drawing/2014/main" id="{90D6A029-A90D-3664-9B74-6571D23D0B1F}"/>
+                  </a:ext>
+                </a:extLst>
+              </p:cNvPr>
+              <p:cNvSpPr txBox="1"/>
+              <p:nvPr/>
             </p:nvSpPr>
             <p:spPr>
               <a:xfrm>
-                <a:off x="838200" y="1825625"/>
-                <a:ext cx="10515600" cy="1989857"/>
+                <a:off x="5207747" y="3280625"/>
+                <a:ext cx="3155030" cy="625043"/>
               </a:xfrm>
+              <a:prstGeom prst="rect">
+                <a:avLst/>
+              </a:prstGeom>
+              <a:noFill/>
             </p:spPr>
             <p:txBody>
-              <a:bodyPr>
-                <a:normAutofit fontScale="77500" lnSpcReduction="20000"/>
+              <a:bodyPr wrap="none" rtlCol="0">
+                <a:spAutoFit/>
               </a:bodyPr>
               <a:lstStyle/>
               <a:p>
                 <a14:m>
-                  <m:oMath xmlns:m="http://schemas.openxmlformats.org/officeDocument/2006/math">
-                    <m:r>
-                      <a:rPr lang="de-DE" b="0" i="1" smtClean="0">
-                        <a:latin typeface="Cambria Math" panose="02040503050406030204" pitchFamily="18" charset="0"/>
-                      </a:rPr>
-                      <m:t>𝜎</m:t>
-                    </m:r>
-                    <m:d>
-                      <m:dPr>
-                        <m:ctrlPr>
-                          <a:rPr lang="de-DE" b="0" i="1" smtClean="0">
-                            <a:latin typeface="Cambria Math" panose="02040503050406030204" pitchFamily="18" charset="0"/>
-                          </a:rPr>
-                        </m:ctrlPr>
-                      </m:dPr>
-                      <m:e>
-                        <m:r>
-                          <a:rPr lang="de-DE" b="0" i="1" smtClean="0">
-                            <a:latin typeface="Cambria Math" panose="02040503050406030204" pitchFamily="18" charset="0"/>
-                          </a:rPr>
-                          <m:t>𝑥</m:t>
-                        </m:r>
-                      </m:e>
-                    </m:d>
-                    <m:r>
-                      <a:rPr lang="de-DE" b="0" i="1" smtClean="0">
-                        <a:latin typeface="Cambria Math" panose="02040503050406030204" pitchFamily="18" charset="0"/>
-                      </a:rPr>
-                      <m:t>≔</m:t>
-                    </m:r>
-                    <m:f>
-                      <m:fPr>
-                        <m:ctrlPr>
-                          <a:rPr lang="de-DE" b="0" i="1" smtClean="0">
-                            <a:latin typeface="Cambria Math" panose="02040503050406030204" pitchFamily="18" charset="0"/>
-                          </a:rPr>
-                        </m:ctrlPr>
-                      </m:fPr>
-                      <m:num>
-                        <m:r>
-                          <a:rPr lang="de-DE" b="0" i="1" smtClean="0">
-                            <a:latin typeface="Cambria Math" panose="02040503050406030204" pitchFamily="18" charset="0"/>
-                          </a:rPr>
-                          <m:t>1</m:t>
-                        </m:r>
-                      </m:num>
-                      <m:den>
-                        <m:r>
-                          <a:rPr lang="de-DE" b="0" i="1" smtClean="0">
-                            <a:latin typeface="Cambria Math" panose="02040503050406030204" pitchFamily="18" charset="0"/>
-                          </a:rPr>
-                          <m:t>1−</m:t>
-                        </m:r>
-                        <m:sSup>
-                          <m:sSupPr>
-                            <m:ctrlPr>
-                              <a:rPr lang="de-DE" b="0" i="1" smtClean="0">
-                                <a:latin typeface="Cambria Math" panose="02040503050406030204" pitchFamily="18" charset="0"/>
-                              </a:rPr>
-                            </m:ctrlPr>
-                          </m:sSupPr>
-                          <m:e>
-                            <m:r>
-                              <a:rPr lang="de-DE" b="0" i="1" smtClean="0">
-                                <a:latin typeface="Cambria Math" panose="02040503050406030204" pitchFamily="18" charset="0"/>
-                              </a:rPr>
-                              <m:t>𝑒</m:t>
-                            </m:r>
-                          </m:e>
-                          <m:sup>
-                            <m:r>
-                              <a:rPr lang="de-DE" b="0" i="1" smtClean="0">
-                                <a:latin typeface="Cambria Math" panose="02040503050406030204" pitchFamily="18" charset="0"/>
-                              </a:rPr>
-                              <m:t>−</m:t>
-                            </m:r>
-                            <m:d>
-                              <m:dPr>
-                                <m:ctrlPr>
-                                  <a:rPr lang="de-DE" b="0" i="1" smtClean="0">
-                                    <a:latin typeface="Cambria Math" panose="02040503050406030204" pitchFamily="18" charset="0"/>
-                                  </a:rPr>
-                                </m:ctrlPr>
-                              </m:dPr>
-                              <m:e>
-                                <m:r>
-                                  <a:rPr lang="de-DE" b="0" i="1" smtClean="0">
-                                    <a:latin typeface="Cambria Math" panose="02040503050406030204" pitchFamily="18" charset="0"/>
-                                  </a:rPr>
-                                  <m:t>𝑎</m:t>
-                                </m:r>
-                                <m:r>
-                                  <a:rPr lang="de-DE" b="0" i="1" smtClean="0">
-                                    <a:latin typeface="Cambria Math" panose="02040503050406030204" pitchFamily="18" charset="0"/>
-                                  </a:rPr>
-                                  <m:t>+</m:t>
-                                </m:r>
-                                <m:r>
-                                  <a:rPr lang="de-DE" b="0" i="1" smtClean="0">
-                                    <a:latin typeface="Cambria Math" panose="02040503050406030204" pitchFamily="18" charset="0"/>
-                                  </a:rPr>
-                                  <m:t>𝑏𝑥</m:t>
-                                </m:r>
-                              </m:e>
-                            </m:d>
-                          </m:sup>
-                        </m:sSup>
-                      </m:den>
-                    </m:f>
-                  </m:oMath>
+                  <m:oMathPara xmlns:m="http://schemas.openxmlformats.org/officeDocument/2006/math">
+                    <m:oMathParaPr>
+                      <m:jc m:val="centerGroup"/>
+                    </m:oMathParaPr>
+                    <m:oMath xmlns:m="http://schemas.openxmlformats.org/officeDocument/2006/math">
+                      <m:r>
+                        <a:rPr lang="de-DE" b="0" i="1" smtClean="0">
+                          <a:latin typeface="Cambria Math" panose="02040503050406030204" pitchFamily="18" charset="0"/>
+                        </a:rPr>
+                        <m:t>𝑓</m:t>
+                      </m:r>
+                      <m:d>
+                        <m:dPr>
+                          <m:ctrlPr>
+                            <a:rPr lang="de-DE" b="0" i="1" smtClean="0">
+                              <a:latin typeface="Cambria Math" panose="02040503050406030204" pitchFamily="18" charset="0"/>
+                            </a:rPr>
+                          </m:ctrlPr>
+                        </m:dPr>
+                        <m:e>
+                          <m:r>
+                            <a:rPr lang="de-DE" b="0" i="1" smtClean="0">
+                              <a:latin typeface="Cambria Math" panose="02040503050406030204" pitchFamily="18" charset="0"/>
+                            </a:rPr>
+                            <m:t>𝑥</m:t>
+                          </m:r>
+                        </m:e>
+                      </m:d>
+                      <m:r>
+                        <a:rPr lang="de-DE" b="0" i="1" smtClean="0">
+                          <a:latin typeface="Cambria Math" panose="02040503050406030204" pitchFamily="18" charset="0"/>
+                        </a:rPr>
+                        <m:t>=</m:t>
+                      </m:r>
+                      <m:f>
+                        <m:fPr>
+                          <m:ctrlPr>
+                            <a:rPr lang="de-DE" b="0" i="1" smtClean="0">
+                              <a:latin typeface="Cambria Math" panose="02040503050406030204" pitchFamily="18" charset="0"/>
+                            </a:rPr>
+                          </m:ctrlPr>
+                        </m:fPr>
+                        <m:num>
+                          <m:r>
+                            <a:rPr lang="de-DE" b="0" i="1" smtClean="0">
+                              <a:latin typeface="Cambria Math" panose="02040503050406030204" pitchFamily="18" charset="0"/>
+                            </a:rPr>
+                            <m:t>1</m:t>
+                          </m:r>
+                        </m:num>
+                        <m:den>
+                          <m:r>
+                            <a:rPr lang="de-DE" b="0" i="1" smtClean="0">
+                              <a:latin typeface="Cambria Math" panose="02040503050406030204" pitchFamily="18" charset="0"/>
+                            </a:rPr>
+                            <m:t>1+</m:t>
+                          </m:r>
+                          <m:sSup>
+                            <m:sSupPr>
+                              <m:ctrlPr>
+                                <a:rPr lang="de-DE" b="0" i="1" smtClean="0">
+                                  <a:latin typeface="Cambria Math" panose="02040503050406030204" pitchFamily="18" charset="0"/>
+                                </a:rPr>
+                              </m:ctrlPr>
+                            </m:sSupPr>
+                            <m:e>
+                              <m:r>
+                                <a:rPr lang="de-DE" b="0" i="1" smtClean="0">
+                                  <a:latin typeface="Cambria Math" panose="02040503050406030204" pitchFamily="18" charset="0"/>
+                                </a:rPr>
+                                <m:t>𝑒</m:t>
+                              </m:r>
+                            </m:e>
+                            <m:sup>
+                              <m:r>
+                                <a:rPr lang="de-DE" b="0" i="1" smtClean="0">
+                                  <a:latin typeface="Cambria Math" panose="02040503050406030204" pitchFamily="18" charset="0"/>
+                                </a:rPr>
+                                <m:t>−(</m:t>
+                              </m:r>
+                              <m:sSub>
+                                <m:sSubPr>
+                                  <m:ctrlPr>
+                                    <a:rPr lang="de-DE" b="0" i="1" smtClean="0">
+                                      <a:solidFill>
+                                        <a:schemeClr val="accent2"/>
+                                      </a:solidFill>
+                                      <a:latin typeface="Cambria Math" panose="02040503050406030204" pitchFamily="18" charset="0"/>
+                                    </a:rPr>
+                                  </m:ctrlPr>
+                                </m:sSubPr>
+                                <m:e>
+                                  <m:r>
+                                    <a:rPr lang="de-DE" b="0" i="1" smtClean="0">
+                                      <a:solidFill>
+                                        <a:schemeClr val="accent2"/>
+                                      </a:solidFill>
+                                      <a:latin typeface="Cambria Math" panose="02040503050406030204" pitchFamily="18" charset="0"/>
+                                    </a:rPr>
+                                    <m:t>𝑚</m:t>
+                                  </m:r>
+                                </m:e>
+                                <m:sub>
+                                  <m:r>
+                                    <a:rPr lang="de-DE" b="0" i="1" smtClean="0">
+                                      <a:solidFill>
+                                        <a:schemeClr val="accent2"/>
+                                      </a:solidFill>
+                                      <a:latin typeface="Cambria Math" panose="02040503050406030204" pitchFamily="18" charset="0"/>
+                                    </a:rPr>
+                                    <m:t>1</m:t>
+                                  </m:r>
+                                </m:sub>
+                              </m:sSub>
+                              <m:r>
+                                <a:rPr lang="de-DE" b="0" i="1" smtClean="0">
+                                  <a:latin typeface="Cambria Math" panose="02040503050406030204" pitchFamily="18" charset="0"/>
+                                </a:rPr>
+                                <m:t>⋅</m:t>
+                              </m:r>
+                              <m:sSub>
+                                <m:sSubPr>
+                                  <m:ctrlPr>
+                                    <a:rPr lang="de-DE" b="0" i="1" smtClean="0">
+                                      <a:solidFill>
+                                        <a:schemeClr val="accent2"/>
+                                      </a:solidFill>
+                                      <a:latin typeface="Cambria Math" panose="02040503050406030204" pitchFamily="18" charset="0"/>
+                                    </a:rPr>
+                                  </m:ctrlPr>
+                                </m:sSubPr>
+                                <m:e>
+                                  <m:r>
+                                    <a:rPr lang="de-DE" b="0" i="1" smtClean="0">
+                                      <a:latin typeface="Cambria Math" panose="02040503050406030204" pitchFamily="18" charset="0"/>
+                                    </a:rPr>
+                                    <m:t>𝑥</m:t>
+                                  </m:r>
+                                </m:e>
+                                <m:sub>
+                                  <m:r>
+                                    <a:rPr lang="de-DE" b="0" i="1" smtClean="0">
+                                      <a:latin typeface="Cambria Math" panose="02040503050406030204" pitchFamily="18" charset="0"/>
+                                    </a:rPr>
+                                    <m:t>1</m:t>
+                                  </m:r>
+                                </m:sub>
+                              </m:sSub>
+                              <m:r>
+                                <a:rPr lang="de-DE" b="0" i="1" smtClean="0">
+                                  <a:latin typeface="Cambria Math" panose="02040503050406030204" pitchFamily="18" charset="0"/>
+                                </a:rPr>
+                                <m:t>+</m:t>
+                              </m:r>
+                              <m:sSub>
+                                <m:sSubPr>
+                                  <m:ctrlPr>
+                                    <a:rPr lang="de-DE" i="1">
+                                      <a:solidFill>
+                                        <a:schemeClr val="accent2"/>
+                                      </a:solidFill>
+                                      <a:latin typeface="Cambria Math" panose="02040503050406030204" pitchFamily="18" charset="0"/>
+                                    </a:rPr>
+                                  </m:ctrlPr>
+                                </m:sSubPr>
+                                <m:e>
+                                  <m:r>
+                                    <a:rPr lang="de-DE" i="1">
+                                      <a:solidFill>
+                                        <a:schemeClr val="accent2"/>
+                                      </a:solidFill>
+                                      <a:latin typeface="Cambria Math" panose="02040503050406030204" pitchFamily="18" charset="0"/>
+                                    </a:rPr>
+                                    <m:t>𝑚</m:t>
+                                  </m:r>
+                                </m:e>
+                                <m:sub>
+                                  <m:r>
+                                    <a:rPr lang="de-DE" b="0" i="1" smtClean="0">
+                                      <a:solidFill>
+                                        <a:schemeClr val="accent2"/>
+                                      </a:solidFill>
+                                      <a:latin typeface="Cambria Math" panose="02040503050406030204" pitchFamily="18" charset="0"/>
+                                    </a:rPr>
+                                    <m:t>2</m:t>
+                                  </m:r>
+                                </m:sub>
+                              </m:sSub>
+                              <m:r>
+                                <a:rPr lang="de-DE" i="1">
+                                  <a:latin typeface="Cambria Math" panose="02040503050406030204" pitchFamily="18" charset="0"/>
+                                </a:rPr>
+                                <m:t>⋅</m:t>
+                              </m:r>
+                              <m:sSub>
+                                <m:sSubPr>
+                                  <m:ctrlPr>
+                                    <a:rPr lang="de-DE" i="1">
+                                      <a:solidFill>
+                                        <a:schemeClr val="accent2"/>
+                                      </a:solidFill>
+                                      <a:latin typeface="Cambria Math" panose="02040503050406030204" pitchFamily="18" charset="0"/>
+                                    </a:rPr>
+                                  </m:ctrlPr>
+                                </m:sSubPr>
+                                <m:e>
+                                  <m:r>
+                                    <a:rPr lang="de-DE" i="1">
+                                      <a:latin typeface="Cambria Math" panose="02040503050406030204" pitchFamily="18" charset="0"/>
+                                    </a:rPr>
+                                    <m:t>𝑥</m:t>
+                                  </m:r>
+                                </m:e>
+                                <m:sub>
+                                  <m:r>
+                                    <a:rPr lang="de-DE" b="0" i="1" smtClean="0">
+                                      <a:latin typeface="Cambria Math" panose="02040503050406030204" pitchFamily="18" charset="0"/>
+                                    </a:rPr>
+                                    <m:t>2</m:t>
+                                  </m:r>
+                                </m:sub>
+                              </m:sSub>
+                              <m:r>
+                                <a:rPr lang="de-DE" b="0" i="1" smtClean="0">
+                                  <a:latin typeface="Cambria Math" panose="02040503050406030204" pitchFamily="18" charset="0"/>
+                                </a:rPr>
+                                <m:t>+</m:t>
+                              </m:r>
+                              <m:r>
+                                <a:rPr lang="de-DE" b="0" i="1" smtClean="0">
+                                  <a:solidFill>
+                                    <a:schemeClr val="accent2"/>
+                                  </a:solidFill>
+                                  <a:latin typeface="Cambria Math" panose="02040503050406030204" pitchFamily="18" charset="0"/>
+                                </a:rPr>
+                                <m:t>𝑏</m:t>
+                              </m:r>
+                              <m:r>
+                                <a:rPr lang="de-DE" b="0" i="1" smtClean="0">
+                                  <a:latin typeface="Cambria Math" panose="02040503050406030204" pitchFamily="18" charset="0"/>
+                                </a:rPr>
+                                <m:t>)</m:t>
+                              </m:r>
+                            </m:sup>
+                          </m:sSup>
+                        </m:den>
+                      </m:f>
+                    </m:oMath>
+                  </m:oMathPara>
                 </a14:m>
-                <a:endParaRPr lang="de-DE" b="0" dirty="0"/>
-              </a:p>
-              <a:p>
-                <a14:m>
-                  <m:oMath xmlns:m="http://schemas.openxmlformats.org/officeDocument/2006/math">
-                    <m:r>
-                      <a:rPr lang="de-DE" b="0" i="1" smtClean="0">
-                        <a:latin typeface="Cambria Math" panose="02040503050406030204" pitchFamily="18" charset="0"/>
-                      </a:rPr>
-                      <m:t>𝑎</m:t>
-                    </m:r>
-                    <m:r>
-                      <a:rPr lang="de-DE" b="0" i="1" smtClean="0">
-                        <a:latin typeface="Cambria Math" panose="02040503050406030204" pitchFamily="18" charset="0"/>
-                      </a:rPr>
-                      <m:t>∈</m:t>
-                    </m:r>
-                    <m:r>
-                      <a:rPr lang="de-DE" b="0" i="1" smtClean="0">
-                        <a:latin typeface="Cambria Math" panose="02040503050406030204" pitchFamily="18" charset="0"/>
-                      </a:rPr>
-                      <m:t>ℝ</m:t>
-                    </m:r>
-                  </m:oMath>
-                </a14:m>
-                <a:r>
-                  <a:rPr lang="de-DE" dirty="0"/>
-                  <a:t> </a:t>
-                </a:r>
-                <a:r>
-                  <a:rPr lang="de-DE" dirty="0" err="1"/>
-                  <a:t>describes</a:t>
-                </a:r>
-                <a:r>
-                  <a:rPr lang="de-DE" dirty="0"/>
-                  <a:t> </a:t>
-                </a:r>
-                <a:r>
-                  <a:rPr lang="de-DE" dirty="0" err="1"/>
-                  <a:t>the</a:t>
-                </a:r>
-                <a:r>
-                  <a:rPr lang="de-DE" dirty="0"/>
-                  <a:t> </a:t>
-                </a:r>
-                <a:r>
-                  <a:rPr lang="de-DE" dirty="0" err="1"/>
-                  <a:t>left-right</a:t>
-                </a:r>
-                <a:r>
-                  <a:rPr lang="de-DE" dirty="0"/>
-                  <a:t> shift </a:t>
-                </a:r>
-                <a:r>
-                  <a:rPr lang="de-DE" dirty="0" err="1"/>
-                  <a:t>of</a:t>
-                </a:r>
-                <a:r>
-                  <a:rPr lang="de-DE" dirty="0"/>
-                  <a:t> </a:t>
-                </a:r>
-                <a:r>
-                  <a:rPr lang="de-DE" dirty="0" err="1"/>
-                  <a:t>the</a:t>
-                </a:r>
-                <a:r>
-                  <a:rPr lang="de-DE" dirty="0"/>
-                  <a:t> </a:t>
-                </a:r>
-                <a:r>
-                  <a:rPr lang="de-DE" dirty="0" err="1"/>
-                  <a:t>curve</a:t>
-                </a:r>
                 <a:endParaRPr lang="de-DE" dirty="0"/>
-              </a:p>
-              <a:p>
-                <a14:m>
-                  <m:oMath xmlns:m="http://schemas.openxmlformats.org/officeDocument/2006/math">
-                    <m:r>
-                      <a:rPr lang="de-DE" b="0" i="1" smtClean="0">
-                        <a:latin typeface="Cambria Math" panose="02040503050406030204" pitchFamily="18" charset="0"/>
-                      </a:rPr>
-                      <m:t>𝑏</m:t>
-                    </m:r>
-                    <m:r>
-                      <a:rPr lang="de-DE" b="0" i="1" smtClean="0">
-                        <a:latin typeface="Cambria Math" panose="02040503050406030204" pitchFamily="18" charset="0"/>
-                      </a:rPr>
-                      <m:t>∈</m:t>
-                    </m:r>
-                    <m:r>
-                      <a:rPr lang="de-DE" b="0" i="1" smtClean="0">
-                        <a:latin typeface="Cambria Math" panose="02040503050406030204" pitchFamily="18" charset="0"/>
-                      </a:rPr>
-                      <m:t>ℝ</m:t>
-                    </m:r>
-                  </m:oMath>
-                </a14:m>
-                <a:r>
-                  <a:rPr lang="de-DE" dirty="0"/>
-                  <a:t> </a:t>
-                </a:r>
-                <a:r>
-                  <a:rPr lang="de-DE" dirty="0" err="1"/>
-                  <a:t>describes</a:t>
-                </a:r>
-                <a:r>
-                  <a:rPr lang="de-DE" dirty="0"/>
-                  <a:t> </a:t>
-                </a:r>
-                <a:r>
-                  <a:rPr lang="de-DE" dirty="0" err="1"/>
-                  <a:t>the</a:t>
-                </a:r>
-                <a:r>
-                  <a:rPr lang="de-DE" dirty="0"/>
-                  <a:t> </a:t>
-                </a:r>
-                <a:r>
-                  <a:rPr lang="de-DE" dirty="0" err="1"/>
-                  <a:t>slope</a:t>
-                </a:r>
-                <a:r>
-                  <a:rPr lang="de-DE" dirty="0"/>
-                  <a:t> </a:t>
-                </a:r>
-                <a:r>
-                  <a:rPr lang="de-DE" dirty="0" err="1"/>
-                  <a:t>of</a:t>
-                </a:r>
-                <a:r>
-                  <a:rPr lang="de-DE" dirty="0"/>
-                  <a:t> </a:t>
-                </a:r>
-                <a:r>
-                  <a:rPr lang="de-DE" dirty="0" err="1"/>
-                  <a:t>the</a:t>
-                </a:r>
-                <a:r>
-                  <a:rPr lang="de-DE" dirty="0"/>
-                  <a:t> </a:t>
-                </a:r>
-                <a:r>
-                  <a:rPr lang="de-DE" dirty="0" err="1"/>
-                  <a:t>curve</a:t>
-                </a:r>
-                <a:r>
-                  <a:rPr lang="de-DE" dirty="0"/>
-                  <a:t>.</a:t>
-                </a:r>
-              </a:p>
-              <a:p>
-                <a:r>
-                  <a:rPr lang="de-DE" dirty="0"/>
-                  <a:t>Goal: Find </a:t>
-                </a:r>
-                <a14:m>
-                  <m:oMath xmlns:m="http://schemas.openxmlformats.org/officeDocument/2006/math">
-                    <m:r>
-                      <a:rPr lang="de-DE" b="0" i="1" smtClean="0">
-                        <a:latin typeface="Cambria Math" panose="02040503050406030204" pitchFamily="18" charset="0"/>
-                      </a:rPr>
-                      <m:t>𝑎</m:t>
-                    </m:r>
-                    <m:r>
-                      <a:rPr lang="de-DE" b="0" i="1" smtClean="0">
-                        <a:latin typeface="Cambria Math" panose="02040503050406030204" pitchFamily="18" charset="0"/>
-                      </a:rPr>
-                      <m:t>,</m:t>
-                    </m:r>
-                    <m:r>
-                      <a:rPr lang="de-DE" b="0" i="1" smtClean="0">
-                        <a:latin typeface="Cambria Math" panose="02040503050406030204" pitchFamily="18" charset="0"/>
-                      </a:rPr>
-                      <m:t>𝑏</m:t>
-                    </m:r>
-                  </m:oMath>
-                </a14:m>
-                <a:r>
-                  <a:rPr lang="de-DE" dirty="0"/>
-                  <a:t> so </a:t>
-                </a:r>
-                <a:r>
-                  <a:rPr lang="de-DE" dirty="0" err="1"/>
-                  <a:t>that</a:t>
-                </a:r>
-                <a:r>
-                  <a:rPr lang="de-DE" dirty="0"/>
-                  <a:t> </a:t>
-                </a:r>
-                <a:r>
-                  <a:rPr lang="de-DE" dirty="0" err="1"/>
-                  <a:t>the</a:t>
-                </a:r>
-                <a:r>
-                  <a:rPr lang="de-DE" dirty="0"/>
-                  <a:t> Log Loss </a:t>
-                </a:r>
-                <a:r>
-                  <a:rPr lang="de-DE" dirty="0" err="1"/>
-                  <a:t>is</a:t>
-                </a:r>
-                <a:r>
-                  <a:rPr lang="de-DE" dirty="0"/>
-                  <a:t> minimal.</a:t>
-                </a:r>
-              </a:p>
-              <a:p>
-                <a:r>
-                  <a:rPr lang="de-DE" dirty="0"/>
-                  <a:t>This </a:t>
-                </a:r>
-                <a:r>
-                  <a:rPr lang="de-DE" dirty="0" err="1"/>
-                  <a:t>cannot</a:t>
-                </a:r>
-                <a:r>
-                  <a:rPr lang="de-DE" dirty="0"/>
-                  <a:t> </a:t>
-                </a:r>
-                <a:r>
-                  <a:rPr lang="de-DE" dirty="0" err="1"/>
-                  <a:t>be</a:t>
-                </a:r>
-                <a:r>
-                  <a:rPr lang="de-DE" dirty="0"/>
-                  <a:t> </a:t>
-                </a:r>
-                <a:r>
-                  <a:rPr lang="de-DE" dirty="0" err="1"/>
-                  <a:t>calculated</a:t>
-                </a:r>
-                <a:r>
-                  <a:rPr lang="de-DE" dirty="0"/>
-                  <a:t> </a:t>
-                </a:r>
-                <a:r>
-                  <a:rPr lang="de-DE" dirty="0" err="1"/>
-                  <a:t>directly</a:t>
-                </a:r>
-                <a:r>
-                  <a:rPr lang="de-DE" dirty="0"/>
-                  <a:t> but </a:t>
-                </a:r>
-                <a:r>
-                  <a:rPr lang="de-DE" dirty="0" err="1"/>
-                  <a:t>is</a:t>
-                </a:r>
-                <a:r>
-                  <a:rPr lang="de-DE" dirty="0"/>
-                  <a:t> </a:t>
-                </a:r>
-                <a:r>
-                  <a:rPr lang="de-DE" dirty="0" err="1"/>
-                  <a:t>approximated</a:t>
-                </a:r>
-                <a:r>
-                  <a:rPr lang="de-DE" dirty="0"/>
-                  <a:t> </a:t>
-                </a:r>
-                <a:r>
-                  <a:rPr lang="de-DE" dirty="0" err="1"/>
-                  <a:t>using</a:t>
-                </a:r>
-                <a:r>
-                  <a:rPr lang="de-DE" dirty="0"/>
-                  <a:t> </a:t>
-                </a:r>
-                <a:r>
-                  <a:rPr lang="de-DE" dirty="0" err="1"/>
-                  <a:t>gradient</a:t>
-                </a:r>
-                <a:r>
-                  <a:rPr lang="de-DE" dirty="0"/>
-                  <a:t> </a:t>
-                </a:r>
-                <a:r>
-                  <a:rPr lang="de-DE" dirty="0" err="1"/>
-                  <a:t>descent</a:t>
-                </a:r>
-                <a:r>
-                  <a:rPr lang="de-DE" dirty="0"/>
-                  <a:t>.</a:t>
-                </a:r>
               </a:p>
             </p:txBody>
           </p:sp>
         </mc:Choice>
-        <mc:Fallback xmlns="">
+        <mc:Fallback>
           <p:sp>
             <p:nvSpPr>
-              <p:cNvPr id="3" name="Inhaltsplatzhalter 2">
+              <p:cNvPr id="5" name="Textfeld 4">
                 <a:extLst>
                   <a:ext uri="{FF2B5EF4-FFF2-40B4-BE49-F238E27FC236}">
-                    <a16:creationId xmlns:a16="http://schemas.microsoft.com/office/drawing/2014/main" id="{6991F8D8-0EF1-7693-1AB2-B91584EC1298}"/>
+                    <a16:creationId xmlns:a16="http://schemas.microsoft.com/office/drawing/2014/main" id="{90D6A029-A90D-3664-9B74-6571D23D0B1F}"/>
                   </a:ext>
                 </a:extLst>
               </p:cNvPr>
-              <p:cNvSpPr>
-                <a:spLocks noGrp="1" noRot="1" noChangeAspect="1" noMove="1" noResize="1" noEditPoints="1" noAdjustHandles="1" noChangeArrowheads="1" noChangeShapeType="1" noTextEdit="1"/>
+              <p:cNvSpPr txBox="1">
+                <a:spLocks noRot="1" noChangeAspect="1" noMove="1" noResize="1" noEditPoints="1" noAdjustHandles="1" noChangeArrowheads="1" noChangeShapeType="1" noTextEdit="1"/>
               </p:cNvSpPr>
-              <p:nvPr>
-                <p:ph idx="1"/>
-              </p:nvPr>
+              <p:nvPr/>
             </p:nvSpPr>
             <p:spPr>
               <a:xfrm>
-                <a:off x="838200" y="1825625"/>
-                <a:ext cx="10515600" cy="1989857"/>
+                <a:off x="5207747" y="3280625"/>
+                <a:ext cx="3155030" cy="625043"/>
               </a:xfrm>
+              <a:prstGeom prst="rect">
+                <a:avLst/>
+              </a:prstGeom>
               <a:blipFill>
-                <a:blip r:embed="rId2"/>
+                <a:blip r:embed="rId3"/>
                 <a:stretch>
-                  <a:fillRect l="-696" b="-5810"/>
+                  <a:fillRect/>
                 </a:stretch>
               </a:blipFill>
             </p:spPr>
@@ -7446,57 +10201,10 @@
           </p:sp>
         </mc:Fallback>
       </mc:AlternateContent>
-      <p:pic>
-        <p:nvPicPr>
-          <p:cNvPr id="4" name="Picture 2">
-            <a:extLst>
-              <a:ext uri="{FF2B5EF4-FFF2-40B4-BE49-F238E27FC236}">
-                <a16:creationId xmlns:a16="http://schemas.microsoft.com/office/drawing/2014/main" id="{A438729C-5600-AAD9-A13C-D1ADEF411806}"/>
-              </a:ext>
-            </a:extLst>
-          </p:cNvPr>
-          <p:cNvPicPr>
-            <a:picLocks noChangeAspect="1" noChangeArrowheads="1"/>
-          </p:cNvPicPr>
-          <p:nvPr/>
-        </p:nvPicPr>
-        <p:blipFill>
-          <a:blip r:embed="rId3">
-            <a:extLst>
-              <a:ext uri="{28A0092B-C50C-407E-A947-70E740481C1C}">
-                <a14:useLocalDpi xmlns:a14="http://schemas.microsoft.com/office/drawing/2010/main" val="0"/>
-              </a:ext>
-            </a:extLst>
-          </a:blip>
-          <a:srcRect/>
-          <a:stretch>
-            <a:fillRect/>
-          </a:stretch>
-        </p:blipFill>
-        <p:spPr bwMode="auto">
-          <a:xfrm>
-            <a:off x="0" y="3870325"/>
-            <a:ext cx="12192000" cy="2987675"/>
-          </a:xfrm>
-          <a:prstGeom prst="rect">
-            <a:avLst/>
-          </a:prstGeom>
-          <a:noFill/>
-          <a:extLst>
-            <a:ext uri="{909E8E84-426E-40DD-AFC4-6F175D3DCCD1}">
-              <a14:hiddenFill xmlns:a14="http://schemas.microsoft.com/office/drawing/2010/main">
-                <a:solidFill>
-                  <a:srgbClr val="FFFFFF"/>
-                </a:solidFill>
-              </a14:hiddenFill>
-            </a:ext>
-          </a:extLst>
-        </p:spPr>
-      </p:pic>
     </p:spTree>
     <p:extLst>
       <p:ext uri="{BB962C8B-B14F-4D97-AF65-F5344CB8AC3E}">
-        <p14:creationId xmlns:p14="http://schemas.microsoft.com/office/powerpoint/2010/main" val="3069520951"/>
+        <p14:creationId xmlns:p14="http://schemas.microsoft.com/office/powerpoint/2010/main" val="4202574528"/>
       </p:ext>
     </p:extLst>
   </p:cSld>
@@ -7528,7 +10236,7 @@
           <p:cNvPr id="2" name="Titel 1">
             <a:extLst>
               <a:ext uri="{FF2B5EF4-FFF2-40B4-BE49-F238E27FC236}">
-                <a16:creationId xmlns:a16="http://schemas.microsoft.com/office/drawing/2014/main" id="{22B2E460-72DC-B2DA-9A49-0D3C610FD5A7}"/>
+                <a16:creationId xmlns:a16="http://schemas.microsoft.com/office/drawing/2014/main" id="{6B6964EA-2E2F-9FE5-DD1D-A7421E921F3F}"/>
               </a:ext>
             </a:extLst>
           </p:cNvPr>
@@ -7545,150 +10253,76 @@
           <a:lstStyle/>
           <a:p>
             <a:r>
-              <a:rPr lang="de-DE" dirty="0" err="1"/>
-              <a:t>Example</a:t>
-            </a:r>
-            <a:endParaRPr lang="de-DE" dirty="0"/>
+              <a:rPr lang="de-DE" dirty="0"/>
+              <a:t>Zielsetzung</a:t>
+            </a:r>
           </a:p>
         </p:txBody>
       </p:sp>
-      <p:pic>
-        <p:nvPicPr>
-          <p:cNvPr id="4" name="Grafik 3">
-            <a:extLst>
-              <a:ext uri="{FF2B5EF4-FFF2-40B4-BE49-F238E27FC236}">
-                <a16:creationId xmlns:a16="http://schemas.microsoft.com/office/drawing/2014/main" id="{61091D9F-D366-0E43-039E-0F90ACEBC268}"/>
-              </a:ext>
-            </a:extLst>
-          </p:cNvPr>
-          <p:cNvPicPr>
-            <a:picLocks noChangeAspect="1"/>
-          </p:cNvPicPr>
-          <p:nvPr/>
-        </p:nvPicPr>
-        <p:blipFill>
-          <a:blip r:embed="rId2"/>
-          <a:stretch>
-            <a:fillRect/>
-          </a:stretch>
-        </p:blipFill>
-        <p:spPr>
-          <a:xfrm>
-            <a:off x="5873782" y="0"/>
-            <a:ext cx="6318218" cy="6858000"/>
-          </a:xfrm>
-          <a:prstGeom prst="rect">
-            <a:avLst/>
-          </a:prstGeom>
-        </p:spPr>
-      </p:pic>
-      <p:pic>
-        <p:nvPicPr>
-          <p:cNvPr id="5" name="Grafik 4">
-            <a:extLst>
-              <a:ext uri="{FF2B5EF4-FFF2-40B4-BE49-F238E27FC236}">
-                <a16:creationId xmlns:a16="http://schemas.microsoft.com/office/drawing/2014/main" id="{C27BDDEF-DACD-6479-C08C-A167509E5A0F}"/>
-              </a:ext>
-            </a:extLst>
-          </p:cNvPr>
-          <p:cNvPicPr>
-            <a:picLocks noChangeAspect="1"/>
-          </p:cNvPicPr>
-          <p:nvPr/>
-        </p:nvPicPr>
-        <p:blipFill>
-          <a:blip r:embed="rId3"/>
-          <a:stretch>
-            <a:fillRect/>
-          </a:stretch>
-        </p:blipFill>
-        <p:spPr>
-          <a:xfrm>
-            <a:off x="1445249" y="1825625"/>
-            <a:ext cx="4254365" cy="4854981"/>
-          </a:xfrm>
-          <a:prstGeom prst="rect">
-            <a:avLst/>
-          </a:prstGeom>
-        </p:spPr>
-      </p:pic>
       <p:sp>
         <p:nvSpPr>
-          <p:cNvPr id="8" name="Pfeil: nach rechts 7">
+          <p:cNvPr id="3" name="Inhaltsplatzhalter 2">
             <a:extLst>
               <a:ext uri="{FF2B5EF4-FFF2-40B4-BE49-F238E27FC236}">
-                <a16:creationId xmlns:a16="http://schemas.microsoft.com/office/drawing/2014/main" id="{67BCAD93-534E-2AE0-751B-AC3FC3D07E54}"/>
+                <a16:creationId xmlns:a16="http://schemas.microsoft.com/office/drawing/2014/main" id="{6ED04231-E6A2-EB80-0C4F-E13DA574E3B2}"/>
               </a:ext>
             </a:extLst>
           </p:cNvPr>
-          <p:cNvSpPr/>
-          <p:nvPr/>
+          <p:cNvSpPr>
+            <a:spLocks noGrp="1"/>
+          </p:cNvSpPr>
+          <p:nvPr>
+            <p:ph idx="1"/>
+          </p:nvPr>
         </p:nvSpPr>
-        <p:spPr>
-          <a:xfrm>
-            <a:off x="0" y="1825626"/>
-            <a:ext cx="1504545" cy="1325564"/>
-          </a:xfrm>
-          <a:prstGeom prst="rightArrow">
-            <a:avLst>
-              <a:gd name="adj1" fmla="val 73483"/>
-              <a:gd name="adj2" fmla="val 48532"/>
-            </a:avLst>
-          </a:prstGeom>
-        </p:spPr>
-        <p:style>
-          <a:lnRef idx="2">
-            <a:schemeClr val="accent1">
-              <a:shade val="15000"/>
-            </a:schemeClr>
-          </a:lnRef>
-          <a:fillRef idx="1">
-            <a:schemeClr val="accent1"/>
-          </a:fillRef>
-          <a:effectRef idx="0">
-            <a:schemeClr val="accent1"/>
-          </a:effectRef>
-          <a:fontRef idx="minor">
-            <a:schemeClr val="lt1"/>
-          </a:fontRef>
-        </p:style>
+        <p:spPr/>
         <p:txBody>
-          <a:bodyPr rtlCol="0" anchor="ctr"/>
+          <a:bodyPr/>
           <a:lstStyle/>
           <a:p>
-            <a:pPr algn="ctr"/>
-            <a:r>
-              <a:rPr lang="de-DE" sz="1200" dirty="0"/>
-              <a:t>3 </a:t>
-            </a:r>
-            <a:r>
-              <a:rPr lang="de-DE" sz="1200" dirty="0" err="1"/>
-              <a:t>groups</a:t>
-            </a:r>
-            <a:r>
-              <a:rPr lang="de-DE" sz="1200" dirty="0"/>
-              <a:t> = 3 different </a:t>
-            </a:r>
-            <a:r>
-              <a:rPr lang="de-DE" sz="1200" dirty="0" err="1"/>
-              <a:t>logistic</a:t>
-            </a:r>
-            <a:r>
-              <a:rPr lang="de-DE" sz="1200" dirty="0"/>
-              <a:t> </a:t>
-            </a:r>
-            <a:r>
-              <a:rPr lang="de-DE" sz="1200" dirty="0" err="1"/>
-              <a:t>functions</a:t>
-            </a:r>
-            <a:endParaRPr lang="de-DE" sz="1200" dirty="0"/>
+            <a:r>
+              <a:rPr lang="de-DE" dirty="0"/>
+              <a:t>Datensatz: </a:t>
+            </a:r>
+            <a:r>
+              <a:rPr lang="de-DE" dirty="0" err="1"/>
+              <a:t>features</a:t>
+            </a:r>
+            <a:r>
+              <a:rPr lang="de-DE" dirty="0"/>
+              <a:t>, Target: Klasse</a:t>
+            </a:r>
+          </a:p>
+          <a:p>
+            <a:r>
+              <a:rPr lang="de-DE" dirty="0"/>
+              <a:t>Features -&gt; </a:t>
+            </a:r>
+            <a:r>
+              <a:rPr lang="de-DE" dirty="0" err="1"/>
+              <a:t>wahrscheinlichkeit</a:t>
+            </a:r>
+            <a:r>
+              <a:rPr lang="de-DE" dirty="0"/>
+              <a:t> für jede Klasse</a:t>
+            </a:r>
+          </a:p>
+          <a:p>
+            <a:r>
+              <a:rPr lang="de-DE" dirty="0" err="1"/>
+              <a:t>Samlple</a:t>
+            </a:r>
+            <a:r>
+              <a:rPr lang="de-DE" dirty="0"/>
+              <a:t>: [1,3,2] -&gt; 65% Klasse 1, 35% Klasse 2 -&gt; Klasse 1</a:t>
+            </a:r>
           </a:p>
         </p:txBody>
       </p:sp>
     </p:spTree>
     <p:extLst>
       <p:ext uri="{BB962C8B-B14F-4D97-AF65-F5344CB8AC3E}">
-        <p14:creationId xmlns:p14="http://schemas.microsoft.com/office/powerpoint/2010/main" val="1397998639"/>
+        <p14:creationId xmlns:p14="http://schemas.microsoft.com/office/powerpoint/2010/main" val="1489651421"/>
       </p:ext>
     </p:extLst>
   </p:cSld>

</xml_diff>

<commit_message>
added log loss explaination
</commit_message>
<xml_diff>
--- a/More Machine Learning with Python.pptx
+++ b/More Machine Learning with Python.pptx
@@ -5,7 +5,7 @@
     <p:sldMasterId id="2147483648" r:id="rId1"/>
   </p:sldMasterIdLst>
   <p:notesMasterIdLst>
-    <p:notesMasterId r:id="rId14"/>
+    <p:notesMasterId r:id="rId16"/>
   </p:notesMasterIdLst>
   <p:sldIdLst>
     <p:sldId id="256" r:id="rId2"/>
@@ -20,6 +20,8 @@
     <p:sldId id="258" r:id="rId11"/>
     <p:sldId id="274" r:id="rId12"/>
     <p:sldId id="275" r:id="rId13"/>
+    <p:sldId id="278" r:id="rId14"/>
+    <p:sldId id="279" r:id="rId15"/>
   </p:sldIdLst>
   <p:sldSz cx="12192000" cy="6858000"/>
   <p:notesSz cx="6858000" cy="9144000"/>
@@ -143,6 +145,8 @@
             <p14:sldId id="258"/>
             <p14:sldId id="274"/>
             <p14:sldId id="275"/>
+            <p14:sldId id="278"/>
+            <p14:sldId id="279"/>
           </p14:sldIdLst>
         </p14:section>
       </p14:sectionLst>
@@ -236,7 +240,7 @@
           <a:p>
             <a:fld id="{F173E992-BAA7-4051-A13F-EA3666D40470}" type="datetimeFigureOut">
               <a:rPr lang="de-DE" smtClean="0"/>
-              <a:t>02.12.2023</a:t>
+              <a:t>07.12.2023</a:t>
             </a:fld>
             <a:endParaRPr lang="de-DE"/>
           </a:p>
@@ -587,6 +591,93 @@
 </p:notes>
 </file>
 
+<file path=ppt/notesSlides/notesSlide2.xml><?xml version="1.0" encoding="utf-8"?>
+<p:notes xmlns:a="http://schemas.openxmlformats.org/drawingml/2006/main" xmlns:r="http://schemas.openxmlformats.org/officeDocument/2006/relationships" xmlns:p="http://schemas.openxmlformats.org/presentationml/2006/main">
+  <p:cSld>
+    <p:spTree>
+      <p:nvGrpSpPr>
+        <p:cNvPr id="1" name=""/>
+        <p:cNvGrpSpPr/>
+        <p:nvPr/>
+      </p:nvGrpSpPr>
+      <p:grpSpPr>
+        <a:xfrm>
+          <a:off x="0" y="0"/>
+          <a:ext cx="0" cy="0"/>
+          <a:chOff x="0" y="0"/>
+          <a:chExt cx="0" cy="0"/>
+        </a:xfrm>
+      </p:grpSpPr>
+      <p:sp>
+        <p:nvSpPr>
+          <p:cNvPr id="2" name="Folienbildplatzhalter 1"/>
+          <p:cNvSpPr>
+            <a:spLocks noGrp="1" noRot="1" noChangeAspect="1"/>
+          </p:cNvSpPr>
+          <p:nvPr>
+            <p:ph type="sldImg"/>
+          </p:nvPr>
+        </p:nvSpPr>
+        <p:spPr/>
+      </p:sp>
+      <p:sp>
+        <p:nvSpPr>
+          <p:cNvPr id="3" name="Notizenplatzhalter 2"/>
+          <p:cNvSpPr>
+            <a:spLocks noGrp="1"/>
+          </p:cNvSpPr>
+          <p:nvPr>
+            <p:ph type="body" idx="1"/>
+          </p:nvPr>
+        </p:nvSpPr>
+        <p:spPr/>
+        <p:txBody>
+          <a:bodyPr/>
+          <a:lstStyle/>
+          <a:p>
+            <a:r>
+              <a:rPr lang="de-DE" dirty="0"/>
+              <a:t>https://www.geogebra.org/calculator/adyrhg8y</a:t>
+            </a:r>
+          </a:p>
+        </p:txBody>
+      </p:sp>
+      <p:sp>
+        <p:nvSpPr>
+          <p:cNvPr id="4" name="Foliennummernplatzhalter 3"/>
+          <p:cNvSpPr>
+            <a:spLocks noGrp="1"/>
+          </p:cNvSpPr>
+          <p:nvPr>
+            <p:ph type="sldNum" sz="quarter" idx="5"/>
+          </p:nvPr>
+        </p:nvSpPr>
+        <p:spPr/>
+        <p:txBody>
+          <a:bodyPr/>
+          <a:lstStyle/>
+          <a:p>
+            <a:fld id="{6760F715-8F13-4386-86B1-DF171DC760FF}" type="slidenum">
+              <a:rPr lang="de-DE" smtClean="0"/>
+              <a:t>14</a:t>
+            </a:fld>
+            <a:endParaRPr lang="de-DE"/>
+          </a:p>
+        </p:txBody>
+      </p:sp>
+    </p:spTree>
+    <p:extLst>
+      <p:ext uri="{BB962C8B-B14F-4D97-AF65-F5344CB8AC3E}">
+        <p14:creationId xmlns:p14="http://schemas.microsoft.com/office/powerpoint/2010/main" val="2528654815"/>
+      </p:ext>
+    </p:extLst>
+  </p:cSld>
+  <p:clrMapOvr>
+    <a:masterClrMapping/>
+  </p:clrMapOvr>
+</p:notes>
+</file>
+
 <file path=ppt/slideLayouts/slideLayout1.xml><?xml version="1.0" encoding="utf-8"?>
 <p:sldLayout xmlns:a="http://schemas.openxmlformats.org/drawingml/2006/main" xmlns:r="http://schemas.openxmlformats.org/officeDocument/2006/relationships" xmlns:p="http://schemas.openxmlformats.org/presentationml/2006/main" type="title" preserve="1">
   <p:cSld name="Titelfolie">
@@ -734,7 +825,7 @@
           <a:p>
             <a:fld id="{9195C45A-9F98-4906-86F2-1D731308AF34}" type="datetimeFigureOut">
               <a:rPr lang="de-DE" smtClean="0"/>
-              <a:t>02.12.2023</a:t>
+              <a:t>07.12.2023</a:t>
             </a:fld>
             <a:endParaRPr lang="de-DE"/>
           </a:p>
@@ -932,7 +1023,7 @@
           <a:p>
             <a:fld id="{9195C45A-9F98-4906-86F2-1D731308AF34}" type="datetimeFigureOut">
               <a:rPr lang="de-DE" smtClean="0"/>
-              <a:t>02.12.2023</a:t>
+              <a:t>07.12.2023</a:t>
             </a:fld>
             <a:endParaRPr lang="de-DE"/>
           </a:p>
@@ -1140,7 +1231,7 @@
           <a:p>
             <a:fld id="{9195C45A-9F98-4906-86F2-1D731308AF34}" type="datetimeFigureOut">
               <a:rPr lang="de-DE" smtClean="0"/>
-              <a:t>02.12.2023</a:t>
+              <a:t>07.12.2023</a:t>
             </a:fld>
             <a:endParaRPr lang="de-DE"/>
           </a:p>
@@ -1338,7 +1429,7 @@
           <a:p>
             <a:fld id="{9195C45A-9F98-4906-86F2-1D731308AF34}" type="datetimeFigureOut">
               <a:rPr lang="de-DE" smtClean="0"/>
-              <a:t>02.12.2023</a:t>
+              <a:t>07.12.2023</a:t>
             </a:fld>
             <a:endParaRPr lang="de-DE"/>
           </a:p>
@@ -1613,7 +1704,7 @@
           <a:p>
             <a:fld id="{9195C45A-9F98-4906-86F2-1D731308AF34}" type="datetimeFigureOut">
               <a:rPr lang="de-DE" smtClean="0"/>
-              <a:t>02.12.2023</a:t>
+              <a:t>07.12.2023</a:t>
             </a:fld>
             <a:endParaRPr lang="de-DE"/>
           </a:p>
@@ -1878,7 +1969,7 @@
           <a:p>
             <a:fld id="{9195C45A-9F98-4906-86F2-1D731308AF34}" type="datetimeFigureOut">
               <a:rPr lang="de-DE" smtClean="0"/>
-              <a:t>02.12.2023</a:t>
+              <a:t>07.12.2023</a:t>
             </a:fld>
             <a:endParaRPr lang="de-DE"/>
           </a:p>
@@ -2290,7 +2381,7 @@
           <a:p>
             <a:fld id="{9195C45A-9F98-4906-86F2-1D731308AF34}" type="datetimeFigureOut">
               <a:rPr lang="de-DE" smtClean="0"/>
-              <a:t>02.12.2023</a:t>
+              <a:t>07.12.2023</a:t>
             </a:fld>
             <a:endParaRPr lang="de-DE"/>
           </a:p>
@@ -2431,7 +2522,7 @@
           <a:p>
             <a:fld id="{9195C45A-9F98-4906-86F2-1D731308AF34}" type="datetimeFigureOut">
               <a:rPr lang="de-DE" smtClean="0"/>
-              <a:t>02.12.2023</a:t>
+              <a:t>07.12.2023</a:t>
             </a:fld>
             <a:endParaRPr lang="de-DE"/>
           </a:p>
@@ -2544,7 +2635,7 @@
           <a:p>
             <a:fld id="{9195C45A-9F98-4906-86F2-1D731308AF34}" type="datetimeFigureOut">
               <a:rPr lang="de-DE" smtClean="0"/>
-              <a:t>02.12.2023</a:t>
+              <a:t>07.12.2023</a:t>
             </a:fld>
             <a:endParaRPr lang="de-DE"/>
           </a:p>
@@ -2855,7 +2946,7 @@
           <a:p>
             <a:fld id="{9195C45A-9F98-4906-86F2-1D731308AF34}" type="datetimeFigureOut">
               <a:rPr lang="de-DE" smtClean="0"/>
-              <a:t>02.12.2023</a:t>
+              <a:t>07.12.2023</a:t>
             </a:fld>
             <a:endParaRPr lang="de-DE"/>
           </a:p>
@@ -3143,7 +3234,7 @@
           <a:p>
             <a:fld id="{9195C45A-9F98-4906-86F2-1D731308AF34}" type="datetimeFigureOut">
               <a:rPr lang="de-DE" smtClean="0"/>
-              <a:t>02.12.2023</a:t>
+              <a:t>07.12.2023</a:t>
             </a:fld>
             <a:endParaRPr lang="de-DE"/>
           </a:p>
@@ -3384,7 +3475,7 @@
           <a:p>
             <a:fld id="{9195C45A-9F98-4906-86F2-1D731308AF34}" type="datetimeFigureOut">
               <a:rPr lang="de-DE" smtClean="0"/>
-              <a:t>02.12.2023</a:t>
+              <a:t>07.12.2023</a:t>
             </a:fld>
             <a:endParaRPr lang="de-DE"/>
           </a:p>
@@ -3932,8 +4023,8 @@
           </a:p>
         </p:txBody>
       </p:sp>
-      <mc:AlternateContent xmlns:mc="http://schemas.openxmlformats.org/markup-compatibility/2006">
-        <mc:Choice xmlns:a14="http://schemas.microsoft.com/office/drawing/2010/main" Requires="a14">
+      <mc:AlternateContent xmlns:mc="http://schemas.openxmlformats.org/markup-compatibility/2006" xmlns:a14="http://schemas.microsoft.com/office/drawing/2010/main">
+        <mc:Choice Requires="a14">
           <p:sp>
             <p:nvSpPr>
               <p:cNvPr id="3" name="Inhaltsplatzhalter 2">
@@ -4014,13 +4105,7 @@
                           <a:rPr lang="de-DE" b="0" i="1" smtClean="0">
                             <a:latin typeface="Cambria Math" panose="02040503050406030204" pitchFamily="18" charset="0"/>
                           </a:rPr>
-                          <m:t>1</m:t>
-                        </m:r>
-                        <m:r>
-                          <a:rPr lang="de-DE" b="0" i="1" smtClean="0">
-                            <a:latin typeface="Cambria Math" panose="02040503050406030204" pitchFamily="18" charset="0"/>
-                          </a:rPr>
-                          <m:t>+</m:t>
+                          <m:t>1+</m:t>
                         </m:r>
                         <m:sSup>
                           <m:sSupPr>
@@ -4368,7 +4453,7 @@
             </p:txBody>
           </p:sp>
         </mc:Choice>
-        <mc:Fallback>
+        <mc:Fallback xmlns="">
           <p:sp>
             <p:nvSpPr>
               <p:cNvPr id="3" name="Inhaltsplatzhalter 2">
@@ -4806,6 +4891,3855 @@
     <p:extLst>
       <p:ext uri="{BB962C8B-B14F-4D97-AF65-F5344CB8AC3E}">
         <p14:creationId xmlns:p14="http://schemas.microsoft.com/office/powerpoint/2010/main" val="2177436548"/>
+      </p:ext>
+    </p:extLst>
+  </p:cSld>
+  <p:clrMapOvr>
+    <a:masterClrMapping/>
+  </p:clrMapOvr>
+</p:sld>
+</file>
+
+<file path=ppt/slides/slide13.xml><?xml version="1.0" encoding="utf-8"?>
+<p:sld xmlns:a="http://schemas.openxmlformats.org/drawingml/2006/main" xmlns:r="http://schemas.openxmlformats.org/officeDocument/2006/relationships" xmlns:p="http://schemas.openxmlformats.org/presentationml/2006/main">
+  <p:cSld>
+    <p:spTree>
+      <p:nvGrpSpPr>
+        <p:cNvPr id="1" name=""/>
+        <p:cNvGrpSpPr/>
+        <p:nvPr/>
+      </p:nvGrpSpPr>
+      <p:grpSpPr>
+        <a:xfrm>
+          <a:off x="0" y="0"/>
+          <a:ext cx="0" cy="0"/>
+          <a:chOff x="0" y="0"/>
+          <a:chExt cx="0" cy="0"/>
+        </a:xfrm>
+      </p:grpSpPr>
+      <p:sp>
+        <p:nvSpPr>
+          <p:cNvPr id="2" name="Titel 1">
+            <a:extLst>
+              <a:ext uri="{FF2B5EF4-FFF2-40B4-BE49-F238E27FC236}">
+                <a16:creationId xmlns:a16="http://schemas.microsoft.com/office/drawing/2014/main" id="{8D08950E-91CE-D7B2-7D2D-87E27D441880}"/>
+              </a:ext>
+            </a:extLst>
+          </p:cNvPr>
+          <p:cNvSpPr>
+            <a:spLocks noGrp="1"/>
+          </p:cNvSpPr>
+          <p:nvPr>
+            <p:ph type="title"/>
+          </p:nvPr>
+        </p:nvSpPr>
+        <p:spPr/>
+        <p:txBody>
+          <a:bodyPr/>
+          <a:lstStyle/>
+          <a:p>
+            <a:r>
+              <a:rPr lang="de-DE" dirty="0"/>
+              <a:t>Log Loss</a:t>
+            </a:r>
+          </a:p>
+        </p:txBody>
+      </p:sp>
+      <mc:AlternateContent xmlns:mc="http://schemas.openxmlformats.org/markup-compatibility/2006">
+        <mc:Choice xmlns:a14="http://schemas.microsoft.com/office/drawing/2010/main" Requires="a14">
+          <p:sp>
+            <p:nvSpPr>
+              <p:cNvPr id="3" name="Inhaltsplatzhalter 2">
+                <a:extLst>
+                  <a:ext uri="{FF2B5EF4-FFF2-40B4-BE49-F238E27FC236}">
+                    <a16:creationId xmlns:a16="http://schemas.microsoft.com/office/drawing/2014/main" id="{DD9CB6F5-5CD5-B1FC-316B-BF3237A696DD}"/>
+                  </a:ext>
+                </a:extLst>
+              </p:cNvPr>
+              <p:cNvSpPr>
+                <a:spLocks noGrp="1"/>
+              </p:cNvSpPr>
+              <p:nvPr>
+                <p:ph idx="1"/>
+              </p:nvPr>
+            </p:nvSpPr>
+            <p:spPr/>
+            <p:txBody>
+              <a:bodyPr/>
+              <a:lstStyle/>
+              <a:p>
+                <a:r>
+                  <a:rPr lang="de-DE" b="0" dirty="0"/>
+                  <a:t>For </a:t>
+                </a:r>
+                <a:r>
+                  <a:rPr lang="de-DE" b="0" dirty="0" err="1"/>
+                  <a:t>the</a:t>
+                </a:r>
+                <a:r>
+                  <a:rPr lang="de-DE" b="0" dirty="0"/>
+                  <a:t> </a:t>
+                </a:r>
+                <a:r>
+                  <a:rPr lang="de-DE" b="0" dirty="0" err="1"/>
+                  <a:t>Logistic</a:t>
+                </a:r>
+                <a:r>
+                  <a:rPr lang="de-DE" b="0" dirty="0"/>
+                  <a:t> </a:t>
+                </a:r>
+                <a:r>
+                  <a:rPr lang="de-DE" b="0" dirty="0" err="1"/>
+                  <a:t>regression</a:t>
+                </a:r>
+                <a:r>
+                  <a:rPr lang="de-DE" b="0" dirty="0"/>
+                  <a:t> </a:t>
+                </a:r>
+                <a:r>
+                  <a:rPr lang="de-DE" b="0" dirty="0" err="1"/>
+                  <a:t>we</a:t>
+                </a:r>
+                <a:r>
+                  <a:rPr lang="de-DE" b="0" dirty="0"/>
+                  <a:t> </a:t>
+                </a:r>
+                <a:r>
+                  <a:rPr lang="de-DE" b="0" dirty="0" err="1"/>
+                  <a:t>use</a:t>
+                </a:r>
+                <a:r>
+                  <a:rPr lang="de-DE" b="0" dirty="0"/>
+                  <a:t> </a:t>
+                </a:r>
+                <a:r>
+                  <a:rPr lang="de-DE" b="0" dirty="0" err="1"/>
+                  <a:t>the</a:t>
+                </a:r>
+                <a:r>
+                  <a:rPr lang="de-DE" b="0" dirty="0"/>
+                  <a:t> </a:t>
+                </a:r>
+                <a:r>
+                  <a:rPr lang="de-DE" b="1" dirty="0"/>
+                  <a:t>log</a:t>
+                </a:r>
+                <a:r>
+                  <a:rPr lang="de-DE" b="0" dirty="0"/>
+                  <a:t> </a:t>
+                </a:r>
+                <a:r>
+                  <a:rPr lang="de-DE" b="0" dirty="0" err="1"/>
+                  <a:t>loss</a:t>
+                </a:r>
+                <a:r>
+                  <a:rPr lang="de-DE" b="0" dirty="0"/>
+                  <a:t> </a:t>
+                </a:r>
+                <a:r>
+                  <a:rPr lang="en-US" b="0" i="0" dirty="0">
+                    <a:solidFill>
+                      <a:srgbClr val="212529"/>
+                    </a:solidFill>
+                    <a:effectLst/>
+                    <a:latin typeface="-apple-system"/>
+                  </a:rPr>
+                  <a:t>aka </a:t>
+                </a:r>
+                <a:r>
+                  <a:rPr lang="en-US" b="1" i="0" dirty="0">
+                    <a:solidFill>
+                      <a:srgbClr val="212529"/>
+                    </a:solidFill>
+                    <a:effectLst/>
+                    <a:latin typeface="-apple-system"/>
+                  </a:rPr>
+                  <a:t>logistic</a:t>
+                </a:r>
+                <a:r>
+                  <a:rPr lang="en-US" b="0" i="0" dirty="0">
+                    <a:solidFill>
+                      <a:srgbClr val="212529"/>
+                    </a:solidFill>
+                    <a:effectLst/>
+                    <a:latin typeface="-apple-system"/>
+                  </a:rPr>
+                  <a:t> loss or </a:t>
+                </a:r>
+                <a:r>
+                  <a:rPr lang="en-US" b="1" i="0" dirty="0">
+                    <a:solidFill>
+                      <a:srgbClr val="212529"/>
+                    </a:solidFill>
+                    <a:effectLst/>
+                    <a:latin typeface="-apple-system"/>
+                  </a:rPr>
+                  <a:t>cross-entropy</a:t>
+                </a:r>
+                <a:r>
+                  <a:rPr lang="en-US" b="0" i="0" dirty="0">
+                    <a:solidFill>
+                      <a:srgbClr val="212529"/>
+                    </a:solidFill>
+                    <a:effectLst/>
+                    <a:latin typeface="-apple-system"/>
+                  </a:rPr>
+                  <a:t> loss</a:t>
+                </a:r>
+                <a:endParaRPr lang="de-DE" b="0" dirty="0"/>
+              </a:p>
+              <a:p>
+                <a14:m>
+                  <m:oMath xmlns:m="http://schemas.openxmlformats.org/officeDocument/2006/math">
+                    <m:sSub>
+                      <m:sSubPr>
+                        <m:ctrlPr>
+                          <a:rPr lang="de-DE" b="0" i="1" smtClean="0">
+                            <a:latin typeface="Cambria Math" panose="02040503050406030204" pitchFamily="18" charset="0"/>
+                          </a:rPr>
+                        </m:ctrlPr>
+                      </m:sSubPr>
+                      <m:e>
+                        <m:r>
+                          <a:rPr lang="de-DE" b="0" i="1" smtClean="0">
+                            <a:latin typeface="Cambria Math" panose="02040503050406030204" pitchFamily="18" charset="0"/>
+                          </a:rPr>
+                          <m:t>𝐿</m:t>
+                        </m:r>
+                      </m:e>
+                      <m:sub>
+                        <m:r>
+                          <a:rPr lang="de-DE" b="0" i="1" smtClean="0">
+                            <a:latin typeface="Cambria Math" panose="02040503050406030204" pitchFamily="18" charset="0"/>
+                          </a:rPr>
+                          <m:t>𝑙𝑜𝑔</m:t>
+                        </m:r>
+                      </m:sub>
+                    </m:sSub>
+                    <m:d>
+                      <m:dPr>
+                        <m:ctrlPr>
+                          <a:rPr lang="de-DE" b="0" i="1" smtClean="0">
+                            <a:latin typeface="Cambria Math" panose="02040503050406030204" pitchFamily="18" charset="0"/>
+                          </a:rPr>
+                        </m:ctrlPr>
+                      </m:dPr>
+                      <m:e>
+                        <m:r>
+                          <a:rPr lang="de-DE" b="0" i="1" smtClean="0">
+                            <a:latin typeface="Cambria Math" panose="02040503050406030204" pitchFamily="18" charset="0"/>
+                          </a:rPr>
+                          <m:t>𝑦</m:t>
+                        </m:r>
+                        <m:r>
+                          <a:rPr lang="de-DE" b="0" i="1" smtClean="0">
+                            <a:latin typeface="Cambria Math" panose="02040503050406030204" pitchFamily="18" charset="0"/>
+                          </a:rPr>
+                          <m:t>,</m:t>
+                        </m:r>
+                        <m:acc>
+                          <m:accPr>
+                            <m:chr m:val="̂"/>
+                            <m:ctrlPr>
+                              <a:rPr lang="de-DE" b="0" i="1" smtClean="0">
+                                <a:latin typeface="Cambria Math" panose="02040503050406030204" pitchFamily="18" charset="0"/>
+                              </a:rPr>
+                            </m:ctrlPr>
+                          </m:accPr>
+                          <m:e>
+                            <m:r>
+                              <a:rPr lang="de-DE" b="0" i="1" smtClean="0">
+                                <a:latin typeface="Cambria Math" panose="02040503050406030204" pitchFamily="18" charset="0"/>
+                              </a:rPr>
+                              <m:t>𝑦</m:t>
+                            </m:r>
+                          </m:e>
+                        </m:acc>
+                      </m:e>
+                    </m:d>
+                    <m:r>
+                      <a:rPr lang="de-DE" b="0" i="1" smtClean="0">
+                        <a:latin typeface="Cambria Math" panose="02040503050406030204" pitchFamily="18" charset="0"/>
+                      </a:rPr>
+                      <m:t>=−</m:t>
+                    </m:r>
+                    <m:d>
+                      <m:dPr>
+                        <m:ctrlPr>
+                          <a:rPr lang="de-DE" b="0" i="1" smtClean="0">
+                            <a:latin typeface="Cambria Math" panose="02040503050406030204" pitchFamily="18" charset="0"/>
+                          </a:rPr>
+                        </m:ctrlPr>
+                      </m:dPr>
+                      <m:e>
+                        <m:r>
+                          <a:rPr lang="de-DE" b="0" i="1" smtClean="0">
+                            <a:latin typeface="Cambria Math" panose="02040503050406030204" pitchFamily="18" charset="0"/>
+                          </a:rPr>
+                          <m:t>𝑦</m:t>
+                        </m:r>
+                        <m:r>
+                          <a:rPr lang="de-DE" b="0" i="1" smtClean="0">
+                            <a:latin typeface="Cambria Math" panose="02040503050406030204" pitchFamily="18" charset="0"/>
+                          </a:rPr>
+                          <m:t>⋅</m:t>
+                        </m:r>
+                        <m:func>
+                          <m:funcPr>
+                            <m:ctrlPr>
+                              <a:rPr lang="de-DE" b="0" i="1" smtClean="0">
+                                <a:latin typeface="Cambria Math" panose="02040503050406030204" pitchFamily="18" charset="0"/>
+                              </a:rPr>
+                            </m:ctrlPr>
+                          </m:funcPr>
+                          <m:fName>
+                            <m:r>
+                              <m:rPr>
+                                <m:sty m:val="p"/>
+                              </m:rPr>
+                              <a:rPr lang="de-DE" b="0" i="0" smtClean="0">
+                                <a:latin typeface="Cambria Math" panose="02040503050406030204" pitchFamily="18" charset="0"/>
+                              </a:rPr>
+                              <m:t>log</m:t>
+                            </m:r>
+                          </m:fName>
+                          <m:e>
+                            <m:d>
+                              <m:dPr>
+                                <m:ctrlPr>
+                                  <a:rPr lang="de-DE" b="0" i="1" smtClean="0">
+                                    <a:latin typeface="Cambria Math" panose="02040503050406030204" pitchFamily="18" charset="0"/>
+                                  </a:rPr>
+                                </m:ctrlPr>
+                              </m:dPr>
+                              <m:e>
+                                <m:acc>
+                                  <m:accPr>
+                                    <m:chr m:val="̂"/>
+                                    <m:ctrlPr>
+                                      <a:rPr lang="de-DE" i="1">
+                                        <a:latin typeface="Cambria Math" panose="02040503050406030204" pitchFamily="18" charset="0"/>
+                                      </a:rPr>
+                                    </m:ctrlPr>
+                                  </m:accPr>
+                                  <m:e>
+                                    <m:r>
+                                      <a:rPr lang="de-DE" i="1">
+                                        <a:latin typeface="Cambria Math" panose="02040503050406030204" pitchFamily="18" charset="0"/>
+                                      </a:rPr>
+                                      <m:t>𝑦</m:t>
+                                    </m:r>
+                                  </m:e>
+                                </m:acc>
+                              </m:e>
+                            </m:d>
+                          </m:e>
+                        </m:func>
+                        <m:r>
+                          <a:rPr lang="de-DE" b="0" i="1" smtClean="0">
+                            <a:latin typeface="Cambria Math" panose="02040503050406030204" pitchFamily="18" charset="0"/>
+                          </a:rPr>
+                          <m:t>+</m:t>
+                        </m:r>
+                        <m:d>
+                          <m:dPr>
+                            <m:ctrlPr>
+                              <a:rPr lang="de-DE" b="0" i="1" smtClean="0">
+                                <a:latin typeface="Cambria Math" panose="02040503050406030204" pitchFamily="18" charset="0"/>
+                              </a:rPr>
+                            </m:ctrlPr>
+                          </m:dPr>
+                          <m:e>
+                            <m:r>
+                              <a:rPr lang="de-DE" b="0" i="1" smtClean="0">
+                                <a:latin typeface="Cambria Math" panose="02040503050406030204" pitchFamily="18" charset="0"/>
+                              </a:rPr>
+                              <m:t>1−</m:t>
+                            </m:r>
+                            <m:r>
+                              <a:rPr lang="de-DE" b="0" i="1" smtClean="0">
+                                <a:latin typeface="Cambria Math" panose="02040503050406030204" pitchFamily="18" charset="0"/>
+                              </a:rPr>
+                              <m:t>𝑦</m:t>
+                            </m:r>
+                          </m:e>
+                        </m:d>
+                        <m:r>
+                          <a:rPr lang="de-DE" b="0" i="1" smtClean="0">
+                            <a:latin typeface="Cambria Math" panose="02040503050406030204" pitchFamily="18" charset="0"/>
+                          </a:rPr>
+                          <m:t>⋅</m:t>
+                        </m:r>
+                        <m:func>
+                          <m:funcPr>
+                            <m:ctrlPr>
+                              <a:rPr lang="de-DE" b="0" i="1" smtClean="0">
+                                <a:latin typeface="Cambria Math" panose="02040503050406030204" pitchFamily="18" charset="0"/>
+                              </a:rPr>
+                            </m:ctrlPr>
+                          </m:funcPr>
+                          <m:fName>
+                            <m:r>
+                              <m:rPr>
+                                <m:sty m:val="p"/>
+                              </m:rPr>
+                              <a:rPr lang="de-DE" b="0" i="0" smtClean="0">
+                                <a:latin typeface="Cambria Math" panose="02040503050406030204" pitchFamily="18" charset="0"/>
+                              </a:rPr>
+                              <m:t>log</m:t>
+                            </m:r>
+                          </m:fName>
+                          <m:e>
+                            <m:d>
+                              <m:dPr>
+                                <m:ctrlPr>
+                                  <a:rPr lang="de-DE" b="0" i="1" smtClean="0">
+                                    <a:latin typeface="Cambria Math" panose="02040503050406030204" pitchFamily="18" charset="0"/>
+                                  </a:rPr>
+                                </m:ctrlPr>
+                              </m:dPr>
+                              <m:e>
+                                <m:r>
+                                  <a:rPr lang="de-DE" b="0" i="1" smtClean="0">
+                                    <a:latin typeface="Cambria Math" panose="02040503050406030204" pitchFamily="18" charset="0"/>
+                                  </a:rPr>
+                                  <m:t>1−</m:t>
+                                </m:r>
+                                <m:acc>
+                                  <m:accPr>
+                                    <m:chr m:val="̂"/>
+                                    <m:ctrlPr>
+                                      <a:rPr lang="de-DE" i="1">
+                                        <a:latin typeface="Cambria Math" panose="02040503050406030204" pitchFamily="18" charset="0"/>
+                                      </a:rPr>
+                                    </m:ctrlPr>
+                                  </m:accPr>
+                                  <m:e>
+                                    <m:r>
+                                      <a:rPr lang="de-DE" i="1">
+                                        <a:latin typeface="Cambria Math" panose="02040503050406030204" pitchFamily="18" charset="0"/>
+                                      </a:rPr>
+                                      <m:t>𝑦</m:t>
+                                    </m:r>
+                                  </m:e>
+                                </m:acc>
+                              </m:e>
+                            </m:d>
+                          </m:e>
+                        </m:func>
+                      </m:e>
+                    </m:d>
+                  </m:oMath>
+                </a14:m>
+                <a:endParaRPr lang="de-DE" dirty="0"/>
+              </a:p>
+              <a:p>
+                <a:r>
+                  <a:rPr lang="de-DE" dirty="0" err="1"/>
+                  <a:t>To</a:t>
+                </a:r>
+                <a:r>
+                  <a:rPr lang="de-DE" dirty="0"/>
+                  <a:t> </a:t>
+                </a:r>
+                <a:r>
+                  <a:rPr lang="de-DE" dirty="0" err="1"/>
+                  <a:t>understand</a:t>
+                </a:r>
+                <a:r>
+                  <a:rPr lang="de-DE" dirty="0"/>
+                  <a:t> </a:t>
+                </a:r>
+                <a:r>
+                  <a:rPr lang="de-DE" dirty="0" err="1"/>
+                  <a:t>the</a:t>
+                </a:r>
+                <a:r>
+                  <a:rPr lang="de-DE" dirty="0"/>
+                  <a:t> </a:t>
+                </a:r>
+                <a:r>
+                  <a:rPr lang="de-DE" dirty="0" err="1"/>
+                  <a:t>formula</a:t>
+                </a:r>
+                <a:r>
+                  <a:rPr lang="de-DE" dirty="0"/>
+                  <a:t>, </a:t>
+                </a:r>
+                <a:r>
+                  <a:rPr lang="de-DE" dirty="0" err="1"/>
+                  <a:t>you</a:t>
+                </a:r>
+                <a:r>
+                  <a:rPr lang="de-DE" dirty="0"/>
+                  <a:t> </a:t>
+                </a:r>
+                <a:r>
+                  <a:rPr lang="de-DE" dirty="0" err="1"/>
+                  <a:t>first</a:t>
+                </a:r>
+                <a:r>
+                  <a:rPr lang="de-DE" dirty="0"/>
+                  <a:t> </a:t>
+                </a:r>
+                <a:r>
+                  <a:rPr lang="de-DE" dirty="0" err="1"/>
+                  <a:t>have</a:t>
+                </a:r>
+                <a:r>
+                  <a:rPr lang="de-DE" dirty="0"/>
+                  <a:t> </a:t>
+                </a:r>
+                <a:r>
+                  <a:rPr lang="de-DE" dirty="0" err="1"/>
+                  <a:t>to</a:t>
+                </a:r>
+                <a:r>
+                  <a:rPr lang="de-DE" dirty="0"/>
+                  <a:t> </a:t>
+                </a:r>
+                <a:r>
+                  <a:rPr lang="de-DE" dirty="0" err="1"/>
+                  <a:t>keep</a:t>
+                </a:r>
+                <a:r>
+                  <a:rPr lang="de-DE" dirty="0"/>
+                  <a:t> in </a:t>
+                </a:r>
+                <a:r>
+                  <a:rPr lang="de-DE" dirty="0" err="1"/>
+                  <a:t>mind</a:t>
+                </a:r>
+                <a:r>
+                  <a:rPr lang="de-DE" dirty="0"/>
+                  <a:t>, </a:t>
+                </a:r>
+                <a:r>
+                  <a:rPr lang="de-DE" dirty="0" err="1"/>
+                  <a:t>that</a:t>
+                </a:r>
+                <a:r>
+                  <a:rPr lang="de-DE" dirty="0"/>
+                  <a:t> </a:t>
+                </a:r>
+                <a14:m>
+                  <m:oMath xmlns:m="http://schemas.openxmlformats.org/officeDocument/2006/math">
+                    <m:r>
+                      <a:rPr lang="de-DE" b="0" i="1" smtClean="0">
+                        <a:latin typeface="Cambria Math" panose="02040503050406030204" pitchFamily="18" charset="0"/>
+                      </a:rPr>
+                      <m:t>𝑦</m:t>
+                    </m:r>
+                    <m:r>
+                      <a:rPr lang="de-DE" b="0" i="1" smtClean="0">
+                        <a:latin typeface="Cambria Math" panose="02040503050406030204" pitchFamily="18" charset="0"/>
+                      </a:rPr>
+                      <m:t>∈</m:t>
+                    </m:r>
+                    <m:d>
+                      <m:dPr>
+                        <m:begChr m:val="{"/>
+                        <m:endChr m:val="}"/>
+                        <m:ctrlPr>
+                          <a:rPr lang="de-DE" b="0" i="1" smtClean="0">
+                            <a:latin typeface="Cambria Math" panose="02040503050406030204" pitchFamily="18" charset="0"/>
+                          </a:rPr>
+                        </m:ctrlPr>
+                      </m:dPr>
+                      <m:e>
+                        <m:r>
+                          <a:rPr lang="de-DE" b="0" i="1" smtClean="0">
+                            <a:latin typeface="Cambria Math" panose="02040503050406030204" pitchFamily="18" charset="0"/>
+                          </a:rPr>
+                          <m:t>0,1</m:t>
+                        </m:r>
+                      </m:e>
+                    </m:d>
+                  </m:oMath>
+                </a14:m>
+                <a:r>
+                  <a:rPr lang="de-DE" dirty="0"/>
+                  <a:t>. So </a:t>
+                </a:r>
+                <a:r>
+                  <a:rPr lang="de-DE" dirty="0" err="1"/>
+                  <a:t>the</a:t>
+                </a:r>
+                <a:r>
+                  <a:rPr lang="de-DE" dirty="0"/>
+                  <a:t> </a:t>
+                </a:r>
+                <a:r>
+                  <a:rPr lang="de-DE" dirty="0" err="1"/>
+                  <a:t>function</a:t>
+                </a:r>
+                <a:r>
+                  <a:rPr lang="de-DE" dirty="0"/>
+                  <a:t> </a:t>
+                </a:r>
+                <a:r>
+                  <a:rPr lang="de-DE" dirty="0" err="1"/>
+                  <a:t>is</a:t>
+                </a:r>
+                <a:r>
+                  <a:rPr lang="de-DE" dirty="0"/>
+                  <a:t> </a:t>
+                </a:r>
+                <a:r>
+                  <a:rPr lang="de-DE" dirty="0" err="1"/>
+                  <a:t>actually</a:t>
+                </a:r>
+                <a:r>
+                  <a:rPr lang="de-DE" dirty="0"/>
+                  <a:t> a </a:t>
+                </a:r>
+                <a:r>
+                  <a:rPr lang="de-DE" dirty="0" err="1"/>
+                  <a:t>combination</a:t>
+                </a:r>
+                <a:r>
+                  <a:rPr lang="de-DE" dirty="0"/>
+                  <a:t> </a:t>
+                </a:r>
+                <a:r>
+                  <a:rPr lang="de-DE" dirty="0" err="1"/>
+                  <a:t>of</a:t>
+                </a:r>
+                <a:r>
+                  <a:rPr lang="de-DE" dirty="0"/>
+                  <a:t> </a:t>
+                </a:r>
+                <a:r>
+                  <a:rPr lang="de-DE" dirty="0" err="1"/>
+                  <a:t>the</a:t>
+                </a:r>
+                <a:r>
+                  <a:rPr lang="de-DE" dirty="0"/>
+                  <a:t> </a:t>
+                </a:r>
+                <a:r>
+                  <a:rPr lang="de-DE" dirty="0" err="1"/>
+                  <a:t>two</a:t>
+                </a:r>
+                <a:r>
+                  <a:rPr lang="de-DE" dirty="0"/>
+                  <a:t> </a:t>
+                </a:r>
+                <a:r>
+                  <a:rPr lang="de-DE" dirty="0" err="1"/>
+                  <a:t>cases</a:t>
+                </a:r>
+                <a:r>
+                  <a:rPr lang="de-DE" dirty="0"/>
+                  <a:t> </a:t>
+                </a:r>
+                <a:r>
+                  <a:rPr lang="de-DE" dirty="0" err="1"/>
+                  <a:t>that</a:t>
+                </a:r>
+                <a:r>
+                  <a:rPr lang="de-DE" dirty="0"/>
+                  <a:t> </a:t>
+                </a:r>
+                <a14:m>
+                  <m:oMath xmlns:m="http://schemas.openxmlformats.org/officeDocument/2006/math">
+                    <m:r>
+                      <a:rPr lang="de-DE" b="0" i="1" smtClean="0">
+                        <a:latin typeface="Cambria Math" panose="02040503050406030204" pitchFamily="18" charset="0"/>
+                      </a:rPr>
+                      <m:t>𝑦</m:t>
+                    </m:r>
+                  </m:oMath>
+                </a14:m>
+                <a:r>
+                  <a:rPr lang="de-DE" dirty="0"/>
+                  <a:t> </a:t>
+                </a:r>
+                <a:r>
+                  <a:rPr lang="de-DE" dirty="0" err="1"/>
+                  <a:t>is</a:t>
+                </a:r>
+                <a:r>
+                  <a:rPr lang="de-DE" dirty="0"/>
+                  <a:t> </a:t>
+                </a:r>
+                <a:r>
+                  <a:rPr lang="de-DE" dirty="0" err="1"/>
+                  <a:t>either</a:t>
+                </a:r>
+                <a:r>
+                  <a:rPr lang="de-DE" dirty="0"/>
+                  <a:t> </a:t>
+                </a:r>
+                <a14:m>
+                  <m:oMath xmlns:m="http://schemas.openxmlformats.org/officeDocument/2006/math">
+                    <m:r>
+                      <a:rPr lang="de-DE" b="0" i="1" smtClean="0">
+                        <a:latin typeface="Cambria Math" panose="02040503050406030204" pitchFamily="18" charset="0"/>
+                      </a:rPr>
+                      <m:t>1</m:t>
+                    </m:r>
+                  </m:oMath>
+                </a14:m>
+                <a:r>
+                  <a:rPr lang="de-DE" dirty="0"/>
+                  <a:t> </a:t>
+                </a:r>
+                <a:r>
+                  <a:rPr lang="de-DE" dirty="0" err="1"/>
+                  <a:t>or</a:t>
+                </a:r>
+                <a:r>
+                  <a:rPr lang="de-DE" dirty="0"/>
+                  <a:t> </a:t>
+                </a:r>
+                <a14:m>
+                  <m:oMath xmlns:m="http://schemas.openxmlformats.org/officeDocument/2006/math">
+                    <m:r>
+                      <a:rPr lang="de-DE" b="0" i="1" smtClean="0">
+                        <a:latin typeface="Cambria Math" panose="02040503050406030204" pitchFamily="18" charset="0"/>
+                      </a:rPr>
+                      <m:t>0</m:t>
+                    </m:r>
+                  </m:oMath>
+                </a14:m>
+                <a:r>
+                  <a:rPr lang="de-DE" dirty="0"/>
+                  <a:t>. So </a:t>
+                </a:r>
+                <a:r>
+                  <a:rPr lang="de-DE" dirty="0" err="1"/>
+                  <a:t>the</a:t>
+                </a:r>
+                <a:r>
+                  <a:rPr lang="de-DE" dirty="0"/>
+                  <a:t> </a:t>
+                </a:r>
+                <a:r>
+                  <a:rPr lang="de-DE" dirty="0" err="1"/>
+                  <a:t>formula</a:t>
+                </a:r>
+                <a:r>
+                  <a:rPr lang="de-DE" dirty="0"/>
+                  <a:t> </a:t>
+                </a:r>
+                <a:r>
+                  <a:rPr lang="de-DE" dirty="0" err="1"/>
+                  <a:t>can</a:t>
+                </a:r>
+                <a:r>
+                  <a:rPr lang="de-DE" dirty="0"/>
+                  <a:t> also </a:t>
+                </a:r>
+                <a:r>
+                  <a:rPr lang="de-DE" dirty="0" err="1"/>
+                  <a:t>be</a:t>
+                </a:r>
+                <a:r>
+                  <a:rPr lang="de-DE" dirty="0"/>
+                  <a:t> </a:t>
+                </a:r>
+                <a:r>
+                  <a:rPr lang="de-DE" dirty="0" err="1"/>
+                  <a:t>written</a:t>
+                </a:r>
+                <a:r>
+                  <a:rPr lang="de-DE" dirty="0"/>
+                  <a:t> </a:t>
+                </a:r>
+                <a:r>
+                  <a:rPr lang="de-DE" dirty="0" err="1"/>
+                  <a:t>as</a:t>
+                </a:r>
+                <a:r>
+                  <a:rPr lang="de-DE" dirty="0"/>
+                  <a:t>:</a:t>
+                </a:r>
+              </a:p>
+              <a:p>
+                <a14:m>
+                  <m:oMath xmlns:m="http://schemas.openxmlformats.org/officeDocument/2006/math">
+                    <m:sSub>
+                      <m:sSubPr>
+                        <m:ctrlPr>
+                          <a:rPr lang="de-DE" b="0" i="1" smtClean="0">
+                            <a:latin typeface="Cambria Math" panose="02040503050406030204" pitchFamily="18" charset="0"/>
+                          </a:rPr>
+                        </m:ctrlPr>
+                      </m:sSubPr>
+                      <m:e>
+                        <m:r>
+                          <a:rPr lang="de-DE" b="0" i="1" smtClean="0">
+                            <a:latin typeface="Cambria Math" panose="02040503050406030204" pitchFamily="18" charset="0"/>
+                          </a:rPr>
+                          <m:t>𝐿</m:t>
+                        </m:r>
+                      </m:e>
+                      <m:sub>
+                        <m:r>
+                          <a:rPr lang="de-DE" b="0" i="1" smtClean="0">
+                            <a:latin typeface="Cambria Math" panose="02040503050406030204" pitchFamily="18" charset="0"/>
+                          </a:rPr>
+                          <m:t>𝑙𝑜𝑔</m:t>
+                        </m:r>
+                      </m:sub>
+                    </m:sSub>
+                    <m:d>
+                      <m:dPr>
+                        <m:ctrlPr>
+                          <a:rPr lang="de-DE" b="0" i="1" smtClean="0">
+                            <a:latin typeface="Cambria Math" panose="02040503050406030204" pitchFamily="18" charset="0"/>
+                          </a:rPr>
+                        </m:ctrlPr>
+                      </m:dPr>
+                      <m:e>
+                        <m:r>
+                          <a:rPr lang="de-DE" b="0" i="1" smtClean="0">
+                            <a:latin typeface="Cambria Math" panose="02040503050406030204" pitchFamily="18" charset="0"/>
+                          </a:rPr>
+                          <m:t>𝑦</m:t>
+                        </m:r>
+                        <m:r>
+                          <a:rPr lang="de-DE" b="0" i="1" smtClean="0">
+                            <a:latin typeface="Cambria Math" panose="02040503050406030204" pitchFamily="18" charset="0"/>
+                          </a:rPr>
+                          <m:t>,</m:t>
+                        </m:r>
+                        <m:acc>
+                          <m:accPr>
+                            <m:chr m:val="̂"/>
+                            <m:ctrlPr>
+                              <a:rPr lang="de-DE" i="1">
+                                <a:latin typeface="Cambria Math" panose="02040503050406030204" pitchFamily="18" charset="0"/>
+                              </a:rPr>
+                            </m:ctrlPr>
+                          </m:accPr>
+                          <m:e>
+                            <m:r>
+                              <a:rPr lang="de-DE" i="1">
+                                <a:latin typeface="Cambria Math" panose="02040503050406030204" pitchFamily="18" charset="0"/>
+                              </a:rPr>
+                              <m:t>𝑦</m:t>
+                            </m:r>
+                          </m:e>
+                        </m:acc>
+                      </m:e>
+                    </m:d>
+                    <m:r>
+                      <a:rPr lang="de-DE" b="0" i="1" smtClean="0">
+                        <a:latin typeface="Cambria Math" panose="02040503050406030204" pitchFamily="18" charset="0"/>
+                      </a:rPr>
+                      <m:t>=</m:t>
+                    </m:r>
+                    <m:d>
+                      <m:dPr>
+                        <m:begChr m:val="{"/>
+                        <m:endChr m:val=""/>
+                        <m:ctrlPr>
+                          <a:rPr lang="de-DE" b="0" i="1" smtClean="0">
+                            <a:latin typeface="Cambria Math" panose="02040503050406030204" pitchFamily="18" charset="0"/>
+                          </a:rPr>
+                        </m:ctrlPr>
+                      </m:dPr>
+                      <m:e>
+                        <m:eqArr>
+                          <m:eqArrPr>
+                            <m:ctrlPr>
+                              <a:rPr lang="de-DE" b="0" i="1" smtClean="0">
+                                <a:latin typeface="Cambria Math" panose="02040503050406030204" pitchFamily="18" charset="0"/>
+                              </a:rPr>
+                            </m:ctrlPr>
+                          </m:eqArrPr>
+                          <m:e>
+                            <m:r>
+                              <a:rPr lang="de-DE" b="0" i="1" smtClean="0">
+                                <a:latin typeface="Cambria Math" panose="02040503050406030204" pitchFamily="18" charset="0"/>
+                              </a:rPr>
+                              <m:t>−</m:t>
+                            </m:r>
+                            <m:func>
+                              <m:funcPr>
+                                <m:ctrlPr>
+                                  <a:rPr lang="de-DE" b="0" i="1" smtClean="0">
+                                    <a:latin typeface="Cambria Math" panose="02040503050406030204" pitchFamily="18" charset="0"/>
+                                  </a:rPr>
+                                </m:ctrlPr>
+                              </m:funcPr>
+                              <m:fName>
+                                <m:r>
+                                  <m:rPr>
+                                    <m:sty m:val="p"/>
+                                  </m:rPr>
+                                  <a:rPr lang="de-DE" b="0" i="0" smtClean="0">
+                                    <a:latin typeface="Cambria Math" panose="02040503050406030204" pitchFamily="18" charset="0"/>
+                                  </a:rPr>
+                                  <m:t>log</m:t>
+                                </m:r>
+                              </m:fName>
+                              <m:e>
+                                <m:d>
+                                  <m:dPr>
+                                    <m:ctrlPr>
+                                      <a:rPr lang="de-DE" b="0" i="1" smtClean="0">
+                                        <a:latin typeface="Cambria Math" panose="02040503050406030204" pitchFamily="18" charset="0"/>
+                                      </a:rPr>
+                                    </m:ctrlPr>
+                                  </m:dPr>
+                                  <m:e>
+                                    <m:acc>
+                                      <m:accPr>
+                                        <m:chr m:val="̂"/>
+                                        <m:ctrlPr>
+                                          <a:rPr lang="de-DE" i="1">
+                                            <a:latin typeface="Cambria Math" panose="02040503050406030204" pitchFamily="18" charset="0"/>
+                                          </a:rPr>
+                                        </m:ctrlPr>
+                                      </m:accPr>
+                                      <m:e>
+                                        <m:r>
+                                          <a:rPr lang="de-DE" i="1">
+                                            <a:latin typeface="Cambria Math" panose="02040503050406030204" pitchFamily="18" charset="0"/>
+                                          </a:rPr>
+                                          <m:t>𝑦</m:t>
+                                        </m:r>
+                                      </m:e>
+                                    </m:acc>
+                                  </m:e>
+                                </m:d>
+                              </m:e>
+                            </m:func>
+                            <m:r>
+                              <a:rPr lang="de-DE" b="0" i="1" smtClean="0">
+                                <a:latin typeface="Cambria Math" panose="02040503050406030204" pitchFamily="18" charset="0"/>
+                              </a:rPr>
+                              <m:t>,  </m:t>
+                            </m:r>
+                            <m:r>
+                              <a:rPr lang="de-DE" b="0" i="1" smtClean="0">
+                                <a:latin typeface="Cambria Math" panose="02040503050406030204" pitchFamily="18" charset="0"/>
+                              </a:rPr>
+                              <m:t>𝑦</m:t>
+                            </m:r>
+                            <m:r>
+                              <a:rPr lang="de-DE" b="0" i="1" smtClean="0">
+                                <a:latin typeface="Cambria Math" panose="02040503050406030204" pitchFamily="18" charset="0"/>
+                              </a:rPr>
+                              <m:t>=1</m:t>
+                            </m:r>
+                          </m:e>
+                          <m:e>
+                            <m:r>
+                              <a:rPr lang="de-DE" b="0" i="1" smtClean="0">
+                                <a:latin typeface="Cambria Math" panose="02040503050406030204" pitchFamily="18" charset="0"/>
+                              </a:rPr>
+                              <m:t>&amp;</m:t>
+                            </m:r>
+                            <m:func>
+                              <m:funcPr>
+                                <m:ctrlPr>
+                                  <a:rPr lang="de-DE" b="0" i="1" smtClean="0">
+                                    <a:latin typeface="Cambria Math" panose="02040503050406030204" pitchFamily="18" charset="0"/>
+                                  </a:rPr>
+                                </m:ctrlPr>
+                              </m:funcPr>
+                              <m:fName>
+                                <m:r>
+                                  <a:rPr lang="de-DE" b="0" i="0" smtClean="0">
+                                    <a:latin typeface="Cambria Math" panose="02040503050406030204" pitchFamily="18" charset="0"/>
+                                  </a:rPr>
+                                  <m:t>−</m:t>
+                                </m:r>
+                                <m:r>
+                                  <m:rPr>
+                                    <m:sty m:val="p"/>
+                                  </m:rPr>
+                                  <a:rPr lang="de-DE" b="0" i="0" smtClean="0">
+                                    <a:latin typeface="Cambria Math" panose="02040503050406030204" pitchFamily="18" charset="0"/>
+                                  </a:rPr>
+                                  <m:t>log</m:t>
+                                </m:r>
+                              </m:fName>
+                              <m:e>
+                                <m:d>
+                                  <m:dPr>
+                                    <m:ctrlPr>
+                                      <a:rPr lang="de-DE" b="0" i="1" smtClean="0">
+                                        <a:latin typeface="Cambria Math" panose="02040503050406030204" pitchFamily="18" charset="0"/>
+                                      </a:rPr>
+                                    </m:ctrlPr>
+                                  </m:dPr>
+                                  <m:e>
+                                    <m:r>
+                                      <a:rPr lang="de-DE" b="0" i="1" smtClean="0">
+                                        <a:latin typeface="Cambria Math" panose="02040503050406030204" pitchFamily="18" charset="0"/>
+                                      </a:rPr>
+                                      <m:t>1−</m:t>
+                                    </m:r>
+                                    <m:acc>
+                                      <m:accPr>
+                                        <m:chr m:val="̂"/>
+                                        <m:ctrlPr>
+                                          <a:rPr lang="de-DE" i="1">
+                                            <a:latin typeface="Cambria Math" panose="02040503050406030204" pitchFamily="18" charset="0"/>
+                                          </a:rPr>
+                                        </m:ctrlPr>
+                                      </m:accPr>
+                                      <m:e>
+                                        <m:r>
+                                          <a:rPr lang="de-DE" i="1">
+                                            <a:latin typeface="Cambria Math" panose="02040503050406030204" pitchFamily="18" charset="0"/>
+                                          </a:rPr>
+                                          <m:t>𝑦</m:t>
+                                        </m:r>
+                                      </m:e>
+                                    </m:acc>
+                                  </m:e>
+                                </m:d>
+                              </m:e>
+                            </m:func>
+                            <m:r>
+                              <a:rPr lang="de-DE" b="0" i="1" smtClean="0">
+                                <a:latin typeface="Cambria Math" panose="02040503050406030204" pitchFamily="18" charset="0"/>
+                              </a:rPr>
+                              <m:t>  </m:t>
+                            </m:r>
+                            <m:r>
+                              <a:rPr lang="de-DE" b="0" i="1" smtClean="0">
+                                <a:latin typeface="Cambria Math" panose="02040503050406030204" pitchFamily="18" charset="0"/>
+                              </a:rPr>
+                              <m:t>𝑦</m:t>
+                            </m:r>
+                            <m:r>
+                              <a:rPr lang="de-DE" b="0" i="1" smtClean="0">
+                                <a:latin typeface="Cambria Math" panose="02040503050406030204" pitchFamily="18" charset="0"/>
+                              </a:rPr>
+                              <m:t>=0</m:t>
+                            </m:r>
+                          </m:e>
+                        </m:eqArr>
+                      </m:e>
+                    </m:d>
+                  </m:oMath>
+                </a14:m>
+                <a:endParaRPr lang="de-DE" b="0" dirty="0"/>
+              </a:p>
+              <a:p>
+                <a:endParaRPr lang="de-DE" dirty="0"/>
+              </a:p>
+            </p:txBody>
+          </p:sp>
+        </mc:Choice>
+        <mc:Fallback>
+          <p:sp>
+            <p:nvSpPr>
+              <p:cNvPr id="3" name="Inhaltsplatzhalter 2">
+                <a:extLst>
+                  <a:ext uri="{FF2B5EF4-FFF2-40B4-BE49-F238E27FC236}">
+                    <a16:creationId xmlns:a16="http://schemas.microsoft.com/office/drawing/2014/main" id="{DD9CB6F5-5CD5-B1FC-316B-BF3237A696DD}"/>
+                  </a:ext>
+                </a:extLst>
+              </p:cNvPr>
+              <p:cNvSpPr>
+                <a:spLocks noGrp="1" noRot="1" noChangeAspect="1" noMove="1" noResize="1" noEditPoints="1" noAdjustHandles="1" noChangeArrowheads="1" noChangeShapeType="1" noTextEdit="1"/>
+              </p:cNvSpPr>
+              <p:nvPr>
+                <p:ph idx="1"/>
+              </p:nvPr>
+            </p:nvSpPr>
+            <p:spPr>
+              <a:blipFill>
+                <a:blip r:embed="rId2"/>
+                <a:stretch>
+                  <a:fillRect l="-1043" t="-2241"/>
+                </a:stretch>
+              </a:blipFill>
+            </p:spPr>
+            <p:txBody>
+              <a:bodyPr/>
+              <a:lstStyle/>
+              <a:p>
+                <a:r>
+                  <a:rPr lang="de-DE">
+                    <a:noFill/>
+                  </a:rPr>
+                  <a:t> </a:t>
+                </a:r>
+              </a:p>
+            </p:txBody>
+          </p:sp>
+        </mc:Fallback>
+      </mc:AlternateContent>
+    </p:spTree>
+    <p:extLst>
+      <p:ext uri="{BB962C8B-B14F-4D97-AF65-F5344CB8AC3E}">
+        <p14:creationId xmlns:p14="http://schemas.microsoft.com/office/powerpoint/2010/main" val="2587488473"/>
+      </p:ext>
+    </p:extLst>
+  </p:cSld>
+  <p:clrMapOvr>
+    <a:masterClrMapping/>
+  </p:clrMapOvr>
+</p:sld>
+</file>
+
+<file path=ppt/slides/slide14.xml><?xml version="1.0" encoding="utf-8"?>
+<p:sld xmlns:a="http://schemas.openxmlformats.org/drawingml/2006/main" xmlns:r="http://schemas.openxmlformats.org/officeDocument/2006/relationships" xmlns:p="http://schemas.openxmlformats.org/presentationml/2006/main">
+  <p:cSld>
+    <p:spTree>
+      <p:nvGrpSpPr>
+        <p:cNvPr id="1" name=""/>
+        <p:cNvGrpSpPr/>
+        <p:nvPr/>
+      </p:nvGrpSpPr>
+      <p:grpSpPr>
+        <a:xfrm>
+          <a:off x="0" y="0"/>
+          <a:ext cx="0" cy="0"/>
+          <a:chOff x="0" y="0"/>
+          <a:chExt cx="0" cy="0"/>
+        </a:xfrm>
+      </p:grpSpPr>
+      <mc:AlternateContent xmlns:mc="http://schemas.openxmlformats.org/markup-compatibility/2006">
+        <mc:Choice xmlns:a14="http://schemas.microsoft.com/office/drawing/2010/main" Requires="a14">
+          <p:sp>
+            <p:nvSpPr>
+              <p:cNvPr id="3" name="Inhaltsplatzhalter 2">
+                <a:extLst>
+                  <a:ext uri="{FF2B5EF4-FFF2-40B4-BE49-F238E27FC236}">
+                    <a16:creationId xmlns:a16="http://schemas.microsoft.com/office/drawing/2014/main" id="{D89C5C4A-4015-D508-DE37-DF51E6B61883}"/>
+                  </a:ext>
+                </a:extLst>
+              </p:cNvPr>
+              <p:cNvSpPr>
+                <a:spLocks noGrp="1"/>
+              </p:cNvSpPr>
+              <p:nvPr>
+                <p:ph idx="1"/>
+              </p:nvPr>
+            </p:nvSpPr>
+            <p:spPr>
+              <a:xfrm>
+                <a:off x="838200" y="138794"/>
+                <a:ext cx="6238461" cy="2615765"/>
+              </a:xfrm>
+            </p:spPr>
+            <p:txBody>
+              <a:bodyPr/>
+              <a:lstStyle/>
+              <a:p>
+                <a14:m>
+                  <m:oMath xmlns:m="http://schemas.openxmlformats.org/officeDocument/2006/math">
+                    <m:sSub>
+                      <m:sSubPr>
+                        <m:ctrlPr>
+                          <a:rPr lang="de-DE" b="0" i="1" smtClean="0">
+                            <a:latin typeface="Cambria Math" panose="02040503050406030204" pitchFamily="18" charset="0"/>
+                          </a:rPr>
+                        </m:ctrlPr>
+                      </m:sSubPr>
+                      <m:e>
+                        <m:r>
+                          <a:rPr lang="de-DE" b="0" i="1" smtClean="0">
+                            <a:latin typeface="Cambria Math" panose="02040503050406030204" pitchFamily="18" charset="0"/>
+                          </a:rPr>
+                          <m:t>𝐿</m:t>
+                        </m:r>
+                      </m:e>
+                      <m:sub>
+                        <m:r>
+                          <a:rPr lang="de-DE" b="0" i="1" smtClean="0">
+                            <a:latin typeface="Cambria Math" panose="02040503050406030204" pitchFamily="18" charset="0"/>
+                          </a:rPr>
+                          <m:t>𝑙𝑜𝑔</m:t>
+                        </m:r>
+                      </m:sub>
+                    </m:sSub>
+                    <m:d>
+                      <m:dPr>
+                        <m:ctrlPr>
+                          <a:rPr lang="de-DE" b="0" i="1" smtClean="0">
+                            <a:latin typeface="Cambria Math" panose="02040503050406030204" pitchFamily="18" charset="0"/>
+                          </a:rPr>
+                        </m:ctrlPr>
+                      </m:dPr>
+                      <m:e>
+                        <m:r>
+                          <a:rPr lang="de-DE" b="0" i="1" smtClean="0">
+                            <a:latin typeface="Cambria Math" panose="02040503050406030204" pitchFamily="18" charset="0"/>
+                          </a:rPr>
+                          <m:t>𝑦</m:t>
+                        </m:r>
+                        <m:r>
+                          <a:rPr lang="de-DE" b="0" i="1" smtClean="0">
+                            <a:latin typeface="Cambria Math" panose="02040503050406030204" pitchFamily="18" charset="0"/>
+                          </a:rPr>
+                          <m:t>,</m:t>
+                        </m:r>
+                        <m:acc>
+                          <m:accPr>
+                            <m:chr m:val="̂"/>
+                            <m:ctrlPr>
+                              <a:rPr lang="de-DE" i="1">
+                                <a:latin typeface="Cambria Math" panose="02040503050406030204" pitchFamily="18" charset="0"/>
+                              </a:rPr>
+                            </m:ctrlPr>
+                          </m:accPr>
+                          <m:e>
+                            <m:r>
+                              <a:rPr lang="de-DE" i="1">
+                                <a:latin typeface="Cambria Math" panose="02040503050406030204" pitchFamily="18" charset="0"/>
+                              </a:rPr>
+                              <m:t>𝑦</m:t>
+                            </m:r>
+                          </m:e>
+                        </m:acc>
+                      </m:e>
+                    </m:d>
+                    <m:r>
+                      <a:rPr lang="de-DE" b="0" i="1" smtClean="0">
+                        <a:latin typeface="Cambria Math" panose="02040503050406030204" pitchFamily="18" charset="0"/>
+                      </a:rPr>
+                      <m:t>=</m:t>
+                    </m:r>
+                    <m:d>
+                      <m:dPr>
+                        <m:begChr m:val="{"/>
+                        <m:endChr m:val=""/>
+                        <m:ctrlPr>
+                          <a:rPr lang="de-DE" b="0" i="1" smtClean="0">
+                            <a:latin typeface="Cambria Math" panose="02040503050406030204" pitchFamily="18" charset="0"/>
+                          </a:rPr>
+                        </m:ctrlPr>
+                      </m:dPr>
+                      <m:e>
+                        <m:eqArr>
+                          <m:eqArrPr>
+                            <m:ctrlPr>
+                              <a:rPr lang="de-DE" b="0" i="1" smtClean="0">
+                                <a:latin typeface="Cambria Math" panose="02040503050406030204" pitchFamily="18" charset="0"/>
+                              </a:rPr>
+                            </m:ctrlPr>
+                          </m:eqArrPr>
+                          <m:e>
+                            <m:r>
+                              <a:rPr lang="de-DE" b="0" i="1" smtClean="0">
+                                <a:solidFill>
+                                  <a:schemeClr val="accent1"/>
+                                </a:solidFill>
+                                <a:latin typeface="Cambria Math" panose="02040503050406030204" pitchFamily="18" charset="0"/>
+                              </a:rPr>
+                              <m:t>−</m:t>
+                            </m:r>
+                            <m:func>
+                              <m:funcPr>
+                                <m:ctrlPr>
+                                  <a:rPr lang="de-DE" b="0" i="1" smtClean="0">
+                                    <a:solidFill>
+                                      <a:schemeClr val="accent1"/>
+                                    </a:solidFill>
+                                    <a:latin typeface="Cambria Math" panose="02040503050406030204" pitchFamily="18" charset="0"/>
+                                  </a:rPr>
+                                </m:ctrlPr>
+                              </m:funcPr>
+                              <m:fName>
+                                <m:r>
+                                  <m:rPr>
+                                    <m:sty m:val="p"/>
+                                  </m:rPr>
+                                  <a:rPr lang="de-DE" b="0" i="0" smtClean="0">
+                                    <a:solidFill>
+                                      <a:schemeClr val="accent1"/>
+                                    </a:solidFill>
+                                    <a:latin typeface="Cambria Math" panose="02040503050406030204" pitchFamily="18" charset="0"/>
+                                  </a:rPr>
+                                  <m:t>log</m:t>
+                                </m:r>
+                              </m:fName>
+                              <m:e>
+                                <m:d>
+                                  <m:dPr>
+                                    <m:ctrlPr>
+                                      <a:rPr lang="de-DE" b="0" i="1" smtClean="0">
+                                        <a:solidFill>
+                                          <a:schemeClr val="accent1"/>
+                                        </a:solidFill>
+                                        <a:latin typeface="Cambria Math" panose="02040503050406030204" pitchFamily="18" charset="0"/>
+                                      </a:rPr>
+                                    </m:ctrlPr>
+                                  </m:dPr>
+                                  <m:e>
+                                    <m:acc>
+                                      <m:accPr>
+                                        <m:chr m:val="̂"/>
+                                        <m:ctrlPr>
+                                          <a:rPr lang="de-DE" i="1">
+                                            <a:solidFill>
+                                              <a:schemeClr val="accent1"/>
+                                            </a:solidFill>
+                                            <a:latin typeface="Cambria Math" panose="02040503050406030204" pitchFamily="18" charset="0"/>
+                                          </a:rPr>
+                                        </m:ctrlPr>
+                                      </m:accPr>
+                                      <m:e>
+                                        <m:r>
+                                          <a:rPr lang="de-DE" i="1">
+                                            <a:solidFill>
+                                              <a:schemeClr val="accent1"/>
+                                            </a:solidFill>
+                                            <a:latin typeface="Cambria Math" panose="02040503050406030204" pitchFamily="18" charset="0"/>
+                                          </a:rPr>
+                                          <m:t>𝑦</m:t>
+                                        </m:r>
+                                      </m:e>
+                                    </m:acc>
+                                  </m:e>
+                                </m:d>
+                              </m:e>
+                            </m:func>
+                            <m:r>
+                              <a:rPr lang="de-DE" b="0" i="1" smtClean="0">
+                                <a:latin typeface="Cambria Math" panose="02040503050406030204" pitchFamily="18" charset="0"/>
+                              </a:rPr>
+                              <m:t>,  </m:t>
+                            </m:r>
+                            <m:r>
+                              <a:rPr lang="de-DE" b="0" i="1" smtClean="0">
+                                <a:latin typeface="Cambria Math" panose="02040503050406030204" pitchFamily="18" charset="0"/>
+                              </a:rPr>
+                              <m:t>𝑦</m:t>
+                            </m:r>
+                            <m:r>
+                              <a:rPr lang="de-DE" b="0" i="1" smtClean="0">
+                                <a:latin typeface="Cambria Math" panose="02040503050406030204" pitchFamily="18" charset="0"/>
+                              </a:rPr>
+                              <m:t>=1</m:t>
+                            </m:r>
+                          </m:e>
+                          <m:e>
+                            <m:r>
+                              <a:rPr lang="de-DE" b="0" i="1" smtClean="0">
+                                <a:latin typeface="Cambria Math" panose="02040503050406030204" pitchFamily="18" charset="0"/>
+                              </a:rPr>
+                              <m:t>&amp;</m:t>
+                            </m:r>
+                            <m:func>
+                              <m:funcPr>
+                                <m:ctrlPr>
+                                  <a:rPr lang="de-DE" b="0" i="1" smtClean="0">
+                                    <a:solidFill>
+                                      <a:srgbClr val="FF0000"/>
+                                    </a:solidFill>
+                                    <a:latin typeface="Cambria Math" panose="02040503050406030204" pitchFamily="18" charset="0"/>
+                                  </a:rPr>
+                                </m:ctrlPr>
+                              </m:funcPr>
+                              <m:fName>
+                                <m:r>
+                                  <a:rPr lang="de-DE" b="0" i="0" smtClean="0">
+                                    <a:solidFill>
+                                      <a:srgbClr val="FF0000"/>
+                                    </a:solidFill>
+                                    <a:latin typeface="Cambria Math" panose="02040503050406030204" pitchFamily="18" charset="0"/>
+                                  </a:rPr>
+                                  <m:t>−</m:t>
+                                </m:r>
+                                <m:r>
+                                  <m:rPr>
+                                    <m:sty m:val="p"/>
+                                  </m:rPr>
+                                  <a:rPr lang="de-DE" b="0" i="0" smtClean="0">
+                                    <a:solidFill>
+                                      <a:srgbClr val="FF0000"/>
+                                    </a:solidFill>
+                                    <a:latin typeface="Cambria Math" panose="02040503050406030204" pitchFamily="18" charset="0"/>
+                                  </a:rPr>
+                                  <m:t>log</m:t>
+                                </m:r>
+                              </m:fName>
+                              <m:e>
+                                <m:d>
+                                  <m:dPr>
+                                    <m:ctrlPr>
+                                      <a:rPr lang="de-DE" b="0" i="1" smtClean="0">
+                                        <a:solidFill>
+                                          <a:srgbClr val="FF0000"/>
+                                        </a:solidFill>
+                                        <a:latin typeface="Cambria Math" panose="02040503050406030204" pitchFamily="18" charset="0"/>
+                                      </a:rPr>
+                                    </m:ctrlPr>
+                                  </m:dPr>
+                                  <m:e>
+                                    <m:r>
+                                      <a:rPr lang="de-DE" b="0" i="1" smtClean="0">
+                                        <a:solidFill>
+                                          <a:srgbClr val="FF0000"/>
+                                        </a:solidFill>
+                                        <a:latin typeface="Cambria Math" panose="02040503050406030204" pitchFamily="18" charset="0"/>
+                                      </a:rPr>
+                                      <m:t>1−</m:t>
+                                    </m:r>
+                                    <m:acc>
+                                      <m:accPr>
+                                        <m:chr m:val="̂"/>
+                                        <m:ctrlPr>
+                                          <a:rPr lang="de-DE" i="1">
+                                            <a:solidFill>
+                                              <a:srgbClr val="FF0000"/>
+                                            </a:solidFill>
+                                            <a:latin typeface="Cambria Math" panose="02040503050406030204" pitchFamily="18" charset="0"/>
+                                          </a:rPr>
+                                        </m:ctrlPr>
+                                      </m:accPr>
+                                      <m:e>
+                                        <m:r>
+                                          <a:rPr lang="de-DE" i="1">
+                                            <a:solidFill>
+                                              <a:srgbClr val="FF0000"/>
+                                            </a:solidFill>
+                                            <a:latin typeface="Cambria Math" panose="02040503050406030204" pitchFamily="18" charset="0"/>
+                                          </a:rPr>
+                                          <m:t>𝑦</m:t>
+                                        </m:r>
+                                      </m:e>
+                                    </m:acc>
+                                  </m:e>
+                                </m:d>
+                              </m:e>
+                            </m:func>
+                            <m:r>
+                              <a:rPr lang="de-DE" b="0" i="1" smtClean="0">
+                                <a:latin typeface="Cambria Math" panose="02040503050406030204" pitchFamily="18" charset="0"/>
+                              </a:rPr>
+                              <m:t>,</m:t>
+                            </m:r>
+                            <m:r>
+                              <a:rPr lang="de-DE" b="0" i="1" smtClean="0">
+                                <a:latin typeface="Cambria Math" panose="02040503050406030204" pitchFamily="18" charset="0"/>
+                              </a:rPr>
+                              <m:t>  </m:t>
+                            </m:r>
+                            <m:r>
+                              <a:rPr lang="de-DE" b="0" i="1" smtClean="0">
+                                <a:latin typeface="Cambria Math" panose="02040503050406030204" pitchFamily="18" charset="0"/>
+                              </a:rPr>
+                              <m:t>𝑦</m:t>
+                            </m:r>
+                            <m:r>
+                              <a:rPr lang="de-DE" b="0" i="1" smtClean="0">
+                                <a:latin typeface="Cambria Math" panose="02040503050406030204" pitchFamily="18" charset="0"/>
+                              </a:rPr>
+                              <m:t>=0</m:t>
+                            </m:r>
+                          </m:e>
+                        </m:eqArr>
+                      </m:e>
+                    </m:d>
+                  </m:oMath>
+                </a14:m>
+                <a:endParaRPr lang="de-DE" dirty="0"/>
+              </a:p>
+              <a:p>
+                <a:endParaRPr lang="de-DE" dirty="0"/>
+              </a:p>
+              <a:p>
+                <a14:m>
+                  <m:oMath xmlns:m="http://schemas.openxmlformats.org/officeDocument/2006/math">
+                    <m:sSub>
+                      <m:sSubPr>
+                        <m:ctrlPr>
+                          <a:rPr lang="de-DE" b="0" i="1" smtClean="0">
+                            <a:latin typeface="Cambria Math" panose="02040503050406030204" pitchFamily="18" charset="0"/>
+                          </a:rPr>
+                        </m:ctrlPr>
+                      </m:sSubPr>
+                      <m:e>
+                        <m:r>
+                          <a:rPr lang="de-DE" b="0" i="1" smtClean="0">
+                            <a:latin typeface="Cambria Math" panose="02040503050406030204" pitchFamily="18" charset="0"/>
+                          </a:rPr>
+                          <m:t>𝐿</m:t>
+                        </m:r>
+                      </m:e>
+                      <m:sub>
+                        <m:r>
+                          <a:rPr lang="de-DE" b="0" i="1" smtClean="0">
+                            <a:latin typeface="Cambria Math" panose="02040503050406030204" pitchFamily="18" charset="0"/>
+                          </a:rPr>
+                          <m:t>𝑚𝑠𝑒</m:t>
+                        </m:r>
+                      </m:sub>
+                    </m:sSub>
+                    <m:d>
+                      <m:dPr>
+                        <m:ctrlPr>
+                          <a:rPr lang="de-DE" b="0" i="1" smtClean="0">
+                            <a:latin typeface="Cambria Math" panose="02040503050406030204" pitchFamily="18" charset="0"/>
+                          </a:rPr>
+                        </m:ctrlPr>
+                      </m:dPr>
+                      <m:e>
+                        <m:r>
+                          <a:rPr lang="de-DE" b="0" i="1" smtClean="0">
+                            <a:latin typeface="Cambria Math" panose="02040503050406030204" pitchFamily="18" charset="0"/>
+                          </a:rPr>
+                          <m:t>𝑦</m:t>
+                        </m:r>
+                        <m:r>
+                          <a:rPr lang="de-DE" b="0" i="1" smtClean="0">
+                            <a:latin typeface="Cambria Math" panose="02040503050406030204" pitchFamily="18" charset="0"/>
+                          </a:rPr>
+                          <m:t>,</m:t>
+                        </m:r>
+                        <m:acc>
+                          <m:accPr>
+                            <m:chr m:val="̂"/>
+                            <m:ctrlPr>
+                              <a:rPr lang="de-DE" i="1">
+                                <a:latin typeface="Cambria Math" panose="02040503050406030204" pitchFamily="18" charset="0"/>
+                              </a:rPr>
+                            </m:ctrlPr>
+                          </m:accPr>
+                          <m:e>
+                            <m:r>
+                              <a:rPr lang="de-DE" i="1">
+                                <a:latin typeface="Cambria Math" panose="02040503050406030204" pitchFamily="18" charset="0"/>
+                              </a:rPr>
+                              <m:t>𝑦</m:t>
+                            </m:r>
+                          </m:e>
+                        </m:acc>
+                      </m:e>
+                    </m:d>
+                    <m:r>
+                      <a:rPr lang="de-DE" b="0" i="1" smtClean="0">
+                        <a:latin typeface="Cambria Math" panose="02040503050406030204" pitchFamily="18" charset="0"/>
+                      </a:rPr>
+                      <m:t>=</m:t>
+                    </m:r>
+                    <m:d>
+                      <m:dPr>
+                        <m:begChr m:val="{"/>
+                        <m:endChr m:val=""/>
+                        <m:ctrlPr>
+                          <a:rPr lang="de-DE" b="0" i="1" smtClean="0">
+                            <a:latin typeface="Cambria Math" panose="02040503050406030204" pitchFamily="18" charset="0"/>
+                          </a:rPr>
+                        </m:ctrlPr>
+                      </m:dPr>
+                      <m:e>
+                        <m:eqArr>
+                          <m:eqArrPr>
+                            <m:ctrlPr>
+                              <a:rPr lang="de-DE" b="0" i="1" smtClean="0">
+                                <a:latin typeface="Cambria Math" panose="02040503050406030204" pitchFamily="18" charset="0"/>
+                              </a:rPr>
+                            </m:ctrlPr>
+                          </m:eqArrPr>
+                          <m:e>
+                            <m:func>
+                              <m:funcPr>
+                                <m:ctrlPr>
+                                  <a:rPr lang="de-DE" b="0" i="1" smtClean="0">
+                                    <a:solidFill>
+                                      <a:schemeClr val="accent1"/>
+                                    </a:solidFill>
+                                    <a:latin typeface="Cambria Math" panose="02040503050406030204" pitchFamily="18" charset="0"/>
+                                  </a:rPr>
+                                </m:ctrlPr>
+                              </m:funcPr>
+                              <m:fName>
+                                <m:r>
+                                  <a:rPr lang="de-DE" b="0" i="0" smtClean="0">
+                                    <a:solidFill>
+                                      <a:schemeClr val="accent1"/>
+                                    </a:solidFill>
+                                    <a:latin typeface="Cambria Math" panose="02040503050406030204" pitchFamily="18" charset="0"/>
+                                  </a:rPr>
+                                  <m:t> </m:t>
+                                </m:r>
+                              </m:fName>
+                              <m:e>
+                                <m:sSup>
+                                  <m:sSupPr>
+                                    <m:ctrlPr>
+                                      <a:rPr lang="de-DE" b="0" i="1" smtClean="0">
+                                        <a:solidFill>
+                                          <a:schemeClr val="accent1"/>
+                                        </a:solidFill>
+                                        <a:latin typeface="Cambria Math" panose="02040503050406030204" pitchFamily="18" charset="0"/>
+                                      </a:rPr>
+                                    </m:ctrlPr>
+                                  </m:sSupPr>
+                                  <m:e>
+                                    <m:d>
+                                      <m:dPr>
+                                        <m:ctrlPr>
+                                          <a:rPr lang="de-DE" b="0" i="1" smtClean="0">
+                                            <a:solidFill>
+                                              <a:schemeClr val="accent1"/>
+                                            </a:solidFill>
+                                            <a:latin typeface="Cambria Math" panose="02040503050406030204" pitchFamily="18" charset="0"/>
+                                          </a:rPr>
+                                        </m:ctrlPr>
+                                      </m:dPr>
+                                      <m:e>
+                                        <m:r>
+                                          <a:rPr lang="de-DE" b="0" i="1" smtClean="0">
+                                            <a:solidFill>
+                                              <a:schemeClr val="accent1"/>
+                                            </a:solidFill>
+                                            <a:latin typeface="Cambria Math" panose="02040503050406030204" pitchFamily="18" charset="0"/>
+                                          </a:rPr>
+                                          <m:t>1−</m:t>
+                                        </m:r>
+                                        <m:acc>
+                                          <m:accPr>
+                                            <m:chr m:val="̂"/>
+                                            <m:ctrlPr>
+                                              <a:rPr lang="de-DE" i="1">
+                                                <a:solidFill>
+                                                  <a:schemeClr val="accent1"/>
+                                                </a:solidFill>
+                                                <a:latin typeface="Cambria Math" panose="02040503050406030204" pitchFamily="18" charset="0"/>
+                                              </a:rPr>
+                                            </m:ctrlPr>
+                                          </m:accPr>
+                                          <m:e>
+                                            <m:r>
+                                              <a:rPr lang="de-DE" i="1">
+                                                <a:solidFill>
+                                                  <a:schemeClr val="accent1"/>
+                                                </a:solidFill>
+                                                <a:latin typeface="Cambria Math" panose="02040503050406030204" pitchFamily="18" charset="0"/>
+                                              </a:rPr>
+                                              <m:t>𝑦</m:t>
+                                            </m:r>
+                                          </m:e>
+                                        </m:acc>
+                                      </m:e>
+                                    </m:d>
+                                  </m:e>
+                                  <m:sup>
+                                    <m:r>
+                                      <a:rPr lang="de-DE" b="0" i="1" smtClean="0">
+                                        <a:solidFill>
+                                          <a:schemeClr val="accent1"/>
+                                        </a:solidFill>
+                                        <a:latin typeface="Cambria Math" panose="02040503050406030204" pitchFamily="18" charset="0"/>
+                                      </a:rPr>
+                                      <m:t>2</m:t>
+                                    </m:r>
+                                  </m:sup>
+                                </m:sSup>
+                              </m:e>
+                            </m:func>
+                            <m:r>
+                              <a:rPr lang="de-DE" b="0" i="1" smtClean="0">
+                                <a:latin typeface="Cambria Math" panose="02040503050406030204" pitchFamily="18" charset="0"/>
+                              </a:rPr>
+                              <m:t>,  </m:t>
+                            </m:r>
+                            <m:r>
+                              <a:rPr lang="de-DE" b="0" i="1" smtClean="0">
+                                <a:latin typeface="Cambria Math" panose="02040503050406030204" pitchFamily="18" charset="0"/>
+                              </a:rPr>
+                              <m:t>𝑦</m:t>
+                            </m:r>
+                            <m:r>
+                              <a:rPr lang="de-DE" b="0" i="1" smtClean="0">
+                                <a:latin typeface="Cambria Math" panose="02040503050406030204" pitchFamily="18" charset="0"/>
+                              </a:rPr>
+                              <m:t>=1</m:t>
+                            </m:r>
+                          </m:e>
+                          <m:e>
+                            <m:r>
+                              <a:rPr lang="de-DE" b="0" i="1" smtClean="0">
+                                <a:latin typeface="Cambria Math" panose="02040503050406030204" pitchFamily="18" charset="0"/>
+                              </a:rPr>
+                              <m:t>&amp;</m:t>
+                            </m:r>
+                            <m:func>
+                              <m:funcPr>
+                                <m:ctrlPr>
+                                  <a:rPr lang="de-DE" b="0" i="1" smtClean="0">
+                                    <a:solidFill>
+                                      <a:srgbClr val="FF0000"/>
+                                    </a:solidFill>
+                                    <a:latin typeface="Cambria Math" panose="02040503050406030204" pitchFamily="18" charset="0"/>
+                                  </a:rPr>
+                                </m:ctrlPr>
+                              </m:funcPr>
+                              <m:fName>
+                                <m:r>
+                                  <a:rPr lang="de-DE" b="0" i="0" smtClean="0">
+                                    <a:solidFill>
+                                      <a:srgbClr val="FF0000"/>
+                                    </a:solidFill>
+                                    <a:latin typeface="Cambria Math" panose="02040503050406030204" pitchFamily="18" charset="0"/>
+                                  </a:rPr>
+                                  <m:t> </m:t>
+                                </m:r>
+                              </m:fName>
+                              <m:e>
+                                <m:sSup>
+                                  <m:sSupPr>
+                                    <m:ctrlPr>
+                                      <a:rPr lang="de-DE" b="0" i="1" smtClean="0">
+                                        <a:solidFill>
+                                          <a:srgbClr val="FF0000"/>
+                                        </a:solidFill>
+                                        <a:latin typeface="Cambria Math" panose="02040503050406030204" pitchFamily="18" charset="0"/>
+                                      </a:rPr>
+                                    </m:ctrlPr>
+                                  </m:sSupPr>
+                                  <m:e>
+                                    <m:d>
+                                      <m:dPr>
+                                        <m:ctrlPr>
+                                          <a:rPr lang="de-DE" b="0" i="1" smtClean="0">
+                                            <a:solidFill>
+                                              <a:srgbClr val="FF0000"/>
+                                            </a:solidFill>
+                                            <a:latin typeface="Cambria Math" panose="02040503050406030204" pitchFamily="18" charset="0"/>
+                                          </a:rPr>
+                                        </m:ctrlPr>
+                                      </m:dPr>
+                                      <m:e>
+                                        <m:r>
+                                          <a:rPr lang="de-DE" b="0" i="1" smtClean="0">
+                                            <a:solidFill>
+                                              <a:srgbClr val="FF0000"/>
+                                            </a:solidFill>
+                                            <a:latin typeface="Cambria Math" panose="02040503050406030204" pitchFamily="18" charset="0"/>
+                                          </a:rPr>
+                                          <m:t>0</m:t>
+                                        </m:r>
+                                        <m:r>
+                                          <a:rPr lang="de-DE" b="0" i="1" smtClean="0">
+                                            <a:solidFill>
+                                              <a:srgbClr val="FF0000"/>
+                                            </a:solidFill>
+                                            <a:latin typeface="Cambria Math" panose="02040503050406030204" pitchFamily="18" charset="0"/>
+                                          </a:rPr>
+                                          <m:t>−</m:t>
+                                        </m:r>
+                                        <m:acc>
+                                          <m:accPr>
+                                            <m:chr m:val="̂"/>
+                                            <m:ctrlPr>
+                                              <a:rPr lang="de-DE" i="1">
+                                                <a:solidFill>
+                                                  <a:srgbClr val="FF0000"/>
+                                                </a:solidFill>
+                                                <a:latin typeface="Cambria Math" panose="02040503050406030204" pitchFamily="18" charset="0"/>
+                                              </a:rPr>
+                                            </m:ctrlPr>
+                                          </m:accPr>
+                                          <m:e>
+                                            <m:r>
+                                              <a:rPr lang="de-DE" i="1">
+                                                <a:solidFill>
+                                                  <a:srgbClr val="FF0000"/>
+                                                </a:solidFill>
+                                                <a:latin typeface="Cambria Math" panose="02040503050406030204" pitchFamily="18" charset="0"/>
+                                              </a:rPr>
+                                              <m:t>𝑦</m:t>
+                                            </m:r>
+                                          </m:e>
+                                        </m:acc>
+                                      </m:e>
+                                    </m:d>
+                                  </m:e>
+                                  <m:sup>
+                                    <m:r>
+                                      <a:rPr lang="de-DE" b="0" i="1" smtClean="0">
+                                        <a:solidFill>
+                                          <a:srgbClr val="FF0000"/>
+                                        </a:solidFill>
+                                        <a:latin typeface="Cambria Math" panose="02040503050406030204" pitchFamily="18" charset="0"/>
+                                      </a:rPr>
+                                      <m:t>2</m:t>
+                                    </m:r>
+                                  </m:sup>
+                                </m:sSup>
+                              </m:e>
+                            </m:func>
+                            <m:r>
+                              <a:rPr lang="de-DE" b="0" i="1" smtClean="0">
+                                <a:latin typeface="Cambria Math" panose="02040503050406030204" pitchFamily="18" charset="0"/>
+                              </a:rPr>
+                              <m:t>,  </m:t>
+                            </m:r>
+                            <m:r>
+                              <a:rPr lang="de-DE" b="0" i="1" smtClean="0">
+                                <a:latin typeface="Cambria Math" panose="02040503050406030204" pitchFamily="18" charset="0"/>
+                              </a:rPr>
+                              <m:t>𝑦</m:t>
+                            </m:r>
+                            <m:r>
+                              <a:rPr lang="de-DE" b="0" i="1" smtClean="0">
+                                <a:latin typeface="Cambria Math" panose="02040503050406030204" pitchFamily="18" charset="0"/>
+                              </a:rPr>
+                              <m:t>=0</m:t>
+                            </m:r>
+                          </m:e>
+                        </m:eqArr>
+                      </m:e>
+                    </m:d>
+                  </m:oMath>
+                </a14:m>
+                <a:endParaRPr lang="de-DE" dirty="0"/>
+              </a:p>
+              <a:p>
+                <a:endParaRPr lang="de-DE" dirty="0"/>
+              </a:p>
+              <a:p>
+                <a:endParaRPr lang="de-DE" dirty="0"/>
+              </a:p>
+            </p:txBody>
+          </p:sp>
+        </mc:Choice>
+        <mc:Fallback>
+          <p:sp>
+            <p:nvSpPr>
+              <p:cNvPr id="3" name="Inhaltsplatzhalter 2">
+                <a:extLst>
+                  <a:ext uri="{FF2B5EF4-FFF2-40B4-BE49-F238E27FC236}">
+                    <a16:creationId xmlns:a16="http://schemas.microsoft.com/office/drawing/2014/main" id="{D89C5C4A-4015-D508-DE37-DF51E6B61883}"/>
+                  </a:ext>
+                </a:extLst>
+              </p:cNvPr>
+              <p:cNvSpPr>
+                <a:spLocks noGrp="1" noRot="1" noChangeAspect="1" noMove="1" noResize="1" noEditPoints="1" noAdjustHandles="1" noChangeArrowheads="1" noChangeShapeType="1" noTextEdit="1"/>
+              </p:cNvSpPr>
+              <p:nvPr>
+                <p:ph idx="1"/>
+              </p:nvPr>
+            </p:nvSpPr>
+            <p:spPr>
+              <a:xfrm>
+                <a:off x="838200" y="138794"/>
+                <a:ext cx="6238461" cy="2615765"/>
+              </a:xfrm>
+              <a:blipFill>
+                <a:blip r:embed="rId3"/>
+                <a:stretch>
+                  <a:fillRect/>
+                </a:stretch>
+              </a:blipFill>
+            </p:spPr>
+            <p:txBody>
+              <a:bodyPr/>
+              <a:lstStyle/>
+              <a:p>
+                <a:r>
+                  <a:rPr lang="de-DE">
+                    <a:noFill/>
+                  </a:rPr>
+                  <a:t> </a:t>
+                </a:r>
+              </a:p>
+            </p:txBody>
+          </p:sp>
+        </mc:Fallback>
+      </mc:AlternateContent>
+      <mc:AlternateContent xmlns:mc="http://schemas.openxmlformats.org/markup-compatibility/2006">
+        <mc:Choice xmlns:a14="http://schemas.microsoft.com/office/drawing/2010/main" Requires="a14">
+          <p:graphicFrame>
+            <p:nvGraphicFramePr>
+              <p:cNvPr id="8" name="Tabelle 7">
+                <a:extLst>
+                  <a:ext uri="{FF2B5EF4-FFF2-40B4-BE49-F238E27FC236}">
+                    <a16:creationId xmlns:a16="http://schemas.microsoft.com/office/drawing/2014/main" id="{DD7D06B5-456F-AF52-52E2-04352EBF02B6}"/>
+                  </a:ext>
+                </a:extLst>
+              </p:cNvPr>
+              <p:cNvGraphicFramePr>
+                <a:graphicFrameLocks noGrp="1"/>
+              </p:cNvGraphicFramePr>
+              <p:nvPr>
+                <p:extLst>
+                  <p:ext uri="{D42A27DB-BD31-4B8C-83A1-F6EECF244321}">
+                    <p14:modId xmlns:p14="http://schemas.microsoft.com/office/powerpoint/2010/main" val="4061260395"/>
+                  </p:ext>
+                </p:extLst>
+              </p:nvPr>
+            </p:nvGraphicFramePr>
+            <p:xfrm>
+              <a:off x="963150" y="2907472"/>
+              <a:ext cx="5568280" cy="3725672"/>
+            </p:xfrm>
+            <a:graphic>
+              <a:graphicData uri="http://schemas.openxmlformats.org/drawingml/2006/table">
+                <a:tbl>
+                  <a:tblPr firstRow="1" bandRow="1">
+                    <a:tableStyleId>{5C22544A-7EE6-4342-B048-85BDC9FD1C3A}</a:tableStyleId>
+                  </a:tblPr>
+                  <a:tblGrid>
+                    <a:gridCol w="1113656">
+                      <a:extLst>
+                        <a:ext uri="{9D8B030D-6E8A-4147-A177-3AD203B41FA5}">
+                          <a16:colId xmlns:a16="http://schemas.microsoft.com/office/drawing/2014/main" val="1378614049"/>
+                        </a:ext>
+                      </a:extLst>
+                    </a:gridCol>
+                    <a:gridCol w="1113656">
+                      <a:extLst>
+                        <a:ext uri="{9D8B030D-6E8A-4147-A177-3AD203B41FA5}">
+                          <a16:colId xmlns:a16="http://schemas.microsoft.com/office/drawing/2014/main" val="3553839890"/>
+                        </a:ext>
+                      </a:extLst>
+                    </a:gridCol>
+                    <a:gridCol w="1113656">
+                      <a:extLst>
+                        <a:ext uri="{9D8B030D-6E8A-4147-A177-3AD203B41FA5}">
+                          <a16:colId xmlns:a16="http://schemas.microsoft.com/office/drawing/2014/main" val="2296694669"/>
+                        </a:ext>
+                      </a:extLst>
+                    </a:gridCol>
+                    <a:gridCol w="1113656">
+                      <a:extLst>
+                        <a:ext uri="{9D8B030D-6E8A-4147-A177-3AD203B41FA5}">
+                          <a16:colId xmlns:a16="http://schemas.microsoft.com/office/drawing/2014/main" val="3219764067"/>
+                        </a:ext>
+                      </a:extLst>
+                    </a:gridCol>
+                    <a:gridCol w="1113656">
+                      <a:extLst>
+                        <a:ext uri="{9D8B030D-6E8A-4147-A177-3AD203B41FA5}">
+                          <a16:colId xmlns:a16="http://schemas.microsoft.com/office/drawing/2014/main" val="985876441"/>
+                        </a:ext>
+                      </a:extLst>
+                    </a:gridCol>
+                  </a:tblGrid>
+                  <a:tr h="370840">
+                    <a:tc>
+                      <a:txBody>
+                        <a:bodyPr/>
+                        <a:lstStyle/>
+                        <a:p>
+                          <a14:m>
+                            <m:oMathPara xmlns:m="http://schemas.openxmlformats.org/officeDocument/2006/math">
+                              <m:oMathParaPr>
+                                <m:jc m:val="centerGroup"/>
+                              </m:oMathParaPr>
+                              <m:oMath xmlns:m="http://schemas.openxmlformats.org/officeDocument/2006/math">
+                                <m:r>
+                                  <a:rPr lang="de-DE" i="1" dirty="0" smtClean="0">
+                                    <a:latin typeface="Cambria Math" panose="02040503050406030204" pitchFamily="18" charset="0"/>
+                                  </a:rPr>
+                                  <m:t>𝑦</m:t>
+                                </m:r>
+                              </m:oMath>
+                            </m:oMathPara>
+                          </a14:m>
+                          <a:endParaRPr lang="de-DE" dirty="0"/>
+                        </a:p>
+                      </a:txBody>
+                      <a:tcPr/>
+                    </a:tc>
+                    <a:tc>
+                      <a:txBody>
+                        <a:bodyPr/>
+                        <a:lstStyle/>
+                        <a:p>
+                          <a14:m>
+                            <m:oMathPara xmlns:m="http://schemas.openxmlformats.org/officeDocument/2006/math">
+                              <m:oMathParaPr>
+                                <m:jc m:val="centerGroup"/>
+                              </m:oMathParaPr>
+                              <m:oMath xmlns:m="http://schemas.openxmlformats.org/officeDocument/2006/math">
+                                <m:acc>
+                                  <m:accPr>
+                                    <m:chr m:val="̂"/>
+                                    <m:ctrlPr>
+                                      <a:rPr lang="de-DE" i="1" smtClean="0">
+                                        <a:latin typeface="Cambria Math" panose="02040503050406030204" pitchFamily="18" charset="0"/>
+                                      </a:rPr>
+                                    </m:ctrlPr>
+                                  </m:accPr>
+                                  <m:e>
+                                    <m:r>
+                                      <a:rPr lang="de-DE" b="1" i="1" smtClean="0">
+                                        <a:latin typeface="Cambria Math" panose="02040503050406030204" pitchFamily="18" charset="0"/>
+                                      </a:rPr>
+                                      <m:t>𝒚</m:t>
+                                    </m:r>
+                                  </m:e>
+                                </m:acc>
+                              </m:oMath>
+                            </m:oMathPara>
+                          </a14:m>
+                          <a:endParaRPr lang="de-DE" dirty="0"/>
+                        </a:p>
+                      </a:txBody>
+                      <a:tcPr/>
+                    </a:tc>
+                    <a:tc>
+                      <a:txBody>
+                        <a:bodyPr/>
+                        <a:lstStyle/>
+                        <a:p>
+                          <a14:m>
+                            <m:oMathPara xmlns:m="http://schemas.openxmlformats.org/officeDocument/2006/math">
+                              <m:oMathParaPr>
+                                <m:jc m:val="centerGroup"/>
+                              </m:oMathParaPr>
+                              <m:oMath xmlns:m="http://schemas.openxmlformats.org/officeDocument/2006/math">
+                                <m:acc>
+                                  <m:accPr>
+                                    <m:chr m:val="̂"/>
+                                    <m:ctrlPr>
+                                      <a:rPr lang="de-DE" i="1" smtClean="0">
+                                        <a:latin typeface="Cambria Math" panose="02040503050406030204" pitchFamily="18" charset="0"/>
+                                      </a:rPr>
+                                    </m:ctrlPr>
+                                  </m:accPr>
+                                  <m:e>
+                                    <m:r>
+                                      <a:rPr lang="de-DE" b="1" i="1" smtClean="0">
+                                        <a:latin typeface="Cambria Math" panose="02040503050406030204" pitchFamily="18" charset="0"/>
+                                      </a:rPr>
+                                      <m:t>𝒚</m:t>
+                                    </m:r>
+                                  </m:e>
+                                </m:acc>
+                                <m:r>
+                                  <a:rPr lang="de-DE" b="1" i="1" smtClean="0">
+                                    <a:latin typeface="Cambria Math" panose="02040503050406030204" pitchFamily="18" charset="0"/>
+                                  </a:rPr>
+                                  <m:t>−</m:t>
+                                </m:r>
+                                <m:r>
+                                  <a:rPr lang="de-DE" b="1" i="1" smtClean="0">
+                                    <a:latin typeface="Cambria Math" panose="02040503050406030204" pitchFamily="18" charset="0"/>
+                                  </a:rPr>
+                                  <m:t>𝒚</m:t>
+                                </m:r>
+                              </m:oMath>
+                            </m:oMathPara>
+                          </a14:m>
+                          <a:endParaRPr lang="de-DE" dirty="0"/>
+                        </a:p>
+                      </a:txBody>
+                      <a:tcPr/>
+                    </a:tc>
+                    <a:tc>
+                      <a:txBody>
+                        <a:bodyPr/>
+                        <a:lstStyle/>
+                        <a:p>
+                          <a14:m>
+                            <m:oMathPara xmlns:m="http://schemas.openxmlformats.org/officeDocument/2006/math">
+                              <m:oMathParaPr>
+                                <m:jc m:val="centerGroup"/>
+                              </m:oMathParaPr>
+                              <m:oMath xmlns:m="http://schemas.openxmlformats.org/officeDocument/2006/math">
+                                <m:sSub>
+                                  <m:sSubPr>
+                                    <m:ctrlPr>
+                                      <a:rPr lang="de-DE" b="0" i="1" smtClean="0">
+                                        <a:latin typeface="Cambria Math" panose="02040503050406030204" pitchFamily="18" charset="0"/>
+                                      </a:rPr>
+                                    </m:ctrlPr>
+                                  </m:sSubPr>
+                                  <m:e>
+                                    <m:r>
+                                      <a:rPr lang="de-DE" b="0" i="1" smtClean="0">
+                                        <a:latin typeface="Cambria Math" panose="02040503050406030204" pitchFamily="18" charset="0"/>
+                                      </a:rPr>
+                                      <m:t>𝐿</m:t>
+                                    </m:r>
+                                  </m:e>
+                                  <m:sub>
+                                    <m:r>
+                                      <a:rPr lang="de-DE" b="0" i="1" smtClean="0">
+                                        <a:latin typeface="Cambria Math" panose="02040503050406030204" pitchFamily="18" charset="0"/>
+                                      </a:rPr>
+                                      <m:t>𝑙𝑜𝑔</m:t>
+                                    </m:r>
+                                  </m:sub>
+                                </m:sSub>
+                                <m:d>
+                                  <m:dPr>
+                                    <m:ctrlPr>
+                                      <a:rPr lang="de-DE" b="0" i="1" smtClean="0">
+                                        <a:latin typeface="Cambria Math" panose="02040503050406030204" pitchFamily="18" charset="0"/>
+                                      </a:rPr>
+                                    </m:ctrlPr>
+                                  </m:dPr>
+                                  <m:e>
+                                    <m:r>
+                                      <a:rPr lang="de-DE" b="0" i="1" smtClean="0">
+                                        <a:latin typeface="Cambria Math" panose="02040503050406030204" pitchFamily="18" charset="0"/>
+                                      </a:rPr>
+                                      <m:t>𝑦</m:t>
+                                    </m:r>
+                                    <m:r>
+                                      <a:rPr lang="de-DE" b="0" i="1" smtClean="0">
+                                        <a:latin typeface="Cambria Math" panose="02040503050406030204" pitchFamily="18" charset="0"/>
+                                      </a:rPr>
+                                      <m:t>,</m:t>
+                                    </m:r>
+                                    <m:acc>
+                                      <m:accPr>
+                                        <m:chr m:val="̂"/>
+                                        <m:ctrlPr>
+                                          <a:rPr lang="de-DE" i="1">
+                                            <a:latin typeface="Cambria Math" panose="02040503050406030204" pitchFamily="18" charset="0"/>
+                                          </a:rPr>
+                                        </m:ctrlPr>
+                                      </m:accPr>
+                                      <m:e>
+                                        <m:r>
+                                          <a:rPr lang="de-DE" i="1">
+                                            <a:latin typeface="Cambria Math" panose="02040503050406030204" pitchFamily="18" charset="0"/>
+                                          </a:rPr>
+                                          <m:t>𝑦</m:t>
+                                        </m:r>
+                                      </m:e>
+                                    </m:acc>
+                                  </m:e>
+                                </m:d>
+                              </m:oMath>
+                            </m:oMathPara>
+                          </a14:m>
+                          <a:endParaRPr lang="de-DE" dirty="0"/>
+                        </a:p>
+                      </a:txBody>
+                      <a:tcPr/>
+                    </a:tc>
+                    <a:tc>
+                      <a:txBody>
+                        <a:bodyPr/>
+                        <a:lstStyle/>
+                        <a:p>
+                          <a14:m>
+                            <m:oMathPara xmlns:m="http://schemas.openxmlformats.org/officeDocument/2006/math">
+                              <m:oMathParaPr>
+                                <m:jc m:val="centerGroup"/>
+                              </m:oMathParaPr>
+                              <m:oMath xmlns:m="http://schemas.openxmlformats.org/officeDocument/2006/math">
+                                <m:sSub>
+                                  <m:sSubPr>
+                                    <m:ctrlPr>
+                                      <a:rPr lang="de-DE" b="0" i="1" smtClean="0">
+                                        <a:latin typeface="Cambria Math" panose="02040503050406030204" pitchFamily="18" charset="0"/>
+                                      </a:rPr>
+                                    </m:ctrlPr>
+                                  </m:sSubPr>
+                                  <m:e>
+                                    <m:r>
+                                      <a:rPr lang="de-DE" b="0" i="1" smtClean="0">
+                                        <a:latin typeface="Cambria Math" panose="02040503050406030204" pitchFamily="18" charset="0"/>
+                                      </a:rPr>
+                                      <m:t>𝐿</m:t>
+                                    </m:r>
+                                  </m:e>
+                                  <m:sub>
+                                    <m:r>
+                                      <a:rPr lang="de-DE" b="0" i="1" smtClean="0">
+                                        <a:latin typeface="Cambria Math" panose="02040503050406030204" pitchFamily="18" charset="0"/>
+                                      </a:rPr>
+                                      <m:t>𝑚𝑠𝑒</m:t>
+                                    </m:r>
+                                  </m:sub>
+                                </m:sSub>
+                                <m:d>
+                                  <m:dPr>
+                                    <m:ctrlPr>
+                                      <a:rPr lang="de-DE" b="0" i="1" smtClean="0">
+                                        <a:latin typeface="Cambria Math" panose="02040503050406030204" pitchFamily="18" charset="0"/>
+                                      </a:rPr>
+                                    </m:ctrlPr>
+                                  </m:dPr>
+                                  <m:e>
+                                    <m:r>
+                                      <a:rPr lang="de-DE" b="0" i="1" smtClean="0">
+                                        <a:latin typeface="Cambria Math" panose="02040503050406030204" pitchFamily="18" charset="0"/>
+                                      </a:rPr>
+                                      <m:t>𝑦</m:t>
+                                    </m:r>
+                                    <m:r>
+                                      <a:rPr lang="de-DE" b="0" i="1" smtClean="0">
+                                        <a:latin typeface="Cambria Math" panose="02040503050406030204" pitchFamily="18" charset="0"/>
+                                      </a:rPr>
+                                      <m:t>,</m:t>
+                                    </m:r>
+                                    <m:acc>
+                                      <m:accPr>
+                                        <m:chr m:val="̂"/>
+                                        <m:ctrlPr>
+                                          <a:rPr lang="de-DE" i="1">
+                                            <a:latin typeface="Cambria Math" panose="02040503050406030204" pitchFamily="18" charset="0"/>
+                                          </a:rPr>
+                                        </m:ctrlPr>
+                                      </m:accPr>
+                                      <m:e>
+                                        <m:r>
+                                          <a:rPr lang="de-DE" i="1">
+                                            <a:latin typeface="Cambria Math" panose="02040503050406030204" pitchFamily="18" charset="0"/>
+                                          </a:rPr>
+                                          <m:t>𝑦</m:t>
+                                        </m:r>
+                                      </m:e>
+                                    </m:acc>
+                                  </m:e>
+                                </m:d>
+                              </m:oMath>
+                            </m:oMathPara>
+                          </a14:m>
+                          <a:endParaRPr lang="de-DE" dirty="0"/>
+                        </a:p>
+                      </a:txBody>
+                      <a:tcPr/>
+                    </a:tc>
+                    <a:extLst>
+                      <a:ext uri="{0D108BD9-81ED-4DB2-BD59-A6C34878D82A}">
+                        <a16:rowId xmlns:a16="http://schemas.microsoft.com/office/drawing/2014/main" val="1674491626"/>
+                      </a:ext>
+                    </a:extLst>
+                  </a:tr>
+                  <a:tr h="370840">
+                    <a:tc>
+                      <a:txBody>
+                        <a:bodyPr/>
+                        <a:lstStyle/>
+                        <a:p>
+                          <a:pPr/>
+                          <a14:m>
+                            <m:oMathPara xmlns:m="http://schemas.openxmlformats.org/officeDocument/2006/math">
+                              <m:oMathParaPr>
+                                <m:jc m:val="centerGroup"/>
+                              </m:oMathParaPr>
+                              <m:oMath xmlns:m="http://schemas.openxmlformats.org/officeDocument/2006/math">
+                                <m:r>
+                                  <a:rPr lang="de-DE" i="1" dirty="0" smtClean="0">
+                                    <a:latin typeface="Cambria Math" panose="02040503050406030204" pitchFamily="18" charset="0"/>
+                                  </a:rPr>
+                                  <m:t>1</m:t>
+                                </m:r>
+                              </m:oMath>
+                            </m:oMathPara>
+                          </a14:m>
+                          <a:endParaRPr lang="de-DE" dirty="0"/>
+                        </a:p>
+                      </a:txBody>
+                      <a:tcPr/>
+                    </a:tc>
+                    <a:tc>
+                      <a:txBody>
+                        <a:bodyPr/>
+                        <a:lstStyle/>
+                        <a:p>
+                          <a:pPr/>
+                          <a14:m>
+                            <m:oMathPara xmlns:m="http://schemas.openxmlformats.org/officeDocument/2006/math">
+                              <m:oMathParaPr>
+                                <m:jc m:val="centerGroup"/>
+                              </m:oMathParaPr>
+                              <m:oMath xmlns:m="http://schemas.openxmlformats.org/officeDocument/2006/math">
+                                <m:r>
+                                  <a:rPr lang="de-DE" b="0" i="1" smtClean="0">
+                                    <a:latin typeface="Cambria Math" panose="02040503050406030204" pitchFamily="18" charset="0"/>
+                                  </a:rPr>
+                                  <m:t>1</m:t>
+                                </m:r>
+                              </m:oMath>
+                            </m:oMathPara>
+                          </a14:m>
+                          <a:endParaRPr lang="de-DE" dirty="0"/>
+                        </a:p>
+                      </a:txBody>
+                      <a:tcPr/>
+                    </a:tc>
+                    <a:tc>
+                      <a:txBody>
+                        <a:bodyPr/>
+                        <a:lstStyle/>
+                        <a:p>
+                          <a:pPr/>
+                          <a:endParaRPr lang="de-DE" dirty="0"/>
+                        </a:p>
+                      </a:txBody>
+                      <a:tcPr/>
+                    </a:tc>
+                    <a:tc>
+                      <a:txBody>
+                        <a:bodyPr/>
+                        <a:lstStyle/>
+                        <a:p>
+                          <a:endParaRPr lang="de-DE" dirty="0"/>
+                        </a:p>
+                      </a:txBody>
+                      <a:tcPr/>
+                    </a:tc>
+                    <a:tc>
+                      <a:txBody>
+                        <a:bodyPr/>
+                        <a:lstStyle/>
+                        <a:p>
+                          <a:endParaRPr lang="de-DE" dirty="0"/>
+                        </a:p>
+                      </a:txBody>
+                      <a:tcPr/>
+                    </a:tc>
+                    <a:extLst>
+                      <a:ext uri="{0D108BD9-81ED-4DB2-BD59-A6C34878D82A}">
+                        <a16:rowId xmlns:a16="http://schemas.microsoft.com/office/drawing/2014/main" val="920406243"/>
+                      </a:ext>
+                    </a:extLst>
+                  </a:tr>
+                  <a:tr h="370840">
+                    <a:tc>
+                      <a:txBody>
+                        <a:bodyPr/>
+                        <a:lstStyle/>
+                        <a:p>
+                          <a:pPr/>
+                          <a14:m>
+                            <m:oMathPara xmlns:m="http://schemas.openxmlformats.org/officeDocument/2006/math">
+                              <m:oMathParaPr>
+                                <m:jc m:val="centerGroup"/>
+                              </m:oMathParaPr>
+                              <m:oMath xmlns:m="http://schemas.openxmlformats.org/officeDocument/2006/math">
+                                <m:r>
+                                  <a:rPr lang="de-DE" i="1" dirty="0" smtClean="0">
+                                    <a:latin typeface="Cambria Math" panose="02040503050406030204" pitchFamily="18" charset="0"/>
+                                  </a:rPr>
+                                  <m:t>1</m:t>
+                                </m:r>
+                              </m:oMath>
+                            </m:oMathPara>
+                          </a14:m>
+                          <a:endParaRPr lang="de-DE" dirty="0"/>
+                        </a:p>
+                      </a:txBody>
+                      <a:tcPr/>
+                    </a:tc>
+                    <a:tc>
+                      <a:txBody>
+                        <a:bodyPr/>
+                        <a:lstStyle/>
+                        <a:p>
+                          <a:pPr/>
+                          <a14:m>
+                            <m:oMathPara xmlns:m="http://schemas.openxmlformats.org/officeDocument/2006/math">
+                              <m:oMathParaPr>
+                                <m:jc m:val="centerGroup"/>
+                              </m:oMathParaPr>
+                              <m:oMath xmlns:m="http://schemas.openxmlformats.org/officeDocument/2006/math">
+                                <m:r>
+                                  <a:rPr lang="de-DE" b="0" i="1" smtClean="0">
+                                    <a:latin typeface="Cambria Math" panose="02040503050406030204" pitchFamily="18" charset="0"/>
+                                  </a:rPr>
+                                  <m:t>0.02</m:t>
+                                </m:r>
+                              </m:oMath>
+                            </m:oMathPara>
+                          </a14:m>
+                          <a:endParaRPr lang="de-DE" dirty="0"/>
+                        </a:p>
+                      </a:txBody>
+                      <a:tcPr/>
+                    </a:tc>
+                    <a:tc>
+                      <a:txBody>
+                        <a:bodyPr/>
+                        <a:lstStyle/>
+                        <a:p>
+                          <a:pPr/>
+                          <a:endParaRPr lang="de-DE" dirty="0"/>
+                        </a:p>
+                      </a:txBody>
+                      <a:tcPr/>
+                    </a:tc>
+                    <a:tc>
+                      <a:txBody>
+                        <a:bodyPr/>
+                        <a:lstStyle/>
+                        <a:p>
+                          <a:endParaRPr lang="de-DE" dirty="0"/>
+                        </a:p>
+                      </a:txBody>
+                      <a:tcPr/>
+                    </a:tc>
+                    <a:tc>
+                      <a:txBody>
+                        <a:bodyPr/>
+                        <a:lstStyle/>
+                        <a:p>
+                          <a:endParaRPr lang="de-DE" dirty="0"/>
+                        </a:p>
+                      </a:txBody>
+                      <a:tcPr/>
+                    </a:tc>
+                    <a:extLst>
+                      <a:ext uri="{0D108BD9-81ED-4DB2-BD59-A6C34878D82A}">
+                        <a16:rowId xmlns:a16="http://schemas.microsoft.com/office/drawing/2014/main" val="2124997232"/>
+                      </a:ext>
+                    </a:extLst>
+                  </a:tr>
+                  <a:tr h="370840">
+                    <a:tc>
+                      <a:txBody>
+                        <a:bodyPr/>
+                        <a:lstStyle/>
+                        <a:p>
+                          <a:pPr/>
+                          <a14:m>
+                            <m:oMathPara xmlns:m="http://schemas.openxmlformats.org/officeDocument/2006/math">
+                              <m:oMathParaPr>
+                                <m:jc m:val="centerGroup"/>
+                              </m:oMathParaPr>
+                              <m:oMath xmlns:m="http://schemas.openxmlformats.org/officeDocument/2006/math">
+                                <m:r>
+                                  <a:rPr lang="de-DE" i="1" dirty="0" smtClean="0">
+                                    <a:latin typeface="Cambria Math" panose="02040503050406030204" pitchFamily="18" charset="0"/>
+                                  </a:rPr>
+                                  <m:t>1</m:t>
+                                </m:r>
+                              </m:oMath>
+                            </m:oMathPara>
+                          </a14:m>
+                          <a:endParaRPr lang="de-DE" dirty="0"/>
+                        </a:p>
+                      </a:txBody>
+                      <a:tcPr/>
+                    </a:tc>
+                    <a:tc>
+                      <a:txBody>
+                        <a:bodyPr/>
+                        <a:lstStyle/>
+                        <a:p>
+                          <a:pPr/>
+                          <a14:m>
+                            <m:oMathPara xmlns:m="http://schemas.openxmlformats.org/officeDocument/2006/math">
+                              <m:oMathParaPr>
+                                <m:jc m:val="centerGroup"/>
+                              </m:oMathParaPr>
+                              <m:oMath xmlns:m="http://schemas.openxmlformats.org/officeDocument/2006/math">
+                                <m:r>
+                                  <a:rPr lang="de-DE" b="0" i="1" smtClean="0">
+                                    <a:latin typeface="Cambria Math" panose="02040503050406030204" pitchFamily="18" charset="0"/>
+                                  </a:rPr>
+                                  <m:t>0.2</m:t>
+                                </m:r>
+                              </m:oMath>
+                            </m:oMathPara>
+                          </a14:m>
+                          <a:endParaRPr lang="de-DE" dirty="0"/>
+                        </a:p>
+                      </a:txBody>
+                      <a:tcPr/>
+                    </a:tc>
+                    <a:tc>
+                      <a:txBody>
+                        <a:bodyPr/>
+                        <a:lstStyle/>
+                        <a:p>
+                          <a:pPr/>
+                          <a:endParaRPr lang="de-DE" dirty="0"/>
+                        </a:p>
+                      </a:txBody>
+                      <a:tcPr/>
+                    </a:tc>
+                    <a:tc>
+                      <a:txBody>
+                        <a:bodyPr/>
+                        <a:lstStyle/>
+                        <a:p>
+                          <a:endParaRPr lang="de-DE" dirty="0"/>
+                        </a:p>
+                      </a:txBody>
+                      <a:tcPr/>
+                    </a:tc>
+                    <a:tc>
+                      <a:txBody>
+                        <a:bodyPr/>
+                        <a:lstStyle/>
+                        <a:p>
+                          <a:endParaRPr lang="de-DE" dirty="0"/>
+                        </a:p>
+                      </a:txBody>
+                      <a:tcPr/>
+                    </a:tc>
+                    <a:extLst>
+                      <a:ext uri="{0D108BD9-81ED-4DB2-BD59-A6C34878D82A}">
+                        <a16:rowId xmlns:a16="http://schemas.microsoft.com/office/drawing/2014/main" val="4052410277"/>
+                      </a:ext>
+                    </a:extLst>
+                  </a:tr>
+                  <a:tr h="370840">
+                    <a:tc>
+                      <a:txBody>
+                        <a:bodyPr/>
+                        <a:lstStyle/>
+                        <a:p>
+                          <a14:m>
+                            <m:oMathPara xmlns:m="http://schemas.openxmlformats.org/officeDocument/2006/math">
+                              <m:oMathParaPr>
+                                <m:jc m:val="centerGroup"/>
+                              </m:oMathParaPr>
+                              <m:oMath xmlns:m="http://schemas.openxmlformats.org/officeDocument/2006/math">
+                                <m:r>
+                                  <a:rPr lang="de-DE" i="1" dirty="0" smtClean="0">
+                                    <a:latin typeface="Cambria Math" panose="02040503050406030204" pitchFamily="18" charset="0"/>
+                                  </a:rPr>
+                                  <m:t>1</m:t>
+                                </m:r>
+                              </m:oMath>
+                            </m:oMathPara>
+                          </a14:m>
+                          <a:endParaRPr lang="de-DE" dirty="0"/>
+                        </a:p>
+                      </a:txBody>
+                      <a:tcPr/>
+                    </a:tc>
+                    <a:tc>
+                      <a:txBody>
+                        <a:bodyPr/>
+                        <a:lstStyle/>
+                        <a:p>
+                          <a14:m>
+                            <m:oMathPara xmlns:m="http://schemas.openxmlformats.org/officeDocument/2006/math">
+                              <m:oMathParaPr>
+                                <m:jc m:val="centerGroup"/>
+                              </m:oMathParaPr>
+                              <m:oMath xmlns:m="http://schemas.openxmlformats.org/officeDocument/2006/math">
+                                <m:r>
+                                  <a:rPr lang="de-DE" b="0" i="1" smtClean="0">
+                                    <a:latin typeface="Cambria Math" panose="02040503050406030204" pitchFamily="18" charset="0"/>
+                                  </a:rPr>
+                                  <m:t>0.5</m:t>
+                                </m:r>
+                              </m:oMath>
+                            </m:oMathPara>
+                          </a14:m>
+                          <a:endParaRPr lang="de-DE" dirty="0"/>
+                        </a:p>
+                      </a:txBody>
+                      <a:tcPr/>
+                    </a:tc>
+                    <a:tc>
+                      <a:txBody>
+                        <a:bodyPr/>
+                        <a:lstStyle/>
+                        <a:p>
+                          <a:endParaRPr lang="de-DE" dirty="0"/>
+                        </a:p>
+                      </a:txBody>
+                      <a:tcPr/>
+                    </a:tc>
+                    <a:tc>
+                      <a:txBody>
+                        <a:bodyPr/>
+                        <a:lstStyle/>
+                        <a:p>
+                          <a:endParaRPr lang="de-DE" dirty="0"/>
+                        </a:p>
+                      </a:txBody>
+                      <a:tcPr/>
+                    </a:tc>
+                    <a:tc>
+                      <a:txBody>
+                        <a:bodyPr/>
+                        <a:lstStyle/>
+                        <a:p>
+                          <a:endParaRPr lang="de-DE" dirty="0"/>
+                        </a:p>
+                      </a:txBody>
+                      <a:tcPr/>
+                    </a:tc>
+                    <a:extLst>
+                      <a:ext uri="{0D108BD9-81ED-4DB2-BD59-A6C34878D82A}">
+                        <a16:rowId xmlns:a16="http://schemas.microsoft.com/office/drawing/2014/main" val="2167875333"/>
+                      </a:ext>
+                    </a:extLst>
+                  </a:tr>
+                  <a:tr h="370840">
+                    <a:tc>
+                      <a:txBody>
+                        <a:bodyPr/>
+                        <a:lstStyle/>
+                        <a:p>
+                          <a14:m>
+                            <m:oMathPara xmlns:m="http://schemas.openxmlformats.org/officeDocument/2006/math">
+                              <m:oMathParaPr>
+                                <m:jc m:val="centerGroup"/>
+                              </m:oMathParaPr>
+                              <m:oMath xmlns:m="http://schemas.openxmlformats.org/officeDocument/2006/math">
+                                <m:r>
+                                  <a:rPr lang="de-DE" i="1" dirty="0" smtClean="0">
+                                    <a:latin typeface="Cambria Math" panose="02040503050406030204" pitchFamily="18" charset="0"/>
+                                  </a:rPr>
+                                  <m:t>1</m:t>
+                                </m:r>
+                              </m:oMath>
+                            </m:oMathPara>
+                          </a14:m>
+                          <a:endParaRPr lang="de-DE" dirty="0"/>
+                        </a:p>
+                      </a:txBody>
+                      <a:tcPr/>
+                    </a:tc>
+                    <a:tc>
+                      <a:txBody>
+                        <a:bodyPr/>
+                        <a:lstStyle/>
+                        <a:p>
+                          <a14:m>
+                            <m:oMathPara xmlns:m="http://schemas.openxmlformats.org/officeDocument/2006/math">
+                              <m:oMathParaPr>
+                                <m:jc m:val="centerGroup"/>
+                              </m:oMathParaPr>
+                              <m:oMath xmlns:m="http://schemas.openxmlformats.org/officeDocument/2006/math">
+                                <m:r>
+                                  <a:rPr lang="de-DE" b="0" i="1" smtClean="0">
+                                    <a:latin typeface="Cambria Math" panose="02040503050406030204" pitchFamily="18" charset="0"/>
+                                  </a:rPr>
+                                  <m:t>0.9</m:t>
+                                </m:r>
+                              </m:oMath>
+                            </m:oMathPara>
+                          </a14:m>
+                          <a:endParaRPr lang="de-DE" dirty="0"/>
+                        </a:p>
+                      </a:txBody>
+                      <a:tcPr/>
+                    </a:tc>
+                    <a:tc>
+                      <a:txBody>
+                        <a:bodyPr/>
+                        <a:lstStyle/>
+                        <a:p>
+                          <a:endParaRPr lang="de-DE" dirty="0"/>
+                        </a:p>
+                      </a:txBody>
+                      <a:tcPr/>
+                    </a:tc>
+                    <a:tc>
+                      <a:txBody>
+                        <a:bodyPr/>
+                        <a:lstStyle/>
+                        <a:p>
+                          <a:endParaRPr lang="de-DE"/>
+                        </a:p>
+                      </a:txBody>
+                      <a:tcPr/>
+                    </a:tc>
+                    <a:tc>
+                      <a:txBody>
+                        <a:bodyPr/>
+                        <a:lstStyle/>
+                        <a:p>
+                          <a:endParaRPr lang="de-DE" dirty="0"/>
+                        </a:p>
+                      </a:txBody>
+                      <a:tcPr/>
+                    </a:tc>
+                    <a:extLst>
+                      <a:ext uri="{0D108BD9-81ED-4DB2-BD59-A6C34878D82A}">
+                        <a16:rowId xmlns:a16="http://schemas.microsoft.com/office/drawing/2014/main" val="2382239149"/>
+                      </a:ext>
+                    </a:extLst>
+                  </a:tr>
+                  <a:tr h="370840">
+                    <a:tc>
+                      <a:txBody>
+                        <a:bodyPr/>
+                        <a:lstStyle/>
+                        <a:p>
+                          <a14:m>
+                            <m:oMathPara xmlns:m="http://schemas.openxmlformats.org/officeDocument/2006/math">
+                              <m:oMathParaPr>
+                                <m:jc m:val="centerGroup"/>
+                              </m:oMathParaPr>
+                              <m:oMath xmlns:m="http://schemas.openxmlformats.org/officeDocument/2006/math">
+                                <m:r>
+                                  <a:rPr lang="de-DE" b="0" i="1" smtClean="0">
+                                    <a:latin typeface="Cambria Math" panose="02040503050406030204" pitchFamily="18" charset="0"/>
+                                  </a:rPr>
+                                  <m:t>0</m:t>
+                                </m:r>
+                              </m:oMath>
+                            </m:oMathPara>
+                          </a14:m>
+                          <a:endParaRPr lang="de-DE" dirty="0"/>
+                        </a:p>
+                      </a:txBody>
+                      <a:tcPr/>
+                    </a:tc>
+                    <a:tc>
+                      <a:txBody>
+                        <a:bodyPr/>
+                        <a:lstStyle/>
+                        <a:p>
+                          <a14:m>
+                            <m:oMathPara xmlns:m="http://schemas.openxmlformats.org/officeDocument/2006/math">
+                              <m:oMathParaPr>
+                                <m:jc m:val="centerGroup"/>
+                              </m:oMathParaPr>
+                              <m:oMath xmlns:m="http://schemas.openxmlformats.org/officeDocument/2006/math">
+                                <m:r>
+                                  <a:rPr lang="de-DE" b="0" i="1" smtClean="0">
+                                    <a:latin typeface="Cambria Math" panose="02040503050406030204" pitchFamily="18" charset="0"/>
+                                  </a:rPr>
+                                  <m:t>0.5</m:t>
+                                </m:r>
+                              </m:oMath>
+                            </m:oMathPara>
+                          </a14:m>
+                          <a:endParaRPr lang="de-DE" dirty="0"/>
+                        </a:p>
+                      </a:txBody>
+                      <a:tcPr/>
+                    </a:tc>
+                    <a:tc>
+                      <a:txBody>
+                        <a:bodyPr/>
+                        <a:lstStyle/>
+                        <a:p>
+                          <a:endParaRPr lang="de-DE" dirty="0"/>
+                        </a:p>
+                      </a:txBody>
+                      <a:tcPr/>
+                    </a:tc>
+                    <a:tc>
+                      <a:txBody>
+                        <a:bodyPr/>
+                        <a:lstStyle/>
+                        <a:p>
+                          <a:endParaRPr lang="de-DE"/>
+                        </a:p>
+                      </a:txBody>
+                      <a:tcPr/>
+                    </a:tc>
+                    <a:tc>
+                      <a:txBody>
+                        <a:bodyPr/>
+                        <a:lstStyle/>
+                        <a:p>
+                          <a:endParaRPr lang="de-DE"/>
+                        </a:p>
+                      </a:txBody>
+                      <a:tcPr/>
+                    </a:tc>
+                    <a:extLst>
+                      <a:ext uri="{0D108BD9-81ED-4DB2-BD59-A6C34878D82A}">
+                        <a16:rowId xmlns:a16="http://schemas.microsoft.com/office/drawing/2014/main" val="3343440584"/>
+                      </a:ext>
+                    </a:extLst>
+                  </a:tr>
+                  <a:tr h="370840">
+                    <a:tc>
+                      <a:txBody>
+                        <a:bodyPr/>
+                        <a:lstStyle/>
+                        <a:p>
+                          <a14:m>
+                            <m:oMathPara xmlns:m="http://schemas.openxmlformats.org/officeDocument/2006/math">
+                              <m:oMathParaPr>
+                                <m:jc m:val="centerGroup"/>
+                              </m:oMathParaPr>
+                              <m:oMath xmlns:m="http://schemas.openxmlformats.org/officeDocument/2006/math">
+                                <m:r>
+                                  <a:rPr lang="de-DE" b="0" i="1" smtClean="0">
+                                    <a:latin typeface="Cambria Math" panose="02040503050406030204" pitchFamily="18" charset="0"/>
+                                  </a:rPr>
+                                  <m:t>0</m:t>
+                                </m:r>
+                              </m:oMath>
+                            </m:oMathPara>
+                          </a14:m>
+                          <a:endParaRPr lang="de-DE" dirty="0"/>
+                        </a:p>
+                      </a:txBody>
+                      <a:tcPr/>
+                    </a:tc>
+                    <a:tc>
+                      <a:txBody>
+                        <a:bodyPr/>
+                        <a:lstStyle/>
+                        <a:p>
+                          <a14:m>
+                            <m:oMathPara xmlns:m="http://schemas.openxmlformats.org/officeDocument/2006/math">
+                              <m:oMathParaPr>
+                                <m:jc m:val="centerGroup"/>
+                              </m:oMathParaPr>
+                              <m:oMath xmlns:m="http://schemas.openxmlformats.org/officeDocument/2006/math">
+                                <m:r>
+                                  <a:rPr lang="de-DE" b="0" i="1" smtClean="0">
+                                    <a:latin typeface="Cambria Math" panose="02040503050406030204" pitchFamily="18" charset="0"/>
+                                  </a:rPr>
+                                  <m:t>0</m:t>
+                                </m:r>
+                              </m:oMath>
+                            </m:oMathPara>
+                          </a14:m>
+                          <a:endParaRPr lang="de-DE" dirty="0"/>
+                        </a:p>
+                      </a:txBody>
+                      <a:tcPr/>
+                    </a:tc>
+                    <a:tc>
+                      <a:txBody>
+                        <a:bodyPr/>
+                        <a:lstStyle/>
+                        <a:p>
+                          <a:endParaRPr lang="de-DE" dirty="0"/>
+                        </a:p>
+                      </a:txBody>
+                      <a:tcPr/>
+                    </a:tc>
+                    <a:tc>
+                      <a:txBody>
+                        <a:bodyPr/>
+                        <a:lstStyle/>
+                        <a:p>
+                          <a:endParaRPr lang="de-DE"/>
+                        </a:p>
+                      </a:txBody>
+                      <a:tcPr/>
+                    </a:tc>
+                    <a:tc>
+                      <a:txBody>
+                        <a:bodyPr/>
+                        <a:lstStyle/>
+                        <a:p>
+                          <a:endParaRPr lang="de-DE" dirty="0"/>
+                        </a:p>
+                      </a:txBody>
+                      <a:tcPr/>
+                    </a:tc>
+                    <a:extLst>
+                      <a:ext uri="{0D108BD9-81ED-4DB2-BD59-A6C34878D82A}">
+                        <a16:rowId xmlns:a16="http://schemas.microsoft.com/office/drawing/2014/main" val="1860875471"/>
+                      </a:ext>
+                    </a:extLst>
+                  </a:tr>
+                  <a:tr h="370840">
+                    <a:tc>
+                      <a:txBody>
+                        <a:bodyPr/>
+                        <a:lstStyle/>
+                        <a:p>
+                          <a14:m>
+                            <m:oMathPara xmlns:m="http://schemas.openxmlformats.org/officeDocument/2006/math">
+                              <m:oMathParaPr>
+                                <m:jc m:val="centerGroup"/>
+                              </m:oMathParaPr>
+                              <m:oMath xmlns:m="http://schemas.openxmlformats.org/officeDocument/2006/math">
+                                <m:r>
+                                  <a:rPr lang="de-DE" b="0" i="1" smtClean="0">
+                                    <a:latin typeface="Cambria Math" panose="02040503050406030204" pitchFamily="18" charset="0"/>
+                                  </a:rPr>
+                                  <m:t>0</m:t>
+                                </m:r>
+                              </m:oMath>
+                            </m:oMathPara>
+                          </a14:m>
+                          <a:endParaRPr lang="de-DE" dirty="0"/>
+                        </a:p>
+                      </a:txBody>
+                      <a:tcPr/>
+                    </a:tc>
+                    <a:tc>
+                      <a:txBody>
+                        <a:bodyPr/>
+                        <a:lstStyle/>
+                        <a:p>
+                          <a14:m>
+                            <m:oMathPara xmlns:m="http://schemas.openxmlformats.org/officeDocument/2006/math">
+                              <m:oMathParaPr>
+                                <m:jc m:val="centerGroup"/>
+                              </m:oMathParaPr>
+                              <m:oMath xmlns:m="http://schemas.openxmlformats.org/officeDocument/2006/math">
+                                <m:r>
+                                  <a:rPr lang="de-DE" b="0" i="1" smtClean="0">
+                                    <a:latin typeface="Cambria Math" panose="02040503050406030204" pitchFamily="18" charset="0"/>
+                                  </a:rPr>
+                                  <m:t>0.1</m:t>
+                                </m:r>
+                              </m:oMath>
+                            </m:oMathPara>
+                          </a14:m>
+                          <a:endParaRPr lang="de-DE" dirty="0"/>
+                        </a:p>
+                      </a:txBody>
+                      <a:tcPr/>
+                    </a:tc>
+                    <a:tc>
+                      <a:txBody>
+                        <a:bodyPr/>
+                        <a:lstStyle/>
+                        <a:p>
+                          <a:endParaRPr lang="de-DE" dirty="0"/>
+                        </a:p>
+                      </a:txBody>
+                      <a:tcPr/>
+                    </a:tc>
+                    <a:tc>
+                      <a:txBody>
+                        <a:bodyPr/>
+                        <a:lstStyle/>
+                        <a:p>
+                          <a:endParaRPr lang="de-DE" dirty="0"/>
+                        </a:p>
+                      </a:txBody>
+                      <a:tcPr/>
+                    </a:tc>
+                    <a:tc>
+                      <a:txBody>
+                        <a:bodyPr/>
+                        <a:lstStyle/>
+                        <a:p>
+                          <a:endParaRPr lang="de-DE" dirty="0"/>
+                        </a:p>
+                      </a:txBody>
+                      <a:tcPr/>
+                    </a:tc>
+                    <a:extLst>
+                      <a:ext uri="{0D108BD9-81ED-4DB2-BD59-A6C34878D82A}">
+                        <a16:rowId xmlns:a16="http://schemas.microsoft.com/office/drawing/2014/main" val="184787271"/>
+                      </a:ext>
+                    </a:extLst>
+                  </a:tr>
+                  <a:tr h="370840">
+                    <a:tc>
+                      <a:txBody>
+                        <a:bodyPr/>
+                        <a:lstStyle/>
+                        <a:p>
+                          <a14:m>
+                            <m:oMathPara xmlns:m="http://schemas.openxmlformats.org/officeDocument/2006/math">
+                              <m:oMathParaPr>
+                                <m:jc m:val="centerGroup"/>
+                              </m:oMathParaPr>
+                              <m:oMath xmlns:m="http://schemas.openxmlformats.org/officeDocument/2006/math">
+                                <m:r>
+                                  <a:rPr lang="de-DE" b="0" i="1" smtClean="0">
+                                    <a:latin typeface="Cambria Math" panose="02040503050406030204" pitchFamily="18" charset="0"/>
+                                  </a:rPr>
+                                  <m:t>0</m:t>
+                                </m:r>
+                              </m:oMath>
+                            </m:oMathPara>
+                          </a14:m>
+                          <a:endParaRPr lang="de-DE" dirty="0"/>
+                        </a:p>
+                      </a:txBody>
+                      <a:tcPr/>
+                    </a:tc>
+                    <a:tc>
+                      <a:txBody>
+                        <a:bodyPr/>
+                        <a:lstStyle/>
+                        <a:p>
+                          <a14:m>
+                            <m:oMathPara xmlns:m="http://schemas.openxmlformats.org/officeDocument/2006/math">
+                              <m:oMathParaPr>
+                                <m:jc m:val="centerGroup"/>
+                              </m:oMathParaPr>
+                              <m:oMath xmlns:m="http://schemas.openxmlformats.org/officeDocument/2006/math">
+                                <m:r>
+                                  <a:rPr lang="de-DE" b="0" i="1" smtClean="0">
+                                    <a:latin typeface="Cambria Math" panose="02040503050406030204" pitchFamily="18" charset="0"/>
+                                  </a:rPr>
+                                  <m:t>0.9</m:t>
+                                </m:r>
+                              </m:oMath>
+                            </m:oMathPara>
+                          </a14:m>
+                          <a:endParaRPr lang="de-DE" dirty="0"/>
+                        </a:p>
+                      </a:txBody>
+                      <a:tcPr/>
+                    </a:tc>
+                    <a:tc>
+                      <a:txBody>
+                        <a:bodyPr/>
+                        <a:lstStyle/>
+                        <a:p>
+                          <a:endParaRPr lang="de-DE" dirty="0"/>
+                        </a:p>
+                      </a:txBody>
+                      <a:tcPr/>
+                    </a:tc>
+                    <a:tc>
+                      <a:txBody>
+                        <a:bodyPr/>
+                        <a:lstStyle/>
+                        <a:p>
+                          <a:endParaRPr lang="de-DE" dirty="0"/>
+                        </a:p>
+                      </a:txBody>
+                      <a:tcPr/>
+                    </a:tc>
+                    <a:tc>
+                      <a:txBody>
+                        <a:bodyPr/>
+                        <a:lstStyle/>
+                        <a:p>
+                          <a:endParaRPr lang="de-DE" dirty="0"/>
+                        </a:p>
+                      </a:txBody>
+                      <a:tcPr/>
+                    </a:tc>
+                    <a:extLst>
+                      <a:ext uri="{0D108BD9-81ED-4DB2-BD59-A6C34878D82A}">
+                        <a16:rowId xmlns:a16="http://schemas.microsoft.com/office/drawing/2014/main" val="2091703710"/>
+                      </a:ext>
+                    </a:extLst>
+                  </a:tr>
+                </a:tbl>
+              </a:graphicData>
+            </a:graphic>
+          </p:graphicFrame>
+        </mc:Choice>
+        <mc:Fallback>
+          <p:graphicFrame>
+            <p:nvGraphicFramePr>
+              <p:cNvPr id="8" name="Tabelle 7">
+                <a:extLst>
+                  <a:ext uri="{FF2B5EF4-FFF2-40B4-BE49-F238E27FC236}">
+                    <a16:creationId xmlns:a16="http://schemas.microsoft.com/office/drawing/2014/main" id="{DD7D06B5-456F-AF52-52E2-04352EBF02B6}"/>
+                  </a:ext>
+                </a:extLst>
+              </p:cNvPr>
+              <p:cNvGraphicFramePr>
+                <a:graphicFrameLocks noGrp="1"/>
+              </p:cNvGraphicFramePr>
+              <p:nvPr>
+                <p:extLst>
+                  <p:ext uri="{D42A27DB-BD31-4B8C-83A1-F6EECF244321}">
+                    <p14:modId xmlns:p14="http://schemas.microsoft.com/office/powerpoint/2010/main" val="4061260395"/>
+                  </p:ext>
+                </p:extLst>
+              </p:nvPr>
+            </p:nvGraphicFramePr>
+            <p:xfrm>
+              <a:off x="963150" y="2907472"/>
+              <a:ext cx="5568280" cy="3725672"/>
+            </p:xfrm>
+            <a:graphic>
+              <a:graphicData uri="http://schemas.openxmlformats.org/drawingml/2006/table">
+                <a:tbl>
+                  <a:tblPr firstRow="1" bandRow="1">
+                    <a:tableStyleId>{5C22544A-7EE6-4342-B048-85BDC9FD1C3A}</a:tableStyleId>
+                  </a:tblPr>
+                  <a:tblGrid>
+                    <a:gridCol w="1113656">
+                      <a:extLst>
+                        <a:ext uri="{9D8B030D-6E8A-4147-A177-3AD203B41FA5}">
+                          <a16:colId xmlns:a16="http://schemas.microsoft.com/office/drawing/2014/main" val="1378614049"/>
+                        </a:ext>
+                      </a:extLst>
+                    </a:gridCol>
+                    <a:gridCol w="1113656">
+                      <a:extLst>
+                        <a:ext uri="{9D8B030D-6E8A-4147-A177-3AD203B41FA5}">
+                          <a16:colId xmlns:a16="http://schemas.microsoft.com/office/drawing/2014/main" val="3553839890"/>
+                        </a:ext>
+                      </a:extLst>
+                    </a:gridCol>
+                    <a:gridCol w="1113656">
+                      <a:extLst>
+                        <a:ext uri="{9D8B030D-6E8A-4147-A177-3AD203B41FA5}">
+                          <a16:colId xmlns:a16="http://schemas.microsoft.com/office/drawing/2014/main" val="2296694669"/>
+                        </a:ext>
+                      </a:extLst>
+                    </a:gridCol>
+                    <a:gridCol w="1113656">
+                      <a:extLst>
+                        <a:ext uri="{9D8B030D-6E8A-4147-A177-3AD203B41FA5}">
+                          <a16:colId xmlns:a16="http://schemas.microsoft.com/office/drawing/2014/main" val="3219764067"/>
+                        </a:ext>
+                      </a:extLst>
+                    </a:gridCol>
+                    <a:gridCol w="1113656">
+                      <a:extLst>
+                        <a:ext uri="{9D8B030D-6E8A-4147-A177-3AD203B41FA5}">
+                          <a16:colId xmlns:a16="http://schemas.microsoft.com/office/drawing/2014/main" val="985876441"/>
+                        </a:ext>
+                      </a:extLst>
+                    </a:gridCol>
+                  </a:tblGrid>
+                  <a:tr h="388112">
+                    <a:tc>
+                      <a:txBody>
+                        <a:bodyPr/>
+                        <a:lstStyle/>
+                        <a:p>
+                          <a:endParaRPr lang="de-DE"/>
+                        </a:p>
+                      </a:txBody>
+                      <a:tcPr>
+                        <a:blipFill>
+                          <a:blip r:embed="rId4"/>
+                          <a:stretch>
+                            <a:fillRect l="-546" t="-4688" r="-402186" b="-860938"/>
+                          </a:stretch>
+                        </a:blipFill>
+                      </a:tcPr>
+                    </a:tc>
+                    <a:tc>
+                      <a:txBody>
+                        <a:bodyPr/>
+                        <a:lstStyle/>
+                        <a:p>
+                          <a:endParaRPr lang="de-DE"/>
+                        </a:p>
+                      </a:txBody>
+                      <a:tcPr>
+                        <a:blipFill>
+                          <a:blip r:embed="rId4"/>
+                          <a:stretch>
+                            <a:fillRect l="-100546" t="-4688" r="-302186" b="-860938"/>
+                          </a:stretch>
+                        </a:blipFill>
+                      </a:tcPr>
+                    </a:tc>
+                    <a:tc>
+                      <a:txBody>
+                        <a:bodyPr/>
+                        <a:lstStyle/>
+                        <a:p>
+                          <a:endParaRPr lang="de-DE"/>
+                        </a:p>
+                      </a:txBody>
+                      <a:tcPr>
+                        <a:blipFill>
+                          <a:blip r:embed="rId4"/>
+                          <a:stretch>
+                            <a:fillRect l="-200546" t="-4688" r="-202186" b="-860938"/>
+                          </a:stretch>
+                        </a:blipFill>
+                      </a:tcPr>
+                    </a:tc>
+                    <a:tc>
+                      <a:txBody>
+                        <a:bodyPr/>
+                        <a:lstStyle/>
+                        <a:p>
+                          <a:endParaRPr lang="de-DE"/>
+                        </a:p>
+                      </a:txBody>
+                      <a:tcPr>
+                        <a:blipFill>
+                          <a:blip r:embed="rId4"/>
+                          <a:stretch>
+                            <a:fillRect l="-300546" t="-4688" r="-102186" b="-860938"/>
+                          </a:stretch>
+                        </a:blipFill>
+                      </a:tcPr>
+                    </a:tc>
+                    <a:tc>
+                      <a:txBody>
+                        <a:bodyPr/>
+                        <a:lstStyle/>
+                        <a:p>
+                          <a:endParaRPr lang="de-DE"/>
+                        </a:p>
+                      </a:txBody>
+                      <a:tcPr>
+                        <a:blipFill>
+                          <a:blip r:embed="rId4"/>
+                          <a:stretch>
+                            <a:fillRect l="-400546" t="-4688" r="-2186" b="-860938"/>
+                          </a:stretch>
+                        </a:blipFill>
+                      </a:tcPr>
+                    </a:tc>
+                    <a:extLst>
+                      <a:ext uri="{0D108BD9-81ED-4DB2-BD59-A6C34878D82A}">
+                        <a16:rowId xmlns:a16="http://schemas.microsoft.com/office/drawing/2014/main" val="1674491626"/>
+                      </a:ext>
+                    </a:extLst>
+                  </a:tr>
+                  <a:tr h="370840">
+                    <a:tc>
+                      <a:txBody>
+                        <a:bodyPr/>
+                        <a:lstStyle/>
+                        <a:p>
+                          <a:endParaRPr lang="de-DE"/>
+                        </a:p>
+                      </a:txBody>
+                      <a:tcPr>
+                        <a:blipFill>
+                          <a:blip r:embed="rId4"/>
+                          <a:stretch>
+                            <a:fillRect l="-546" t="-109836" r="-402186" b="-803279"/>
+                          </a:stretch>
+                        </a:blipFill>
+                      </a:tcPr>
+                    </a:tc>
+                    <a:tc>
+                      <a:txBody>
+                        <a:bodyPr/>
+                        <a:lstStyle/>
+                        <a:p>
+                          <a:endParaRPr lang="de-DE"/>
+                        </a:p>
+                      </a:txBody>
+                      <a:tcPr>
+                        <a:blipFill>
+                          <a:blip r:embed="rId4"/>
+                          <a:stretch>
+                            <a:fillRect l="-100546" t="-109836" r="-302186" b="-803279"/>
+                          </a:stretch>
+                        </a:blipFill>
+                      </a:tcPr>
+                    </a:tc>
+                    <a:tc>
+                      <a:txBody>
+                        <a:bodyPr/>
+                        <a:lstStyle/>
+                        <a:p>
+                          <a:pPr/>
+                          <a:endParaRPr lang="de-DE" dirty="0"/>
+                        </a:p>
+                      </a:txBody>
+                      <a:tcPr/>
+                    </a:tc>
+                    <a:tc>
+                      <a:txBody>
+                        <a:bodyPr/>
+                        <a:lstStyle/>
+                        <a:p>
+                          <a:endParaRPr lang="de-DE" dirty="0"/>
+                        </a:p>
+                      </a:txBody>
+                      <a:tcPr/>
+                    </a:tc>
+                    <a:tc>
+                      <a:txBody>
+                        <a:bodyPr/>
+                        <a:lstStyle/>
+                        <a:p>
+                          <a:endParaRPr lang="de-DE" dirty="0"/>
+                        </a:p>
+                      </a:txBody>
+                      <a:tcPr/>
+                    </a:tc>
+                    <a:extLst>
+                      <a:ext uri="{0D108BD9-81ED-4DB2-BD59-A6C34878D82A}">
+                        <a16:rowId xmlns:a16="http://schemas.microsoft.com/office/drawing/2014/main" val="920406243"/>
+                      </a:ext>
+                    </a:extLst>
+                  </a:tr>
+                  <a:tr h="370840">
+                    <a:tc>
+                      <a:txBody>
+                        <a:bodyPr/>
+                        <a:lstStyle/>
+                        <a:p>
+                          <a:endParaRPr lang="de-DE"/>
+                        </a:p>
+                      </a:txBody>
+                      <a:tcPr>
+                        <a:blipFill>
+                          <a:blip r:embed="rId4"/>
+                          <a:stretch>
+                            <a:fillRect l="-546" t="-209836" r="-402186" b="-703279"/>
+                          </a:stretch>
+                        </a:blipFill>
+                      </a:tcPr>
+                    </a:tc>
+                    <a:tc>
+                      <a:txBody>
+                        <a:bodyPr/>
+                        <a:lstStyle/>
+                        <a:p>
+                          <a:endParaRPr lang="de-DE"/>
+                        </a:p>
+                      </a:txBody>
+                      <a:tcPr>
+                        <a:blipFill>
+                          <a:blip r:embed="rId4"/>
+                          <a:stretch>
+                            <a:fillRect l="-100546" t="-209836" r="-302186" b="-703279"/>
+                          </a:stretch>
+                        </a:blipFill>
+                      </a:tcPr>
+                    </a:tc>
+                    <a:tc>
+                      <a:txBody>
+                        <a:bodyPr/>
+                        <a:lstStyle/>
+                        <a:p>
+                          <a:pPr/>
+                          <a:endParaRPr lang="de-DE" dirty="0"/>
+                        </a:p>
+                      </a:txBody>
+                      <a:tcPr/>
+                    </a:tc>
+                    <a:tc>
+                      <a:txBody>
+                        <a:bodyPr/>
+                        <a:lstStyle/>
+                        <a:p>
+                          <a:endParaRPr lang="de-DE" dirty="0"/>
+                        </a:p>
+                      </a:txBody>
+                      <a:tcPr/>
+                    </a:tc>
+                    <a:tc>
+                      <a:txBody>
+                        <a:bodyPr/>
+                        <a:lstStyle/>
+                        <a:p>
+                          <a:endParaRPr lang="de-DE" dirty="0"/>
+                        </a:p>
+                      </a:txBody>
+                      <a:tcPr/>
+                    </a:tc>
+                    <a:extLst>
+                      <a:ext uri="{0D108BD9-81ED-4DB2-BD59-A6C34878D82A}">
+                        <a16:rowId xmlns:a16="http://schemas.microsoft.com/office/drawing/2014/main" val="2124997232"/>
+                      </a:ext>
+                    </a:extLst>
+                  </a:tr>
+                  <a:tr h="370840">
+                    <a:tc>
+                      <a:txBody>
+                        <a:bodyPr/>
+                        <a:lstStyle/>
+                        <a:p>
+                          <a:endParaRPr lang="de-DE"/>
+                        </a:p>
+                      </a:txBody>
+                      <a:tcPr>
+                        <a:blipFill>
+                          <a:blip r:embed="rId4"/>
+                          <a:stretch>
+                            <a:fillRect l="-546" t="-309836" r="-402186" b="-603279"/>
+                          </a:stretch>
+                        </a:blipFill>
+                      </a:tcPr>
+                    </a:tc>
+                    <a:tc>
+                      <a:txBody>
+                        <a:bodyPr/>
+                        <a:lstStyle/>
+                        <a:p>
+                          <a:endParaRPr lang="de-DE"/>
+                        </a:p>
+                      </a:txBody>
+                      <a:tcPr>
+                        <a:blipFill>
+                          <a:blip r:embed="rId4"/>
+                          <a:stretch>
+                            <a:fillRect l="-100546" t="-309836" r="-302186" b="-603279"/>
+                          </a:stretch>
+                        </a:blipFill>
+                      </a:tcPr>
+                    </a:tc>
+                    <a:tc>
+                      <a:txBody>
+                        <a:bodyPr/>
+                        <a:lstStyle/>
+                        <a:p>
+                          <a:pPr/>
+                          <a:endParaRPr lang="de-DE" dirty="0"/>
+                        </a:p>
+                      </a:txBody>
+                      <a:tcPr/>
+                    </a:tc>
+                    <a:tc>
+                      <a:txBody>
+                        <a:bodyPr/>
+                        <a:lstStyle/>
+                        <a:p>
+                          <a:endParaRPr lang="de-DE" dirty="0"/>
+                        </a:p>
+                      </a:txBody>
+                      <a:tcPr/>
+                    </a:tc>
+                    <a:tc>
+                      <a:txBody>
+                        <a:bodyPr/>
+                        <a:lstStyle/>
+                        <a:p>
+                          <a:endParaRPr lang="de-DE" dirty="0"/>
+                        </a:p>
+                      </a:txBody>
+                      <a:tcPr/>
+                    </a:tc>
+                    <a:extLst>
+                      <a:ext uri="{0D108BD9-81ED-4DB2-BD59-A6C34878D82A}">
+                        <a16:rowId xmlns:a16="http://schemas.microsoft.com/office/drawing/2014/main" val="4052410277"/>
+                      </a:ext>
+                    </a:extLst>
+                  </a:tr>
+                  <a:tr h="370840">
+                    <a:tc>
+                      <a:txBody>
+                        <a:bodyPr/>
+                        <a:lstStyle/>
+                        <a:p>
+                          <a:endParaRPr lang="de-DE"/>
+                        </a:p>
+                      </a:txBody>
+                      <a:tcPr>
+                        <a:blipFill>
+                          <a:blip r:embed="rId4"/>
+                          <a:stretch>
+                            <a:fillRect l="-546" t="-409836" r="-402186" b="-503279"/>
+                          </a:stretch>
+                        </a:blipFill>
+                      </a:tcPr>
+                    </a:tc>
+                    <a:tc>
+                      <a:txBody>
+                        <a:bodyPr/>
+                        <a:lstStyle/>
+                        <a:p>
+                          <a:endParaRPr lang="de-DE"/>
+                        </a:p>
+                      </a:txBody>
+                      <a:tcPr>
+                        <a:blipFill>
+                          <a:blip r:embed="rId4"/>
+                          <a:stretch>
+                            <a:fillRect l="-100546" t="-409836" r="-302186" b="-503279"/>
+                          </a:stretch>
+                        </a:blipFill>
+                      </a:tcPr>
+                    </a:tc>
+                    <a:tc>
+                      <a:txBody>
+                        <a:bodyPr/>
+                        <a:lstStyle/>
+                        <a:p>
+                          <a:endParaRPr lang="de-DE" dirty="0"/>
+                        </a:p>
+                      </a:txBody>
+                      <a:tcPr/>
+                    </a:tc>
+                    <a:tc>
+                      <a:txBody>
+                        <a:bodyPr/>
+                        <a:lstStyle/>
+                        <a:p>
+                          <a:endParaRPr lang="de-DE" dirty="0"/>
+                        </a:p>
+                      </a:txBody>
+                      <a:tcPr/>
+                    </a:tc>
+                    <a:tc>
+                      <a:txBody>
+                        <a:bodyPr/>
+                        <a:lstStyle/>
+                        <a:p>
+                          <a:endParaRPr lang="de-DE" dirty="0"/>
+                        </a:p>
+                      </a:txBody>
+                      <a:tcPr/>
+                    </a:tc>
+                    <a:extLst>
+                      <a:ext uri="{0D108BD9-81ED-4DB2-BD59-A6C34878D82A}">
+                        <a16:rowId xmlns:a16="http://schemas.microsoft.com/office/drawing/2014/main" val="2167875333"/>
+                      </a:ext>
+                    </a:extLst>
+                  </a:tr>
+                  <a:tr h="370840">
+                    <a:tc>
+                      <a:txBody>
+                        <a:bodyPr/>
+                        <a:lstStyle/>
+                        <a:p>
+                          <a:endParaRPr lang="de-DE"/>
+                        </a:p>
+                      </a:txBody>
+                      <a:tcPr>
+                        <a:blipFill>
+                          <a:blip r:embed="rId4"/>
+                          <a:stretch>
+                            <a:fillRect l="-546" t="-509836" r="-402186" b="-403279"/>
+                          </a:stretch>
+                        </a:blipFill>
+                      </a:tcPr>
+                    </a:tc>
+                    <a:tc>
+                      <a:txBody>
+                        <a:bodyPr/>
+                        <a:lstStyle/>
+                        <a:p>
+                          <a:endParaRPr lang="de-DE"/>
+                        </a:p>
+                      </a:txBody>
+                      <a:tcPr>
+                        <a:blipFill>
+                          <a:blip r:embed="rId4"/>
+                          <a:stretch>
+                            <a:fillRect l="-100546" t="-509836" r="-302186" b="-403279"/>
+                          </a:stretch>
+                        </a:blipFill>
+                      </a:tcPr>
+                    </a:tc>
+                    <a:tc>
+                      <a:txBody>
+                        <a:bodyPr/>
+                        <a:lstStyle/>
+                        <a:p>
+                          <a:endParaRPr lang="de-DE" dirty="0"/>
+                        </a:p>
+                      </a:txBody>
+                      <a:tcPr/>
+                    </a:tc>
+                    <a:tc>
+                      <a:txBody>
+                        <a:bodyPr/>
+                        <a:lstStyle/>
+                        <a:p>
+                          <a:endParaRPr lang="de-DE"/>
+                        </a:p>
+                      </a:txBody>
+                      <a:tcPr/>
+                    </a:tc>
+                    <a:tc>
+                      <a:txBody>
+                        <a:bodyPr/>
+                        <a:lstStyle/>
+                        <a:p>
+                          <a:endParaRPr lang="de-DE" dirty="0"/>
+                        </a:p>
+                      </a:txBody>
+                      <a:tcPr/>
+                    </a:tc>
+                    <a:extLst>
+                      <a:ext uri="{0D108BD9-81ED-4DB2-BD59-A6C34878D82A}">
+                        <a16:rowId xmlns:a16="http://schemas.microsoft.com/office/drawing/2014/main" val="2382239149"/>
+                      </a:ext>
+                    </a:extLst>
+                  </a:tr>
+                  <a:tr h="370840">
+                    <a:tc>
+                      <a:txBody>
+                        <a:bodyPr/>
+                        <a:lstStyle/>
+                        <a:p>
+                          <a:endParaRPr lang="de-DE"/>
+                        </a:p>
+                      </a:txBody>
+                      <a:tcPr>
+                        <a:blipFill>
+                          <a:blip r:embed="rId4"/>
+                          <a:stretch>
+                            <a:fillRect l="-546" t="-609836" r="-402186" b="-303279"/>
+                          </a:stretch>
+                        </a:blipFill>
+                      </a:tcPr>
+                    </a:tc>
+                    <a:tc>
+                      <a:txBody>
+                        <a:bodyPr/>
+                        <a:lstStyle/>
+                        <a:p>
+                          <a:endParaRPr lang="de-DE"/>
+                        </a:p>
+                      </a:txBody>
+                      <a:tcPr>
+                        <a:blipFill>
+                          <a:blip r:embed="rId4"/>
+                          <a:stretch>
+                            <a:fillRect l="-100546" t="-609836" r="-302186" b="-303279"/>
+                          </a:stretch>
+                        </a:blipFill>
+                      </a:tcPr>
+                    </a:tc>
+                    <a:tc>
+                      <a:txBody>
+                        <a:bodyPr/>
+                        <a:lstStyle/>
+                        <a:p>
+                          <a:endParaRPr lang="de-DE" dirty="0"/>
+                        </a:p>
+                      </a:txBody>
+                      <a:tcPr/>
+                    </a:tc>
+                    <a:tc>
+                      <a:txBody>
+                        <a:bodyPr/>
+                        <a:lstStyle/>
+                        <a:p>
+                          <a:endParaRPr lang="de-DE"/>
+                        </a:p>
+                      </a:txBody>
+                      <a:tcPr/>
+                    </a:tc>
+                    <a:tc>
+                      <a:txBody>
+                        <a:bodyPr/>
+                        <a:lstStyle/>
+                        <a:p>
+                          <a:endParaRPr lang="de-DE"/>
+                        </a:p>
+                      </a:txBody>
+                      <a:tcPr/>
+                    </a:tc>
+                    <a:extLst>
+                      <a:ext uri="{0D108BD9-81ED-4DB2-BD59-A6C34878D82A}">
+                        <a16:rowId xmlns:a16="http://schemas.microsoft.com/office/drawing/2014/main" val="3343440584"/>
+                      </a:ext>
+                    </a:extLst>
+                  </a:tr>
+                  <a:tr h="370840">
+                    <a:tc>
+                      <a:txBody>
+                        <a:bodyPr/>
+                        <a:lstStyle/>
+                        <a:p>
+                          <a:endParaRPr lang="de-DE"/>
+                        </a:p>
+                      </a:txBody>
+                      <a:tcPr>
+                        <a:blipFill>
+                          <a:blip r:embed="rId4"/>
+                          <a:stretch>
+                            <a:fillRect l="-546" t="-709836" r="-402186" b="-203279"/>
+                          </a:stretch>
+                        </a:blipFill>
+                      </a:tcPr>
+                    </a:tc>
+                    <a:tc>
+                      <a:txBody>
+                        <a:bodyPr/>
+                        <a:lstStyle/>
+                        <a:p>
+                          <a:endParaRPr lang="de-DE"/>
+                        </a:p>
+                      </a:txBody>
+                      <a:tcPr>
+                        <a:blipFill>
+                          <a:blip r:embed="rId4"/>
+                          <a:stretch>
+                            <a:fillRect l="-100546" t="-709836" r="-302186" b="-203279"/>
+                          </a:stretch>
+                        </a:blipFill>
+                      </a:tcPr>
+                    </a:tc>
+                    <a:tc>
+                      <a:txBody>
+                        <a:bodyPr/>
+                        <a:lstStyle/>
+                        <a:p>
+                          <a:endParaRPr lang="de-DE" dirty="0"/>
+                        </a:p>
+                      </a:txBody>
+                      <a:tcPr/>
+                    </a:tc>
+                    <a:tc>
+                      <a:txBody>
+                        <a:bodyPr/>
+                        <a:lstStyle/>
+                        <a:p>
+                          <a:endParaRPr lang="de-DE"/>
+                        </a:p>
+                      </a:txBody>
+                      <a:tcPr/>
+                    </a:tc>
+                    <a:tc>
+                      <a:txBody>
+                        <a:bodyPr/>
+                        <a:lstStyle/>
+                        <a:p>
+                          <a:endParaRPr lang="de-DE" dirty="0"/>
+                        </a:p>
+                      </a:txBody>
+                      <a:tcPr/>
+                    </a:tc>
+                    <a:extLst>
+                      <a:ext uri="{0D108BD9-81ED-4DB2-BD59-A6C34878D82A}">
+                        <a16:rowId xmlns:a16="http://schemas.microsoft.com/office/drawing/2014/main" val="1860875471"/>
+                      </a:ext>
+                    </a:extLst>
+                  </a:tr>
+                  <a:tr h="370840">
+                    <a:tc>
+                      <a:txBody>
+                        <a:bodyPr/>
+                        <a:lstStyle/>
+                        <a:p>
+                          <a:endParaRPr lang="de-DE"/>
+                        </a:p>
+                      </a:txBody>
+                      <a:tcPr>
+                        <a:blipFill>
+                          <a:blip r:embed="rId4"/>
+                          <a:stretch>
+                            <a:fillRect l="-546" t="-809836" r="-402186" b="-103279"/>
+                          </a:stretch>
+                        </a:blipFill>
+                      </a:tcPr>
+                    </a:tc>
+                    <a:tc>
+                      <a:txBody>
+                        <a:bodyPr/>
+                        <a:lstStyle/>
+                        <a:p>
+                          <a:endParaRPr lang="de-DE"/>
+                        </a:p>
+                      </a:txBody>
+                      <a:tcPr>
+                        <a:blipFill>
+                          <a:blip r:embed="rId4"/>
+                          <a:stretch>
+                            <a:fillRect l="-100546" t="-809836" r="-302186" b="-103279"/>
+                          </a:stretch>
+                        </a:blipFill>
+                      </a:tcPr>
+                    </a:tc>
+                    <a:tc>
+                      <a:txBody>
+                        <a:bodyPr/>
+                        <a:lstStyle/>
+                        <a:p>
+                          <a:endParaRPr lang="de-DE" dirty="0"/>
+                        </a:p>
+                      </a:txBody>
+                      <a:tcPr/>
+                    </a:tc>
+                    <a:tc>
+                      <a:txBody>
+                        <a:bodyPr/>
+                        <a:lstStyle/>
+                        <a:p>
+                          <a:endParaRPr lang="de-DE" dirty="0"/>
+                        </a:p>
+                      </a:txBody>
+                      <a:tcPr/>
+                    </a:tc>
+                    <a:tc>
+                      <a:txBody>
+                        <a:bodyPr/>
+                        <a:lstStyle/>
+                        <a:p>
+                          <a:endParaRPr lang="de-DE" dirty="0"/>
+                        </a:p>
+                      </a:txBody>
+                      <a:tcPr/>
+                    </a:tc>
+                    <a:extLst>
+                      <a:ext uri="{0D108BD9-81ED-4DB2-BD59-A6C34878D82A}">
+                        <a16:rowId xmlns:a16="http://schemas.microsoft.com/office/drawing/2014/main" val="184787271"/>
+                      </a:ext>
+                    </a:extLst>
+                  </a:tr>
+                  <a:tr h="370840">
+                    <a:tc>
+                      <a:txBody>
+                        <a:bodyPr/>
+                        <a:lstStyle/>
+                        <a:p>
+                          <a:endParaRPr lang="de-DE"/>
+                        </a:p>
+                      </a:txBody>
+                      <a:tcPr>
+                        <a:blipFill>
+                          <a:blip r:embed="rId4"/>
+                          <a:stretch>
+                            <a:fillRect l="-546" t="-909836" r="-402186" b="-3279"/>
+                          </a:stretch>
+                        </a:blipFill>
+                      </a:tcPr>
+                    </a:tc>
+                    <a:tc>
+                      <a:txBody>
+                        <a:bodyPr/>
+                        <a:lstStyle/>
+                        <a:p>
+                          <a:endParaRPr lang="de-DE"/>
+                        </a:p>
+                      </a:txBody>
+                      <a:tcPr>
+                        <a:blipFill>
+                          <a:blip r:embed="rId4"/>
+                          <a:stretch>
+                            <a:fillRect l="-100546" t="-909836" r="-302186" b="-3279"/>
+                          </a:stretch>
+                        </a:blipFill>
+                      </a:tcPr>
+                    </a:tc>
+                    <a:tc>
+                      <a:txBody>
+                        <a:bodyPr/>
+                        <a:lstStyle/>
+                        <a:p>
+                          <a:endParaRPr lang="de-DE" dirty="0"/>
+                        </a:p>
+                      </a:txBody>
+                      <a:tcPr/>
+                    </a:tc>
+                    <a:tc>
+                      <a:txBody>
+                        <a:bodyPr/>
+                        <a:lstStyle/>
+                        <a:p>
+                          <a:endParaRPr lang="de-DE" dirty="0"/>
+                        </a:p>
+                      </a:txBody>
+                      <a:tcPr/>
+                    </a:tc>
+                    <a:tc>
+                      <a:txBody>
+                        <a:bodyPr/>
+                        <a:lstStyle/>
+                        <a:p>
+                          <a:endParaRPr lang="de-DE" dirty="0"/>
+                        </a:p>
+                      </a:txBody>
+                      <a:tcPr/>
+                    </a:tc>
+                    <a:extLst>
+                      <a:ext uri="{0D108BD9-81ED-4DB2-BD59-A6C34878D82A}">
+                        <a16:rowId xmlns:a16="http://schemas.microsoft.com/office/drawing/2014/main" val="2091703710"/>
+                      </a:ext>
+                    </a:extLst>
+                  </a:tr>
+                </a:tbl>
+              </a:graphicData>
+            </a:graphic>
+          </p:graphicFrame>
+        </mc:Fallback>
+      </mc:AlternateContent>
+      <p:pic>
+        <p:nvPicPr>
+          <p:cNvPr id="10" name="Grafik 9">
+            <a:extLst>
+              <a:ext uri="{FF2B5EF4-FFF2-40B4-BE49-F238E27FC236}">
+                <a16:creationId xmlns:a16="http://schemas.microsoft.com/office/drawing/2014/main" id="{6F828FA8-E698-9C56-C958-593475589478}"/>
+              </a:ext>
+            </a:extLst>
+          </p:cNvPr>
+          <p:cNvPicPr>
+            <a:picLocks noChangeAspect="1"/>
+          </p:cNvPicPr>
+          <p:nvPr/>
+        </p:nvPicPr>
+        <p:blipFill>
+          <a:blip r:embed="rId5"/>
+          <a:stretch>
+            <a:fillRect/>
+          </a:stretch>
+        </p:blipFill>
+        <p:spPr>
+          <a:xfrm>
+            <a:off x="7481451" y="0"/>
+            <a:ext cx="4317115" cy="6858000"/>
+          </a:xfrm>
+          <a:prstGeom prst="rect">
+            <a:avLst/>
+          </a:prstGeom>
+        </p:spPr>
+      </p:pic>
+    </p:spTree>
+    <p:extLst>
+      <p:ext uri="{BB962C8B-B14F-4D97-AF65-F5344CB8AC3E}">
+        <p14:creationId xmlns:p14="http://schemas.microsoft.com/office/powerpoint/2010/main" val="3392510386"/>
       </p:ext>
     </p:extLst>
   </p:cSld>
@@ -8187,8 +12121,8 @@
           </a:p>
         </p:txBody>
       </p:sp>
-      <mc:AlternateContent xmlns:mc="http://schemas.openxmlformats.org/markup-compatibility/2006">
-        <mc:Choice xmlns:a14="http://schemas.microsoft.com/office/drawing/2010/main" Requires="a14">
+      <mc:AlternateContent xmlns:mc="http://schemas.openxmlformats.org/markup-compatibility/2006" xmlns:a14="http://schemas.microsoft.com/office/drawing/2010/main">
+        <mc:Choice Requires="a14">
           <p:sp>
             <p:nvSpPr>
               <p:cNvPr id="10" name="Textfeld 9">
@@ -8217,6 +12151,7 @@
               </a:bodyPr>
               <a:lstStyle/>
               <a:p>
+                <a:pPr/>
                 <a14:m>
                   <m:oMathPara xmlns:m="http://schemas.openxmlformats.org/officeDocument/2006/math">
                     <m:oMathParaPr>
@@ -8284,7 +12219,7 @@
             </p:txBody>
           </p:sp>
         </mc:Choice>
-        <mc:Fallback>
+        <mc:Fallback xmlns="">
           <p:sp>
             <p:nvSpPr>
               <p:cNvPr id="10" name="Textfeld 9">
@@ -8329,8 +12264,8 @@
           </p:sp>
         </mc:Fallback>
       </mc:AlternateContent>
-      <mc:AlternateContent xmlns:mc="http://schemas.openxmlformats.org/markup-compatibility/2006">
-        <mc:Choice xmlns:a14="http://schemas.microsoft.com/office/drawing/2010/main" Requires="a14">
+      <mc:AlternateContent xmlns:mc="http://schemas.openxmlformats.org/markup-compatibility/2006" xmlns:a14="http://schemas.microsoft.com/office/drawing/2010/main">
+        <mc:Choice Requires="a14">
           <p:sp>
             <p:nvSpPr>
               <p:cNvPr id="13" name="Textfeld 12">
@@ -8359,6 +12294,7 @@
               </a:bodyPr>
               <a:lstStyle/>
               <a:p>
+                <a:pPr/>
                 <a14:m>
                   <m:oMathPara xmlns:m="http://schemas.openxmlformats.org/officeDocument/2006/math">
                     <m:oMathParaPr>
@@ -8494,7 +12430,7 @@
             </p:txBody>
           </p:sp>
         </mc:Choice>
-        <mc:Fallback>
+        <mc:Fallback xmlns="">
           <p:sp>
             <p:nvSpPr>
               <p:cNvPr id="13" name="Textfeld 12">
@@ -8673,8 +12609,8 @@
           </a:p>
         </p:txBody>
       </p:sp>
-      <mc:AlternateContent xmlns:mc="http://schemas.openxmlformats.org/markup-compatibility/2006">
-        <mc:Choice xmlns:a14="http://schemas.microsoft.com/office/drawing/2010/main" Requires="a14">
+      <mc:AlternateContent xmlns:mc="http://schemas.openxmlformats.org/markup-compatibility/2006" xmlns:a14="http://schemas.microsoft.com/office/drawing/2010/main">
+        <mc:Choice Requires="a14">
           <p:graphicFrame>
             <p:nvGraphicFramePr>
               <p:cNvPr id="4" name="Tabelle 3">
@@ -9306,7 +13242,7 @@
             </a:graphic>
           </p:graphicFrame>
         </mc:Choice>
-        <mc:Fallback>
+        <mc:Fallback xmlns="">
           <p:graphicFrame>
             <p:nvGraphicFramePr>
               <p:cNvPr id="4" name="Tabelle 3">
@@ -9870,8 +13806,8 @@
           </p:graphicFrame>
         </mc:Fallback>
       </mc:AlternateContent>
-      <mc:AlternateContent xmlns:mc="http://schemas.openxmlformats.org/markup-compatibility/2006">
-        <mc:Choice xmlns:a14="http://schemas.microsoft.com/office/drawing/2010/main" Requires="a14">
+      <mc:AlternateContent xmlns:mc="http://schemas.openxmlformats.org/markup-compatibility/2006" xmlns:a14="http://schemas.microsoft.com/office/drawing/2010/main">
+        <mc:Choice Requires="a14">
           <p:sp>
             <p:nvSpPr>
               <p:cNvPr id="5" name="Textfeld 4">
@@ -9900,6 +13836,7 @@
               </a:bodyPr>
               <a:lstStyle/>
               <a:p>
+                <a:pPr/>
                 <a14:m>
                   <m:oMathPara xmlns:m="http://schemas.openxmlformats.org/officeDocument/2006/math">
                     <m:oMathParaPr>
@@ -10156,7 +14093,7 @@
             </p:txBody>
           </p:sp>
         </mc:Choice>
-        <mc:Fallback>
+        <mc:Fallback xmlns="">
           <p:sp>
             <p:nvSpPr>
               <p:cNvPr id="5" name="Textfeld 4">

</xml_diff>